<commit_message>
old sequence iteration protocol
</commit_message>
<xml_diff>
--- a/ipsa/slides/generator.pptx
+++ b/ipsa/slides/generator.pptx
@@ -5,7 +5,7 @@
     <p:sldMasterId id="2147483648" r:id="rId1"/>
   </p:sldMasterIdLst>
   <p:notesMasterIdLst>
-    <p:notesMasterId r:id="rId30"/>
+    <p:notesMasterId r:id="rId31"/>
   </p:notesMasterIdLst>
   <p:sldIdLst>
     <p:sldId id="470" r:id="rId2"/>
@@ -18,24 +18,25 @@
     <p:sldId id="767" r:id="rId9"/>
     <p:sldId id="786" r:id="rId10"/>
     <p:sldId id="768" r:id="rId11"/>
-    <p:sldId id="765" r:id="rId12"/>
-    <p:sldId id="789" r:id="rId13"/>
-    <p:sldId id="788" r:id="rId14"/>
-    <p:sldId id="785" r:id="rId15"/>
-    <p:sldId id="790" r:id="rId16"/>
-    <p:sldId id="792" r:id="rId17"/>
-    <p:sldId id="791" r:id="rId18"/>
-    <p:sldId id="793" r:id="rId19"/>
-    <p:sldId id="794" r:id="rId20"/>
-    <p:sldId id="795" r:id="rId21"/>
-    <p:sldId id="797" r:id="rId22"/>
-    <p:sldId id="779" r:id="rId23"/>
-    <p:sldId id="780" r:id="rId24"/>
-    <p:sldId id="618" r:id="rId25"/>
-    <p:sldId id="511" r:id="rId26"/>
-    <p:sldId id="801" r:id="rId27"/>
-    <p:sldId id="798" r:id="rId28"/>
-    <p:sldId id="799" r:id="rId29"/>
+    <p:sldId id="802" r:id="rId12"/>
+    <p:sldId id="765" r:id="rId13"/>
+    <p:sldId id="789" r:id="rId14"/>
+    <p:sldId id="788" r:id="rId15"/>
+    <p:sldId id="785" r:id="rId16"/>
+    <p:sldId id="790" r:id="rId17"/>
+    <p:sldId id="792" r:id="rId18"/>
+    <p:sldId id="791" r:id="rId19"/>
+    <p:sldId id="793" r:id="rId20"/>
+    <p:sldId id="794" r:id="rId21"/>
+    <p:sldId id="795" r:id="rId22"/>
+    <p:sldId id="797" r:id="rId23"/>
+    <p:sldId id="779" r:id="rId24"/>
+    <p:sldId id="780" r:id="rId25"/>
+    <p:sldId id="618" r:id="rId26"/>
+    <p:sldId id="511" r:id="rId27"/>
+    <p:sldId id="801" r:id="rId28"/>
+    <p:sldId id="798" r:id="rId29"/>
+    <p:sldId id="799" r:id="rId30"/>
   </p:sldIdLst>
   <p:sldSz cx="12192000" cy="6858000"/>
   <p:notesSz cx="6858000" cy="9144000"/>
@@ -140,6 +141,14 @@
     </p:ext>
   </p:extLst>
 </p:presentation>
+</file>
+
+<file path=ppt/revisionInfo.xml><?xml version="1.0" encoding="utf-8"?>
+<p1510:revInfo xmlns:a="http://schemas.openxmlformats.org/drawingml/2006/main" xmlns:r="http://schemas.openxmlformats.org/officeDocument/2006/relationships" xmlns:p1510="http://schemas.microsoft.com/office/powerpoint/2015/10/main">
+  <p1510:revLst>
+    <p1510:client id="{D42492F9-9F0C-4C00-A413-C9ADD152F58A}" v="23" dt="2023-04-10T12:33:11.069"/>
+  </p1510:revLst>
+</p1510:revInfo>
 </file>
 
 <file path=ppt/changesInfos/changesInfo1.xml><?xml version="1.0" encoding="utf-8"?>
@@ -303,6 +312,134 @@
       </pc:sldChg>
     </pc:docChg>
   </pc:docChgLst>
+  <pc:docChgLst>
+    <pc:chgData name="Gerth Stølting Brodal" userId="04ef4784-6591-4f86-a140-f5c3b108582a" providerId="ADAL" clId="{D42492F9-9F0C-4C00-A413-C9ADD152F58A}"/>
+    <pc:docChg chg="undo redo custSel addSld modSld">
+      <pc:chgData name="Gerth Stølting Brodal" userId="04ef4784-6591-4f86-a140-f5c3b108582a" providerId="ADAL" clId="{D42492F9-9F0C-4C00-A413-C9ADD152F58A}" dt="2023-04-10T12:40:43.306" v="898" actId="1035"/>
+      <pc:docMkLst>
+        <pc:docMk/>
+      </pc:docMkLst>
+      <pc:sldChg chg="addSp delSp modSp new mod modNotesTx">
+        <pc:chgData name="Gerth Stølting Brodal" userId="04ef4784-6591-4f86-a140-f5c3b108582a" providerId="ADAL" clId="{D42492F9-9F0C-4C00-A413-C9ADD152F58A}" dt="2023-04-10T12:40:43.306" v="898" actId="1035"/>
+        <pc:sldMkLst>
+          <pc:docMk/>
+          <pc:sldMk cId="3533997958" sldId="802"/>
+        </pc:sldMkLst>
+        <pc:spChg chg="mod">
+          <ac:chgData name="Gerth Stølting Brodal" userId="04ef4784-6591-4f86-a140-f5c3b108582a" providerId="ADAL" clId="{D42492F9-9F0C-4C00-A413-C9ADD152F58A}" dt="2023-04-10T11:53:46.171" v="738" actId="14100"/>
+          <ac:spMkLst>
+            <pc:docMk/>
+            <pc:sldMk cId="3533997958" sldId="802"/>
+            <ac:spMk id="2" creationId="{B820491B-72BA-CDFD-9002-D0AAE9D0F05F}"/>
+          </ac:spMkLst>
+        </pc:spChg>
+        <pc:spChg chg="mod">
+          <ac:chgData name="Gerth Stølting Brodal" userId="04ef4784-6591-4f86-a140-f5c3b108582a" providerId="ADAL" clId="{D42492F9-9F0C-4C00-A413-C9ADD152F58A}" dt="2023-04-10T12:31:14.326" v="878" actId="1037"/>
+          <ac:spMkLst>
+            <pc:docMk/>
+            <pc:sldMk cId="3533997958" sldId="802"/>
+            <ac:spMk id="3" creationId="{2091BD0F-6025-7088-2C6D-F3D110B0CEC2}"/>
+          </ac:spMkLst>
+        </pc:spChg>
+        <pc:spChg chg="add del">
+          <ac:chgData name="Gerth Stølting Brodal" userId="04ef4784-6591-4f86-a140-f5c3b108582a" providerId="ADAL" clId="{D42492F9-9F0C-4C00-A413-C9ADD152F58A}" dt="2023-04-10T10:48:11.056" v="2" actId="22"/>
+          <ac:spMkLst>
+            <pc:docMk/>
+            <pc:sldMk cId="3533997958" sldId="802"/>
+            <ac:spMk id="5" creationId="{CF03EB03-EDCB-CE2C-AAED-A9A6E895ADF9}"/>
+          </ac:spMkLst>
+        </pc:spChg>
+        <pc:spChg chg="add mod">
+          <ac:chgData name="Gerth Stølting Brodal" userId="04ef4784-6591-4f86-a140-f5c3b108582a" providerId="ADAL" clId="{D42492F9-9F0C-4C00-A413-C9ADD152F58A}" dt="2023-04-10T12:26:20.173" v="869" actId="14100"/>
+          <ac:spMkLst>
+            <pc:docMk/>
+            <pc:sldMk cId="3533997958" sldId="802"/>
+            <ac:spMk id="8" creationId="{BF9B9ECB-D779-D139-ACE1-1DF1A3FDFE00}"/>
+          </ac:spMkLst>
+        </pc:spChg>
+        <pc:spChg chg="mod ord topLvl">
+          <ac:chgData name="Gerth Stølting Brodal" userId="04ef4784-6591-4f86-a140-f5c3b108582a" providerId="ADAL" clId="{D42492F9-9F0C-4C00-A413-C9ADD152F58A}" dt="2023-04-10T12:33:25.834" v="887" actId="166"/>
+          <ac:spMkLst>
+            <pc:docMk/>
+            <pc:sldMk cId="3533997958" sldId="802"/>
+            <ac:spMk id="13" creationId="{DB01946D-D27F-6A7A-0D52-01295BA1DABD}"/>
+          </ac:spMkLst>
+        </pc:spChg>
+        <pc:spChg chg="add mod">
+          <ac:chgData name="Gerth Stølting Brodal" userId="04ef4784-6591-4f86-a140-f5c3b108582a" providerId="ADAL" clId="{D42492F9-9F0C-4C00-A413-C9ADD152F58A}" dt="2023-04-10T12:20:15.572" v="867" actId="14100"/>
+          <ac:spMkLst>
+            <pc:docMk/>
+            <pc:sldMk cId="3533997958" sldId="802"/>
+            <ac:spMk id="26" creationId="{F9AEF6FF-9E68-4748-909B-AF3227784463}"/>
+          </ac:spMkLst>
+        </pc:spChg>
+        <pc:spChg chg="add mod topLvl">
+          <ac:chgData name="Gerth Stølting Brodal" userId="04ef4784-6591-4f86-a140-f5c3b108582a" providerId="ADAL" clId="{D42492F9-9F0C-4C00-A413-C9ADD152F58A}" dt="2023-04-10T12:33:48.301" v="892" actId="1036"/>
+          <ac:spMkLst>
+            <pc:docMk/>
+            <pc:sldMk cId="3533997958" sldId="802"/>
+            <ac:spMk id="27" creationId="{C9C7C5A9-27F4-C293-4C4D-D4A7879C7476}"/>
+          </ac:spMkLst>
+        </pc:spChg>
+        <pc:grpChg chg="add del mod">
+          <ac:chgData name="Gerth Stølting Brodal" userId="04ef4784-6591-4f86-a140-f5c3b108582a" providerId="ADAL" clId="{D42492F9-9F0C-4C00-A413-C9ADD152F58A}" dt="2023-04-10T12:32:28.587" v="880" actId="165"/>
+          <ac:grpSpMkLst>
+            <pc:docMk/>
+            <pc:sldMk cId="3533997958" sldId="802"/>
+            <ac:grpSpMk id="9" creationId="{8CC19ECE-841A-E22B-D7F9-0B31AB5E5B27}"/>
+          </ac:grpSpMkLst>
+        </pc:grpChg>
+        <pc:grpChg chg="add del mod ord">
+          <ac:chgData name="Gerth Stølting Brodal" userId="04ef4784-6591-4f86-a140-f5c3b108582a" providerId="ADAL" clId="{D42492F9-9F0C-4C00-A413-C9ADD152F58A}" dt="2023-04-10T12:33:11.068" v="885" actId="165"/>
+          <ac:grpSpMkLst>
+            <pc:docMk/>
+            <pc:sldMk cId="3533997958" sldId="802"/>
+            <ac:grpSpMk id="28" creationId="{D4D146D2-6D2A-28AF-AF28-B115E5EE27C3}"/>
+          </ac:grpSpMkLst>
+        </pc:grpChg>
+        <pc:graphicFrameChg chg="add mod modGraphic">
+          <ac:chgData name="Gerth Stølting Brodal" userId="04ef4784-6591-4f86-a140-f5c3b108582a" providerId="ADAL" clId="{D42492F9-9F0C-4C00-A413-C9ADD152F58A}" dt="2023-04-10T12:20:38.849" v="868" actId="207"/>
+          <ac:graphicFrameMkLst>
+            <pc:docMk/>
+            <pc:sldMk cId="3533997958" sldId="802"/>
+            <ac:graphicFrameMk id="6" creationId="{742EE9F5-C111-723C-E4E0-65611ABA84FF}"/>
+          </ac:graphicFrameMkLst>
+        </pc:graphicFrameChg>
+        <pc:cxnChg chg="mod topLvl">
+          <ac:chgData name="Gerth Stølting Brodal" userId="04ef4784-6591-4f86-a140-f5c3b108582a" providerId="ADAL" clId="{D42492F9-9F0C-4C00-A413-C9ADD152F58A}" dt="2023-04-10T12:33:11.068" v="885" actId="165"/>
+          <ac:cxnSpMkLst>
+            <pc:docMk/>
+            <pc:sldMk cId="3533997958" sldId="802"/>
+            <ac:cxnSpMk id="10" creationId="{DA53FA89-5FD7-23F9-743B-DD5245CA8AF7}"/>
+          </ac:cxnSpMkLst>
+        </pc:cxnChg>
+        <pc:cxnChg chg="del mod">
+          <ac:chgData name="Gerth Stølting Brodal" userId="04ef4784-6591-4f86-a140-f5c3b108582a" providerId="ADAL" clId="{D42492F9-9F0C-4C00-A413-C9ADD152F58A}" dt="2023-04-10T11:23:29.179" v="397" actId="478"/>
+          <ac:cxnSpMkLst>
+            <pc:docMk/>
+            <pc:sldMk cId="3533997958" sldId="802"/>
+            <ac:cxnSpMk id="11" creationId="{0968848B-C317-3148-B2F4-EE1B71423DE5}"/>
+          </ac:cxnSpMkLst>
+        </pc:cxnChg>
+        <pc:cxnChg chg="mod ord topLvl">
+          <ac:chgData name="Gerth Stølting Brodal" userId="04ef4784-6591-4f86-a140-f5c3b108582a" providerId="ADAL" clId="{D42492F9-9F0C-4C00-A413-C9ADD152F58A}" dt="2023-04-10T12:40:43.306" v="898" actId="1035"/>
+          <ac:cxnSpMkLst>
+            <pc:docMk/>
+            <pc:sldMk cId="3533997958" sldId="802"/>
+            <ac:cxnSpMk id="12" creationId="{D6315816-4F4B-81B0-B96B-5BEBDDF202AD}"/>
+          </ac:cxnSpMkLst>
+        </pc:cxnChg>
+        <pc:cxnChg chg="del mod">
+          <ac:chgData name="Gerth Stølting Brodal" userId="04ef4784-6591-4f86-a140-f5c3b108582a" providerId="ADAL" clId="{D42492F9-9F0C-4C00-A413-C9ADD152F58A}" dt="2023-04-10T11:23:26.851" v="396" actId="478"/>
+          <ac:cxnSpMkLst>
+            <pc:docMk/>
+            <pc:sldMk cId="3533997958" sldId="802"/>
+            <ac:cxnSpMk id="14" creationId="{D17EC6EB-9B0E-6DE5-618C-694B8F0C6E33}"/>
+          </ac:cxnSpMkLst>
+        </pc:cxnChg>
+      </pc:sldChg>
+    </pc:docChg>
+  </pc:docChgLst>
 </pc:chgInfo>
 </file>
 
@@ -388,7 +525,7 @@
           <a:p>
             <a:fld id="{FB1A172F-81D4-4DC4-9113-1DBD56EC3646}" type="datetimeFigureOut">
               <a:rPr lang="en-US" smtClean="0"/>
-              <a:t>4/6/2022</a:t>
+              <a:t>4/10/2023</a:t>
             </a:fld>
             <a:endParaRPr lang="en-US"/>
           </a:p>
@@ -783,59 +920,6 @@
           <a:bodyPr/>
           <a:lstStyle/>
           <a:p>
-            <a:r>
-              <a:rPr lang="en-US" dirty="0"/>
-              <a:t>Demo:</a:t>
-            </a:r>
-          </a:p>
-          <a:p>
-            <a:r>
-              <a:rPr lang="da-DK" dirty="0"/>
-              <a:t>IDLE:</a:t>
-            </a:r>
-          </a:p>
-          <a:p>
-            <a:r>
-              <a:rPr lang="da-DK" dirty="0"/>
-              <a:t>start</a:t>
-            </a:r>
-            <a:r>
-              <a:rPr lang="da-DK" baseline="0" dirty="0"/>
-              <a:t> </a:t>
-            </a:r>
-            <a:r>
-              <a:rPr lang="da-DK" baseline="0" dirty="0" err="1"/>
-              <a:t>task</a:t>
-            </a:r>
-            <a:r>
-              <a:rPr lang="da-DK" baseline="0" dirty="0"/>
-              <a:t> manager</a:t>
-            </a:r>
-          </a:p>
-          <a:p>
-            <a:r>
-              <a:rPr lang="da-DK" baseline="0" dirty="0"/>
-              <a:t>start IDLE</a:t>
-            </a:r>
-          </a:p>
-          <a:p>
-            <a:r>
-              <a:rPr lang="da-DK" baseline="0" dirty="0"/>
-              <a:t>L = list(range(1_000_000)</a:t>
-            </a:r>
-            <a:endParaRPr lang="en-US" dirty="0"/>
-          </a:p>
-          <a:p>
-            <a:r>
-              <a:rPr lang="en-US" dirty="0"/>
-              <a:t>X = range(10_000_000)</a:t>
-            </a:r>
-          </a:p>
-          <a:p>
-            <a:r>
-              <a:rPr lang="da-DK" dirty="0"/>
-              <a:t>X = []</a:t>
-            </a:r>
             <a:endParaRPr lang="en-US" dirty="0"/>
           </a:p>
         </p:txBody>
@@ -857,7 +941,7 @@
           <a:p>
             <a:fld id="{CD563DD8-32AB-41BE-B1C6-8EAC45222ACE}" type="slidenum">
               <a:rPr lang="en-US" smtClean="0"/>
-              <a:t>27</a:t>
+              <a:t>26</a:t>
             </a:fld>
             <a:endParaRPr lang="en-US"/>
           </a:p>
@@ -866,7 +950,7 @@
     </p:spTree>
     <p:extLst>
       <p:ext uri="{BB962C8B-B14F-4D97-AF65-F5344CB8AC3E}">
-        <p14:creationId xmlns:p14="http://schemas.microsoft.com/office/powerpoint/2010/main" val="1929632478"/>
+        <p14:creationId xmlns:p14="http://schemas.microsoft.com/office/powerpoint/2010/main" val="3336099653"/>
       </p:ext>
     </p:extLst>
   </p:cSld>
@@ -921,33 +1005,57 @@
           <a:lstStyle/>
           <a:p>
             <a:r>
-              <a:rPr lang="en-US" dirty="0" err="1"/>
-              <a:t>mprof</a:t>
-            </a:r>
-            <a:r>
-              <a:rPr lang="en-US" baseline="0" dirty="0"/>
-              <a:t> script is part of the memory-profiler module installed in the Python directory Python???/scripts</a:t>
+              <a:rPr lang="en-US" dirty="0"/>
+              <a:t>Demo:</a:t>
             </a:r>
           </a:p>
           <a:p>
-            <a:endParaRPr lang="en-US" baseline="0" dirty="0"/>
+            <a:r>
+              <a:rPr lang="da-DK" dirty="0"/>
+              <a:t>IDLE:</a:t>
+            </a:r>
           </a:p>
           <a:p>
             <a:r>
-              <a:rPr lang="en-US" baseline="0" dirty="0"/>
-              <a:t>“</a:t>
-            </a:r>
-            <a:r>
-              <a:rPr lang="en-US" baseline="0" dirty="0" err="1"/>
-              <a:t>mprof</a:t>
-            </a:r>
-            <a:r>
-              <a:rPr lang="en-US" baseline="0" dirty="0"/>
-              <a:t> run” creates a file “mprofile_20220406123307.dat” (number is the date </a:t>
-            </a:r>
-            <a:r>
-              <a:rPr lang="en-US" baseline="0"/>
-              <a:t>and time)</a:t>
+              <a:rPr lang="da-DK" dirty="0"/>
+              <a:t>start</a:t>
+            </a:r>
+            <a:r>
+              <a:rPr lang="da-DK" baseline="0" dirty="0"/>
+              <a:t> </a:t>
+            </a:r>
+            <a:r>
+              <a:rPr lang="da-DK" baseline="0" dirty="0" err="1"/>
+              <a:t>task</a:t>
+            </a:r>
+            <a:r>
+              <a:rPr lang="da-DK" baseline="0" dirty="0"/>
+              <a:t> manager</a:t>
+            </a:r>
+          </a:p>
+          <a:p>
+            <a:r>
+              <a:rPr lang="da-DK" baseline="0" dirty="0"/>
+              <a:t>start IDLE</a:t>
+            </a:r>
+          </a:p>
+          <a:p>
+            <a:r>
+              <a:rPr lang="da-DK" baseline="0" dirty="0"/>
+              <a:t>L = list(range(1_000_000)</a:t>
+            </a:r>
+            <a:endParaRPr lang="en-US" dirty="0"/>
+          </a:p>
+          <a:p>
+            <a:r>
+              <a:rPr lang="en-US" dirty="0"/>
+              <a:t>X = range(10_000_000)</a:t>
+            </a:r>
+          </a:p>
+          <a:p>
+            <a:r>
+              <a:rPr lang="da-DK" dirty="0"/>
+              <a:t>X = []</a:t>
             </a:r>
             <a:endParaRPr lang="en-US" dirty="0"/>
           </a:p>
@@ -971,6 +1079,119 @@
             <a:fld id="{CD563DD8-32AB-41BE-B1C6-8EAC45222ACE}" type="slidenum">
               <a:rPr lang="en-US" smtClean="0"/>
               <a:t>28</a:t>
+            </a:fld>
+            <a:endParaRPr lang="en-US"/>
+          </a:p>
+        </p:txBody>
+      </p:sp>
+    </p:spTree>
+    <p:extLst>
+      <p:ext uri="{BB962C8B-B14F-4D97-AF65-F5344CB8AC3E}">
+        <p14:creationId xmlns:p14="http://schemas.microsoft.com/office/powerpoint/2010/main" val="1929632478"/>
+      </p:ext>
+    </p:extLst>
+  </p:cSld>
+  <p:clrMapOvr>
+    <a:masterClrMapping/>
+  </p:clrMapOvr>
+</p:notes>
+</file>
+
+<file path=ppt/notesSlides/notesSlide12.xml><?xml version="1.0" encoding="utf-8"?>
+<p:notes xmlns:a="http://schemas.openxmlformats.org/drawingml/2006/main" xmlns:r="http://schemas.openxmlformats.org/officeDocument/2006/relationships" xmlns:p="http://schemas.openxmlformats.org/presentationml/2006/main">
+  <p:cSld>
+    <p:spTree>
+      <p:nvGrpSpPr>
+        <p:cNvPr id="1" name=""/>
+        <p:cNvGrpSpPr/>
+        <p:nvPr/>
+      </p:nvGrpSpPr>
+      <p:grpSpPr>
+        <a:xfrm>
+          <a:off x="0" y="0"/>
+          <a:ext cx="0" cy="0"/>
+          <a:chOff x="0" y="0"/>
+          <a:chExt cx="0" cy="0"/>
+        </a:xfrm>
+      </p:grpSpPr>
+      <p:sp>
+        <p:nvSpPr>
+          <p:cNvPr id="2" name="Slide Image Placeholder 1"/>
+          <p:cNvSpPr>
+            <a:spLocks noGrp="1" noRot="1" noChangeAspect="1"/>
+          </p:cNvSpPr>
+          <p:nvPr>
+            <p:ph type="sldImg"/>
+          </p:nvPr>
+        </p:nvSpPr>
+        <p:spPr/>
+      </p:sp>
+      <p:sp>
+        <p:nvSpPr>
+          <p:cNvPr id="3" name="Notes Placeholder 2"/>
+          <p:cNvSpPr>
+            <a:spLocks noGrp="1"/>
+          </p:cNvSpPr>
+          <p:nvPr>
+            <p:ph type="body" idx="1"/>
+          </p:nvPr>
+        </p:nvSpPr>
+        <p:spPr/>
+        <p:txBody>
+          <a:bodyPr/>
+          <a:lstStyle/>
+          <a:p>
+            <a:r>
+              <a:rPr lang="en-US" dirty="0" err="1"/>
+              <a:t>mprof</a:t>
+            </a:r>
+            <a:r>
+              <a:rPr lang="en-US" baseline="0" dirty="0"/>
+              <a:t> script is part of the memory-profiler module installed in the Python directory Python???/scripts</a:t>
+            </a:r>
+          </a:p>
+          <a:p>
+            <a:endParaRPr lang="en-US" baseline="0" dirty="0"/>
+          </a:p>
+          <a:p>
+            <a:r>
+              <a:rPr lang="en-US" baseline="0" dirty="0"/>
+              <a:t>“</a:t>
+            </a:r>
+            <a:r>
+              <a:rPr lang="en-US" baseline="0" dirty="0" err="1"/>
+              <a:t>mprof</a:t>
+            </a:r>
+            <a:r>
+              <a:rPr lang="en-US" baseline="0" dirty="0"/>
+              <a:t> run” creates a file “mprofile_20220406123307.dat” (number is the date </a:t>
+            </a:r>
+            <a:r>
+              <a:rPr lang="en-US" baseline="0"/>
+              <a:t>and time)</a:t>
+            </a:r>
+            <a:endParaRPr lang="en-US" dirty="0"/>
+          </a:p>
+        </p:txBody>
+      </p:sp>
+      <p:sp>
+        <p:nvSpPr>
+          <p:cNvPr id="4" name="Slide Number Placeholder 3"/>
+          <p:cNvSpPr>
+            <a:spLocks noGrp="1"/>
+          </p:cNvSpPr>
+          <p:nvPr>
+            <p:ph type="sldNum" sz="quarter" idx="10"/>
+          </p:nvPr>
+        </p:nvSpPr>
+        <p:spPr/>
+        <p:txBody>
+          <a:bodyPr/>
+          <a:lstStyle/>
+          <a:p>
+            <a:fld id="{CD563DD8-32AB-41BE-B1C6-8EAC45222ACE}" type="slidenum">
+              <a:rPr lang="en-US" smtClean="0"/>
+              <a:t>29</a:t>
             </a:fld>
             <a:endParaRPr lang="en-US"/>
           </a:p>
@@ -1684,6 +1905,106 @@
           <a:bodyPr/>
           <a:lstStyle/>
           <a:p>
+            <a:r>
+              <a:rPr lang="en-US" dirty="0" err="1"/>
+              <a:t>IndexError</a:t>
+            </a:r>
+            <a:r>
+              <a:rPr lang="en-US" dirty="0"/>
+              <a:t> and </a:t>
+            </a:r>
+            <a:r>
+              <a:rPr lang="en-US" dirty="0" err="1"/>
+              <a:t>StopIteration</a:t>
+            </a:r>
+            <a:r>
+              <a:rPr lang="en-US" dirty="0"/>
+              <a:t> will both stop iterator </a:t>
+            </a:r>
+            <a:endParaRPr lang="da-DK" dirty="0"/>
+          </a:p>
+        </p:txBody>
+      </p:sp>
+      <p:sp>
+        <p:nvSpPr>
+          <p:cNvPr id="4" name="Slide Number Placeholder 3"/>
+          <p:cNvSpPr>
+            <a:spLocks noGrp="1"/>
+          </p:cNvSpPr>
+          <p:nvPr>
+            <p:ph type="sldNum" sz="quarter" idx="5"/>
+          </p:nvPr>
+        </p:nvSpPr>
+        <p:spPr/>
+        <p:txBody>
+          <a:bodyPr/>
+          <a:lstStyle/>
+          <a:p>
+            <a:fld id="{CD563DD8-32AB-41BE-B1C6-8EAC45222ACE}" type="slidenum">
+              <a:rPr lang="en-US" smtClean="0"/>
+              <a:t>11</a:t>
+            </a:fld>
+            <a:endParaRPr lang="en-US"/>
+          </a:p>
+        </p:txBody>
+      </p:sp>
+    </p:spTree>
+    <p:extLst>
+      <p:ext uri="{BB962C8B-B14F-4D97-AF65-F5344CB8AC3E}">
+        <p14:creationId xmlns:p14="http://schemas.microsoft.com/office/powerpoint/2010/main" val="2077063001"/>
+      </p:ext>
+    </p:extLst>
+  </p:cSld>
+  <p:clrMapOvr>
+    <a:masterClrMapping/>
+  </p:clrMapOvr>
+</p:notes>
+</file>
+
+<file path=ppt/notesSlides/notesSlide7.xml><?xml version="1.0" encoding="utf-8"?>
+<p:notes xmlns:a="http://schemas.openxmlformats.org/drawingml/2006/main" xmlns:r="http://schemas.openxmlformats.org/officeDocument/2006/relationships" xmlns:p="http://schemas.openxmlformats.org/presentationml/2006/main">
+  <p:cSld>
+    <p:spTree>
+      <p:nvGrpSpPr>
+        <p:cNvPr id="1" name=""/>
+        <p:cNvGrpSpPr/>
+        <p:nvPr/>
+      </p:nvGrpSpPr>
+      <p:grpSpPr>
+        <a:xfrm>
+          <a:off x="0" y="0"/>
+          <a:ext cx="0" cy="0"/>
+          <a:chOff x="0" y="0"/>
+          <a:chExt cx="0" cy="0"/>
+        </a:xfrm>
+      </p:grpSpPr>
+      <p:sp>
+        <p:nvSpPr>
+          <p:cNvPr id="2" name="Slide Image Placeholder 1"/>
+          <p:cNvSpPr>
+            <a:spLocks noGrp="1" noRot="1" noChangeAspect="1"/>
+          </p:cNvSpPr>
+          <p:nvPr>
+            <p:ph type="sldImg"/>
+          </p:nvPr>
+        </p:nvSpPr>
+        <p:spPr/>
+      </p:sp>
+      <p:sp>
+        <p:nvSpPr>
+          <p:cNvPr id="3" name="Notes Placeholder 2"/>
+          <p:cNvSpPr>
+            <a:spLocks noGrp="1"/>
+          </p:cNvSpPr>
+          <p:nvPr>
+            <p:ph type="body" idx="1"/>
+          </p:nvPr>
+        </p:nvSpPr>
+        <p:spPr/>
+        <p:txBody>
+          <a:bodyPr/>
+          <a:lstStyle/>
+          <a:p>
             <a:endParaRPr lang="en-US" dirty="0"/>
           </a:p>
         </p:txBody>
@@ -1705,7 +2026,7 @@
           <a:p>
             <a:fld id="{CD563DD8-32AB-41BE-B1C6-8EAC45222ACE}" type="slidenum">
               <a:rPr lang="en-US" smtClean="0"/>
-              <a:t>15</a:t>
+              <a:t>16</a:t>
             </a:fld>
             <a:endParaRPr lang="en-US"/>
           </a:p>
@@ -1724,7 +2045,7 @@
 </p:notes>
 </file>
 
-<file path=ppt/notesSlides/notesSlide7.xml><?xml version="1.0" encoding="utf-8"?>
+<file path=ppt/notesSlides/notesSlide8.xml><?xml version="1.0" encoding="utf-8"?>
 <p:notes xmlns:a="http://schemas.openxmlformats.org/drawingml/2006/main" xmlns:r="http://schemas.openxmlformats.org/officeDocument/2006/relationships" xmlns:p="http://schemas.openxmlformats.org/presentationml/2006/main">
   <p:cSld>
     <p:spTree>
@@ -1789,7 +2110,7 @@
           <a:p>
             <a:fld id="{CD563DD8-32AB-41BE-B1C6-8EAC45222ACE}" type="slidenum">
               <a:rPr lang="en-US" smtClean="0"/>
-              <a:t>21</a:t>
+              <a:t>22</a:t>
             </a:fld>
             <a:endParaRPr lang="en-US"/>
           </a:p>
@@ -1799,106 +2120,6 @@
     <p:extLst>
       <p:ext uri="{BB962C8B-B14F-4D97-AF65-F5344CB8AC3E}">
         <p14:creationId xmlns:p14="http://schemas.microsoft.com/office/powerpoint/2010/main" val="4192585091"/>
-      </p:ext>
-    </p:extLst>
-  </p:cSld>
-  <p:clrMapOvr>
-    <a:masterClrMapping/>
-  </p:clrMapOvr>
-</p:notes>
-</file>
-
-<file path=ppt/notesSlides/notesSlide8.xml><?xml version="1.0" encoding="utf-8"?>
-<p:notes xmlns:a="http://schemas.openxmlformats.org/drawingml/2006/main" xmlns:r="http://schemas.openxmlformats.org/officeDocument/2006/relationships" xmlns:p="http://schemas.openxmlformats.org/presentationml/2006/main">
-  <p:cSld>
-    <p:spTree>
-      <p:nvGrpSpPr>
-        <p:cNvPr id="1" name=""/>
-        <p:cNvGrpSpPr/>
-        <p:nvPr/>
-      </p:nvGrpSpPr>
-      <p:grpSpPr>
-        <a:xfrm>
-          <a:off x="0" y="0"/>
-          <a:ext cx="0" cy="0"/>
-          <a:chOff x="0" y="0"/>
-          <a:chExt cx="0" cy="0"/>
-        </a:xfrm>
-      </p:grpSpPr>
-      <p:sp>
-        <p:nvSpPr>
-          <p:cNvPr id="2" name="Slide Image Placeholder 1"/>
-          <p:cNvSpPr>
-            <a:spLocks noGrp="1" noRot="1" noChangeAspect="1"/>
-          </p:cNvSpPr>
-          <p:nvPr>
-            <p:ph type="sldImg"/>
-          </p:nvPr>
-        </p:nvSpPr>
-        <p:spPr/>
-      </p:sp>
-      <p:sp>
-        <p:nvSpPr>
-          <p:cNvPr id="3" name="Notes Placeholder 2"/>
-          <p:cNvSpPr>
-            <a:spLocks noGrp="1"/>
-          </p:cNvSpPr>
-          <p:nvPr>
-            <p:ph type="body" idx="1"/>
-          </p:nvPr>
-        </p:nvSpPr>
-        <p:spPr/>
-        <p:txBody>
-          <a:bodyPr/>
-          <a:lstStyle/>
-          <a:p>
-            <a:r>
-              <a:rPr lang="en-US" dirty="0"/>
-              <a:t>without </a:t>
-            </a:r>
-            <a:r>
-              <a:rPr lang="en-US" b="1" dirty="0"/>
-              <a:t>from</a:t>
-            </a:r>
-            <a:r>
-              <a:rPr lang="en-US" b="0" dirty="0"/>
-              <a:t> would print</a:t>
-            </a:r>
-            <a:r>
-              <a:rPr lang="en-US" b="0" baseline="0" dirty="0"/>
-              <a:t> a list of ‘generators’ for each child</a:t>
-            </a:r>
-            <a:endParaRPr lang="en-US" b="1" dirty="0"/>
-          </a:p>
-        </p:txBody>
-      </p:sp>
-      <p:sp>
-        <p:nvSpPr>
-          <p:cNvPr id="4" name="Slide Number Placeholder 3"/>
-          <p:cNvSpPr>
-            <a:spLocks noGrp="1"/>
-          </p:cNvSpPr>
-          <p:nvPr>
-            <p:ph type="sldNum" sz="quarter" idx="10"/>
-          </p:nvPr>
-        </p:nvSpPr>
-        <p:spPr/>
-        <p:txBody>
-          <a:bodyPr/>
-          <a:lstStyle/>
-          <a:p>
-            <a:fld id="{CD563DD8-32AB-41BE-B1C6-8EAC45222ACE}" type="slidenum">
-              <a:rPr lang="en-US" smtClean="0"/>
-              <a:t>23</a:t>
-            </a:fld>
-            <a:endParaRPr lang="en-US"/>
-          </a:p>
-        </p:txBody>
-      </p:sp>
-    </p:spTree>
-    <p:extLst>
-      <p:ext uri="{BB962C8B-B14F-4D97-AF65-F5344CB8AC3E}">
-        <p14:creationId xmlns:p14="http://schemas.microsoft.com/office/powerpoint/2010/main" val="3114011708"/>
       </p:ext>
     </p:extLst>
   </p:cSld>
@@ -1952,7 +2173,23 @@
           <a:bodyPr/>
           <a:lstStyle/>
           <a:p>
-            <a:endParaRPr lang="en-US" dirty="0"/>
+            <a:r>
+              <a:rPr lang="en-US" dirty="0"/>
+              <a:t>without </a:t>
+            </a:r>
+            <a:r>
+              <a:rPr lang="en-US" b="1" dirty="0"/>
+              <a:t>from</a:t>
+            </a:r>
+            <a:r>
+              <a:rPr lang="en-US" b="0" dirty="0"/>
+              <a:t> would print</a:t>
+            </a:r>
+            <a:r>
+              <a:rPr lang="en-US" b="0" baseline="0" dirty="0"/>
+              <a:t> a list of ‘generators’ for each child</a:t>
+            </a:r>
+            <a:endParaRPr lang="en-US" b="1" dirty="0"/>
           </a:p>
         </p:txBody>
       </p:sp>
@@ -1973,7 +2210,7 @@
           <a:p>
             <a:fld id="{CD563DD8-32AB-41BE-B1C6-8EAC45222ACE}" type="slidenum">
               <a:rPr lang="en-US" smtClean="0"/>
-              <a:t>25</a:t>
+              <a:t>24</a:t>
             </a:fld>
             <a:endParaRPr lang="en-US"/>
           </a:p>
@@ -1982,7 +2219,7 @@
     </p:spTree>
     <p:extLst>
       <p:ext uri="{BB962C8B-B14F-4D97-AF65-F5344CB8AC3E}">
-        <p14:creationId xmlns:p14="http://schemas.microsoft.com/office/powerpoint/2010/main" val="3336099653"/>
+        <p14:creationId xmlns:p14="http://schemas.microsoft.com/office/powerpoint/2010/main" val="3114011708"/>
       </p:ext>
     </p:extLst>
   </p:cSld>
@@ -2129,7 +2366,7 @@
           <a:p>
             <a:fld id="{0560A9CD-0304-4E0B-9E82-E7E0115DE05B}" type="datetimeFigureOut">
               <a:rPr lang="en-US" smtClean="0"/>
-              <a:t>4/6/2022</a:t>
+              <a:t>4/10/2023</a:t>
             </a:fld>
             <a:endParaRPr lang="en-US"/>
           </a:p>
@@ -2297,7 +2534,7 @@
           <a:p>
             <a:fld id="{0560A9CD-0304-4E0B-9E82-E7E0115DE05B}" type="datetimeFigureOut">
               <a:rPr lang="en-US" smtClean="0"/>
-              <a:t>4/6/2022</a:t>
+              <a:t>4/10/2023</a:t>
             </a:fld>
             <a:endParaRPr lang="en-US"/>
           </a:p>
@@ -2475,7 +2712,7 @@
           <a:p>
             <a:fld id="{0560A9CD-0304-4E0B-9E82-E7E0115DE05B}" type="datetimeFigureOut">
               <a:rPr lang="en-US" smtClean="0"/>
-              <a:t>4/6/2022</a:t>
+              <a:t>4/10/2023</a:t>
             </a:fld>
             <a:endParaRPr lang="en-US"/>
           </a:p>
@@ -2658,7 +2895,7 @@
           <a:p>
             <a:fld id="{0560A9CD-0304-4E0B-9E82-E7E0115DE05B}" type="datetimeFigureOut">
               <a:rPr lang="en-US" smtClean="0"/>
-              <a:t>4/6/2022</a:t>
+              <a:t>4/10/2023</a:t>
             </a:fld>
             <a:endParaRPr lang="en-US"/>
           </a:p>
@@ -2903,7 +3140,7 @@
           <a:p>
             <a:fld id="{0560A9CD-0304-4E0B-9E82-E7E0115DE05B}" type="datetimeFigureOut">
               <a:rPr lang="en-US" smtClean="0"/>
-              <a:t>4/6/2022</a:t>
+              <a:t>4/10/2023</a:t>
             </a:fld>
             <a:endParaRPr lang="en-US"/>
           </a:p>
@@ -3132,7 +3369,7 @@
           <a:p>
             <a:fld id="{0560A9CD-0304-4E0B-9E82-E7E0115DE05B}" type="datetimeFigureOut">
               <a:rPr lang="en-US" smtClean="0"/>
-              <a:t>4/6/2022</a:t>
+              <a:t>4/10/2023</a:t>
             </a:fld>
             <a:endParaRPr lang="en-US"/>
           </a:p>
@@ -3496,7 +3733,7 @@
           <a:p>
             <a:fld id="{0560A9CD-0304-4E0B-9E82-E7E0115DE05B}" type="datetimeFigureOut">
               <a:rPr lang="en-US" smtClean="0"/>
-              <a:t>4/6/2022</a:t>
+              <a:t>4/10/2023</a:t>
             </a:fld>
             <a:endParaRPr lang="en-US"/>
           </a:p>
@@ -3613,7 +3850,7 @@
           <a:p>
             <a:fld id="{0560A9CD-0304-4E0B-9E82-E7E0115DE05B}" type="datetimeFigureOut">
               <a:rPr lang="en-US" smtClean="0"/>
-              <a:t>4/6/2022</a:t>
+              <a:t>4/10/2023</a:t>
             </a:fld>
             <a:endParaRPr lang="en-US"/>
           </a:p>
@@ -3708,7 +3945,7 @@
           <a:p>
             <a:fld id="{0560A9CD-0304-4E0B-9E82-E7E0115DE05B}" type="datetimeFigureOut">
               <a:rPr lang="en-US" smtClean="0"/>
-              <a:t>4/6/2022</a:t>
+              <a:t>4/10/2023</a:t>
             </a:fld>
             <a:endParaRPr lang="en-US"/>
           </a:p>
@@ -3983,7 +4220,7 @@
           <a:p>
             <a:fld id="{0560A9CD-0304-4E0B-9E82-E7E0115DE05B}" type="datetimeFigureOut">
               <a:rPr lang="en-US" smtClean="0"/>
-              <a:t>4/6/2022</a:t>
+              <a:t>4/10/2023</a:t>
             </a:fld>
             <a:endParaRPr lang="en-US"/>
           </a:p>
@@ -4235,7 +4472,7 @@
           <a:p>
             <a:fld id="{0560A9CD-0304-4E0B-9E82-E7E0115DE05B}" type="datetimeFigureOut">
               <a:rPr lang="en-US" smtClean="0"/>
-              <a:t>4/6/2022</a:t>
+              <a:t>4/10/2023</a:t>
             </a:fld>
             <a:endParaRPr lang="en-US"/>
           </a:p>
@@ -4446,7 +4683,7 @@
           <a:p>
             <a:fld id="{0560A9CD-0304-4E0B-9E82-E7E0115DE05B}" type="datetimeFigureOut">
               <a:rPr lang="en-US" smtClean="0"/>
-              <a:t>4/6/2022</a:t>
+              <a:t>4/10/2023</a:t>
             </a:fld>
             <a:endParaRPr lang="en-US"/>
           </a:p>
@@ -6288,6 +6525,2317 @@
       </p:grpSpPr>
       <p:sp>
         <p:nvSpPr>
+          <p:cNvPr id="2" name="Title 1">
+            <a:extLst>
+              <a:ext uri="{FF2B5EF4-FFF2-40B4-BE49-F238E27FC236}">
+                <a16:creationId xmlns:a16="http://schemas.microsoft.com/office/drawing/2014/main" id="{B820491B-72BA-CDFD-9002-D0AAE9D0F05F}"/>
+              </a:ext>
+            </a:extLst>
+          </p:cNvPr>
+          <p:cNvSpPr>
+            <a:spLocks noGrp="1"/>
+          </p:cNvSpPr>
+          <p:nvPr>
+            <p:ph type="title"/>
+          </p:nvPr>
+        </p:nvSpPr>
+        <p:spPr>
+          <a:xfrm>
+            <a:off x="369277" y="119419"/>
+            <a:ext cx="8489588" cy="1325563"/>
+          </a:xfrm>
+        </p:spPr>
+        <p:txBody>
+          <a:bodyPr/>
+          <a:lstStyle/>
+          <a:p>
+            <a:r>
+              <a:rPr lang="en-US" dirty="0"/>
+              <a:t>The old sequence iteration protocol</a:t>
+            </a:r>
+            <a:endParaRPr lang="da-DK" dirty="0"/>
+          </a:p>
+        </p:txBody>
+      </p:sp>
+      <p:sp>
+        <p:nvSpPr>
+          <p:cNvPr id="3" name="Content Placeholder 2">
+            <a:extLst>
+              <a:ext uri="{FF2B5EF4-FFF2-40B4-BE49-F238E27FC236}">
+                <a16:creationId xmlns:a16="http://schemas.microsoft.com/office/drawing/2014/main" id="{2091BD0F-6025-7088-2C6D-F3D110B0CEC2}"/>
+              </a:ext>
+            </a:extLst>
+          </p:cNvPr>
+          <p:cNvSpPr>
+            <a:spLocks noGrp="1"/>
+          </p:cNvSpPr>
+          <p:nvPr>
+            <p:ph idx="1"/>
+          </p:nvPr>
+        </p:nvSpPr>
+        <p:spPr>
+          <a:xfrm>
+            <a:off x="8000434" y="1825625"/>
+            <a:ext cx="4103077" cy="4351338"/>
+          </a:xfrm>
+        </p:spPr>
+        <p:txBody>
+          <a:bodyPr>
+            <a:normAutofit/>
+          </a:bodyPr>
+          <a:lstStyle/>
+          <a:p>
+            <a:pPr>
+              <a:spcAft>
+                <a:spcPts val="1200"/>
+              </a:spcAft>
+            </a:pPr>
+            <a:r>
+              <a:rPr lang="en-US" sz="2600" dirty="0"/>
+              <a:t>Class with no </a:t>
+            </a:r>
+            <a:r>
+              <a:rPr lang="en-US" sz="2600" dirty="0">
+                <a:latin typeface="Courier"/>
+              </a:rPr>
+              <a:t>__</a:t>
+            </a:r>
+            <a:r>
+              <a:rPr lang="en-US" sz="2600" dirty="0" err="1">
+                <a:latin typeface="Courier"/>
+              </a:rPr>
+              <a:t>iter</a:t>
+            </a:r>
+            <a:r>
+              <a:rPr lang="en-US" sz="2600" dirty="0">
+                <a:latin typeface="Courier"/>
+              </a:rPr>
+              <a:t>__</a:t>
+            </a:r>
+            <a:r>
+              <a:rPr lang="en-US" sz="2600" dirty="0"/>
+              <a:t> method but supporting index lookup with </a:t>
+            </a:r>
+            <a:r>
+              <a:rPr lang="en-US" sz="2600" dirty="0">
+                <a:latin typeface="Courier"/>
+              </a:rPr>
+              <a:t>__</a:t>
+            </a:r>
+            <a:r>
+              <a:rPr lang="en-US" sz="2600" dirty="0" err="1">
+                <a:latin typeface="Courier"/>
+              </a:rPr>
+              <a:t>getitem</a:t>
+            </a:r>
+            <a:r>
+              <a:rPr lang="en-US" sz="2600" dirty="0">
+                <a:latin typeface="Courier"/>
+              </a:rPr>
+              <a:t>__</a:t>
+            </a:r>
+          </a:p>
+          <a:p>
+            <a:pPr>
+              <a:spcBef>
+                <a:spcPts val="0"/>
+              </a:spcBef>
+              <a:spcAft>
+                <a:spcPts val="1200"/>
+              </a:spcAft>
+            </a:pPr>
+            <a:r>
+              <a:rPr lang="en-US" sz="2600" dirty="0"/>
+              <a:t>Python automatically creates iterator looking up </a:t>
+            </a:r>
+            <a:br>
+              <a:rPr lang="en-US" sz="2600" dirty="0"/>
+            </a:br>
+            <a:r>
+              <a:rPr lang="en-US" sz="2600" dirty="0"/>
+              <a:t>   </a:t>
+            </a:r>
+            <a:r>
+              <a:rPr lang="en-US" sz="2600" i="1" dirty="0"/>
+              <a:t>obj</a:t>
+            </a:r>
+            <a:r>
+              <a:rPr lang="en-US" sz="2600" dirty="0"/>
+              <a:t>[0], </a:t>
+            </a:r>
+            <a:r>
+              <a:rPr lang="en-US" sz="2600" i="1" dirty="0"/>
+              <a:t>obj</a:t>
+            </a:r>
+            <a:r>
+              <a:rPr lang="en-US" sz="2600" dirty="0"/>
+              <a:t>[1], </a:t>
+            </a:r>
+            <a:r>
+              <a:rPr lang="en-US" sz="2600" i="1" dirty="0"/>
+              <a:t>obj</a:t>
+            </a:r>
+            <a:r>
+              <a:rPr lang="en-US" sz="2600" dirty="0"/>
+              <a:t>[2], ... </a:t>
+            </a:r>
+            <a:br>
+              <a:rPr lang="en-US" sz="2600" dirty="0"/>
+            </a:br>
+            <a:r>
+              <a:rPr lang="en-US" sz="2600" dirty="0"/>
+              <a:t>until </a:t>
+            </a:r>
+            <a:r>
+              <a:rPr lang="en-US" sz="2600" dirty="0" err="1"/>
+              <a:t>IndexError</a:t>
+            </a:r>
+            <a:r>
+              <a:rPr lang="en-US" sz="2600" dirty="0"/>
+              <a:t> raised</a:t>
+            </a:r>
+          </a:p>
+          <a:p>
+            <a:pPr>
+              <a:spcBef>
+                <a:spcPts val="0"/>
+              </a:spcBef>
+            </a:pPr>
+            <a:r>
+              <a:rPr lang="en-US" sz="2600" dirty="0"/>
+              <a:t>Keyword </a:t>
+            </a:r>
+            <a:r>
+              <a:rPr lang="en-US" sz="2600" dirty="0">
+                <a:latin typeface="Courier"/>
+              </a:rPr>
+              <a:t>in</a:t>
+            </a:r>
+            <a:r>
+              <a:rPr lang="en-US" sz="2600" dirty="0"/>
+              <a:t> falls back to iteration if no method </a:t>
+            </a:r>
+            <a:r>
+              <a:rPr lang="en-US" sz="2600" dirty="0">
+                <a:latin typeface="Courier"/>
+              </a:rPr>
+              <a:t>__contains__</a:t>
+            </a:r>
+            <a:endParaRPr lang="da-DK" sz="2600" dirty="0">
+              <a:latin typeface="Courier"/>
+            </a:endParaRPr>
+          </a:p>
+        </p:txBody>
+      </p:sp>
+      <p:graphicFrame>
+        <p:nvGraphicFramePr>
+          <p:cNvPr id="6" name="Table 5">
+            <a:extLst>
+              <a:ext uri="{FF2B5EF4-FFF2-40B4-BE49-F238E27FC236}">
+                <a16:creationId xmlns:a16="http://schemas.microsoft.com/office/drawing/2014/main" id="{742EE9F5-C111-723C-E4E0-65611ABA84FF}"/>
+              </a:ext>
+            </a:extLst>
+          </p:cNvPr>
+          <p:cNvGraphicFramePr>
+            <a:graphicFrameLocks noGrp="1"/>
+          </p:cNvGraphicFramePr>
+          <p:nvPr>
+            <p:extLst>
+              <p:ext uri="{D42A27DB-BD31-4B8C-83A1-F6EECF244321}">
+                <p14:modId xmlns:p14="http://schemas.microsoft.com/office/powerpoint/2010/main" val="1566333296"/>
+              </p:ext>
+            </p:extLst>
+          </p:nvPr>
+        </p:nvGraphicFramePr>
+        <p:xfrm>
+          <a:off x="369277" y="1520805"/>
+          <a:ext cx="7377748" cy="4892040"/>
+        </p:xfrm>
+        <a:graphic>
+          <a:graphicData uri="http://schemas.openxmlformats.org/drawingml/2006/table">
+            <a:tbl>
+              <a:tblPr firstRow="1" bandRow="1">
+                <a:tableStyleId>{5C22544A-7EE6-4342-B048-85BDC9FD1C3A}</a:tableStyleId>
+              </a:tblPr>
+              <a:tblGrid>
+                <a:gridCol w="4972368">
+                  <a:extLst>
+                    <a:ext uri="{9D8B030D-6E8A-4147-A177-3AD203B41FA5}">
+                      <a16:colId xmlns:a16="http://schemas.microsoft.com/office/drawing/2014/main" val="1873682825"/>
+                    </a:ext>
+                  </a:extLst>
+                </a:gridCol>
+                <a:gridCol w="2405380">
+                  <a:extLst>
+                    <a:ext uri="{9D8B030D-6E8A-4147-A177-3AD203B41FA5}">
+                      <a16:colId xmlns:a16="http://schemas.microsoft.com/office/drawing/2014/main" val="1163376990"/>
+                    </a:ext>
+                  </a:extLst>
+                </a:gridCol>
+              </a:tblGrid>
+              <a:tr h="173248">
+                <a:tc gridSpan="2">
+                  <a:txBody>
+                    <a:bodyPr/>
+                    <a:lstStyle/>
+                    <a:p>
+                      <a:r>
+                        <a:rPr lang="da-DK" sz="1600" b="1" dirty="0" err="1">
+                          <a:latin typeface="Courier New" panose="02070309020205020404" pitchFamily="49" charset="0"/>
+                          <a:cs typeface="Courier New" panose="02070309020205020404" pitchFamily="49" charset="0"/>
+                        </a:rPr>
+                        <a:t>Python</a:t>
+                      </a:r>
+                      <a:r>
+                        <a:rPr lang="da-DK" sz="1600" b="1" dirty="0">
+                          <a:latin typeface="Courier New" panose="02070309020205020404" pitchFamily="49" charset="0"/>
+                          <a:cs typeface="Courier New" panose="02070309020205020404" pitchFamily="49" charset="0"/>
+                        </a:rPr>
+                        <a:t> </a:t>
+                      </a:r>
+                      <a:r>
+                        <a:rPr lang="da-DK" sz="1600" b="1" dirty="0" err="1">
+                          <a:latin typeface="Courier New" panose="02070309020205020404" pitchFamily="49" charset="0"/>
+                          <a:cs typeface="Courier New" panose="02070309020205020404" pitchFamily="49" charset="0"/>
+                        </a:rPr>
+                        <a:t>shell</a:t>
+                      </a:r>
+                      <a:endParaRPr lang="da-DK" sz="1600" b="1" dirty="0">
+                        <a:latin typeface="Courier New" panose="02070309020205020404" pitchFamily="49" charset="0"/>
+                        <a:cs typeface="Courier New" panose="02070309020205020404" pitchFamily="49" charset="0"/>
+                      </a:endParaRPr>
+                    </a:p>
+                  </a:txBody>
+                  <a:tcPr anchor="ctr">
+                    <a:lnL w="6350" cap="flat" cmpd="sng" algn="ctr">
+                      <a:solidFill>
+                        <a:schemeClr val="tx1"/>
+                      </a:solidFill>
+                      <a:prstDash val="solid"/>
+                      <a:round/>
+                      <a:headEnd type="none" w="med" len="med"/>
+                      <a:tailEnd type="none" w="med" len="med"/>
+                    </a:lnL>
+                    <a:lnR w="6350" cap="flat" cmpd="sng" algn="ctr">
+                      <a:solidFill>
+                        <a:schemeClr val="tx1"/>
+                      </a:solidFill>
+                      <a:prstDash val="solid"/>
+                      <a:round/>
+                      <a:headEnd type="none" w="med" len="med"/>
+                      <a:tailEnd type="none" w="med" len="med"/>
+                    </a:lnR>
+                    <a:lnT w="6350" cap="flat" cmpd="sng" algn="ctr">
+                      <a:solidFill>
+                        <a:schemeClr val="tx1"/>
+                      </a:solidFill>
+                      <a:prstDash val="solid"/>
+                      <a:round/>
+                      <a:headEnd type="none" w="med" len="med"/>
+                      <a:tailEnd type="none" w="med" len="med"/>
+                    </a:lnT>
+                    <a:lnB w="6350" cap="flat" cmpd="sng" algn="ctr">
+                      <a:solidFill>
+                        <a:schemeClr val="tx1"/>
+                      </a:solidFill>
+                      <a:prstDash val="solid"/>
+                      <a:round/>
+                      <a:headEnd type="none" w="med" len="med"/>
+                      <a:tailEnd type="none" w="med" len="med"/>
+                    </a:lnB>
+                    <a:lnTlToBr w="12700" cmpd="sng">
+                      <a:noFill/>
+                      <a:prstDash val="solid"/>
+                    </a:lnTlToBr>
+                    <a:lnBlToTr w="12700" cmpd="sng">
+                      <a:noFill/>
+                      <a:prstDash val="solid"/>
+                    </a:lnBlToTr>
+                    <a:solidFill>
+                      <a:srgbClr val="C00000"/>
+                    </a:solidFill>
+                  </a:tcPr>
+                </a:tc>
+                <a:tc hMerge="1">
+                  <a:txBody>
+                    <a:bodyPr/>
+                    <a:lstStyle/>
+                    <a:p>
+                      <a:endParaRPr lang="da-DK" sz="1800" b="1" dirty="0">
+                        <a:latin typeface="Courier New" panose="02070309020205020404" pitchFamily="49" charset="0"/>
+                        <a:cs typeface="Courier New" panose="02070309020205020404" pitchFamily="49" charset="0"/>
+                      </a:endParaRPr>
+                    </a:p>
+                  </a:txBody>
+                  <a:tcPr anchor="ctr">
+                    <a:lnL w="6350" cap="flat" cmpd="sng" algn="ctr">
+                      <a:solidFill>
+                        <a:schemeClr val="tx1"/>
+                      </a:solidFill>
+                      <a:prstDash val="solid"/>
+                      <a:round/>
+                      <a:headEnd type="none" w="med" len="med"/>
+                      <a:tailEnd type="none" w="med" len="med"/>
+                    </a:lnL>
+                    <a:lnR w="6350" cap="flat" cmpd="sng" algn="ctr">
+                      <a:solidFill>
+                        <a:schemeClr val="tx1"/>
+                      </a:solidFill>
+                      <a:prstDash val="solid"/>
+                      <a:round/>
+                      <a:headEnd type="none" w="med" len="med"/>
+                      <a:tailEnd type="none" w="med" len="med"/>
+                    </a:lnR>
+                    <a:lnT w="6350" cap="flat" cmpd="sng" algn="ctr">
+                      <a:solidFill>
+                        <a:schemeClr val="tx1"/>
+                      </a:solidFill>
+                      <a:prstDash val="solid"/>
+                      <a:round/>
+                      <a:headEnd type="none" w="med" len="med"/>
+                      <a:tailEnd type="none" w="med" len="med"/>
+                    </a:lnT>
+                    <a:lnB w="6350" cap="flat" cmpd="sng" algn="ctr">
+                      <a:solidFill>
+                        <a:schemeClr val="tx1"/>
+                      </a:solidFill>
+                      <a:prstDash val="solid"/>
+                      <a:round/>
+                      <a:headEnd type="none" w="med" len="med"/>
+                      <a:tailEnd type="none" w="med" len="med"/>
+                    </a:lnB>
+                    <a:lnTlToBr w="12700" cmpd="sng">
+                      <a:noFill/>
+                      <a:prstDash val="solid"/>
+                    </a:lnTlToBr>
+                    <a:lnBlToTr w="12700" cmpd="sng">
+                      <a:noFill/>
+                      <a:prstDash val="solid"/>
+                    </a:lnBlToTr>
+                    <a:solidFill>
+                      <a:srgbClr val="C00000"/>
+                    </a:solidFill>
+                  </a:tcPr>
+                </a:tc>
+                <a:extLst>
+                  <a:ext uri="{0D108BD9-81ED-4DB2-BD59-A6C34878D82A}">
+                    <a16:rowId xmlns:a16="http://schemas.microsoft.com/office/drawing/2014/main" val="3330819881"/>
+                  </a:ext>
+                </a:extLst>
+              </a:tr>
+              <a:tr h="793619">
+                <a:tc>
+                  <a:txBody>
+                    <a:bodyPr/>
+                    <a:lstStyle/>
+                    <a:p>
+                      <a:pPr marL="266700" marR="0" lvl="0" indent="-266700" algn="l" defTabSz="914400" rtl="0" eaLnBrk="1" fontAlgn="auto" latinLnBrk="0" hangingPunct="1">
+                        <a:lnSpc>
+                          <a:spcPct val="100000"/>
+                        </a:lnSpc>
+                        <a:spcBef>
+                          <a:spcPts val="0"/>
+                        </a:spcBef>
+                        <a:spcAft>
+                          <a:spcPts val="600"/>
+                        </a:spcAft>
+                        <a:buClr>
+                          <a:srgbClr val="C00000"/>
+                        </a:buClr>
+                        <a:buSzPct val="100000"/>
+                        <a:buFont typeface="Courier New" panose="02070309020205020404" pitchFamily="49" charset="0"/>
+                        <a:buChar char="&gt;"/>
+                        <a:tabLst/>
+                        <a:defRPr/>
+                      </a:pPr>
+                      <a:r>
+                        <a:rPr lang="en-US" sz="1600" b="1" baseline="0" dirty="0">
+                          <a:solidFill>
+                            <a:schemeClr val="accent1">
+                              <a:lumMod val="50000"/>
+                            </a:schemeClr>
+                          </a:solidFill>
+                          <a:latin typeface="Courier New" panose="02070309020205020404" pitchFamily="49" charset="0"/>
+                          <a:cs typeface="Courier New" panose="02070309020205020404" pitchFamily="49" charset="0"/>
+                        </a:rPr>
+                        <a:t>class</a:t>
+                      </a:r>
+                      <a:r>
+                        <a:rPr lang="en-US" sz="1600" b="1" baseline="0" dirty="0">
+                          <a:solidFill>
+                            <a:schemeClr val="tx1"/>
+                          </a:solidFill>
+                          <a:latin typeface="Courier New" panose="02070309020205020404" pitchFamily="49" charset="0"/>
+                          <a:cs typeface="Courier New" panose="02070309020205020404" pitchFamily="49" charset="0"/>
+                        </a:rPr>
+                        <a:t> </a:t>
+                      </a:r>
+                      <a:r>
+                        <a:rPr lang="en-US" sz="1600" b="1" baseline="0" dirty="0" err="1">
+                          <a:solidFill>
+                            <a:schemeClr val="tx1"/>
+                          </a:solidFill>
+                          <a:latin typeface="Courier New" panose="02070309020205020404" pitchFamily="49" charset="0"/>
+                          <a:cs typeface="Courier New" panose="02070309020205020404" pitchFamily="49" charset="0"/>
+                        </a:rPr>
+                        <a:t>Odd_numbers</a:t>
+                      </a:r>
+                      <a:r>
+                        <a:rPr lang="en-US" sz="1600" b="1" baseline="0" dirty="0">
+                          <a:solidFill>
+                            <a:schemeClr val="tx1"/>
+                          </a:solidFill>
+                          <a:latin typeface="Courier New" panose="02070309020205020404" pitchFamily="49" charset="0"/>
+                          <a:cs typeface="Courier New" panose="02070309020205020404" pitchFamily="49" charset="0"/>
+                        </a:rPr>
+                        <a:t>:</a:t>
+                      </a:r>
+                      <a:br>
+                        <a:rPr lang="en-US" sz="1600" b="1" baseline="0" dirty="0">
+                          <a:solidFill>
+                            <a:schemeClr val="tx1"/>
+                          </a:solidFill>
+                          <a:latin typeface="Courier New" panose="02070309020205020404" pitchFamily="49" charset="0"/>
+                          <a:cs typeface="Courier New" panose="02070309020205020404" pitchFamily="49" charset="0"/>
+                        </a:rPr>
+                      </a:br>
+                      <a:r>
+                        <a:rPr lang="en-US" sz="1600" b="1" baseline="0" dirty="0">
+                          <a:solidFill>
+                            <a:schemeClr val="tx1"/>
+                          </a:solidFill>
+                          <a:latin typeface="Courier New" panose="02070309020205020404" pitchFamily="49" charset="0"/>
+                          <a:cs typeface="Courier New" panose="02070309020205020404" pitchFamily="49" charset="0"/>
+                        </a:rPr>
+                        <a:t>    </a:t>
+                      </a:r>
+                      <a:r>
+                        <a:rPr lang="en-US" sz="1600" b="1" baseline="0" dirty="0">
+                          <a:solidFill>
+                            <a:schemeClr val="accent1">
+                              <a:lumMod val="50000"/>
+                            </a:schemeClr>
+                          </a:solidFill>
+                          <a:latin typeface="Courier New" panose="02070309020205020404" pitchFamily="49" charset="0"/>
+                          <a:cs typeface="Courier New" panose="02070309020205020404" pitchFamily="49" charset="0"/>
+                        </a:rPr>
+                        <a:t>def</a:t>
+                      </a:r>
+                      <a:r>
+                        <a:rPr lang="en-US" sz="1600" b="1" baseline="0" dirty="0">
+                          <a:solidFill>
+                            <a:schemeClr val="tx1"/>
+                          </a:solidFill>
+                          <a:latin typeface="Courier New" panose="02070309020205020404" pitchFamily="49" charset="0"/>
+                          <a:cs typeface="Courier New" panose="02070309020205020404" pitchFamily="49" charset="0"/>
+                        </a:rPr>
+                        <a:t> </a:t>
+                      </a:r>
+                      <a:r>
+                        <a:rPr lang="en-US" sz="1600" b="1" baseline="0" dirty="0">
+                          <a:solidFill>
+                            <a:srgbClr val="C00000"/>
+                          </a:solidFill>
+                          <a:latin typeface="Courier New" panose="02070309020205020404" pitchFamily="49" charset="0"/>
+                          <a:cs typeface="Courier New" panose="02070309020205020404" pitchFamily="49" charset="0"/>
+                        </a:rPr>
+                        <a:t>__</a:t>
+                      </a:r>
+                      <a:r>
+                        <a:rPr lang="en-US" sz="1600" b="1" baseline="0" dirty="0" err="1">
+                          <a:solidFill>
+                            <a:srgbClr val="C00000"/>
+                          </a:solidFill>
+                          <a:latin typeface="Courier New" panose="02070309020205020404" pitchFamily="49" charset="0"/>
+                          <a:cs typeface="Courier New" panose="02070309020205020404" pitchFamily="49" charset="0"/>
+                        </a:rPr>
+                        <a:t>getitem</a:t>
+                      </a:r>
+                      <a:r>
+                        <a:rPr lang="en-US" sz="1600" b="1" baseline="0" dirty="0">
+                          <a:solidFill>
+                            <a:srgbClr val="C00000"/>
+                          </a:solidFill>
+                          <a:latin typeface="Courier New" panose="02070309020205020404" pitchFamily="49" charset="0"/>
+                          <a:cs typeface="Courier New" panose="02070309020205020404" pitchFamily="49" charset="0"/>
+                        </a:rPr>
+                        <a:t>__</a:t>
+                      </a:r>
+                      <a:r>
+                        <a:rPr lang="en-US" sz="1600" b="1" baseline="0" dirty="0">
+                          <a:solidFill>
+                            <a:schemeClr val="tx1"/>
+                          </a:solidFill>
+                          <a:latin typeface="Courier New" panose="02070309020205020404" pitchFamily="49" charset="0"/>
+                          <a:cs typeface="Courier New" panose="02070309020205020404" pitchFamily="49" charset="0"/>
+                        </a:rPr>
+                        <a:t>(self, </a:t>
+                      </a:r>
+                      <a:r>
+                        <a:rPr lang="en-US" sz="1600" b="1" baseline="0" dirty="0" err="1">
+                          <a:solidFill>
+                            <a:schemeClr val="tx1"/>
+                          </a:solidFill>
+                          <a:latin typeface="Courier New" panose="02070309020205020404" pitchFamily="49" charset="0"/>
+                          <a:cs typeface="Courier New" panose="02070309020205020404" pitchFamily="49" charset="0"/>
+                        </a:rPr>
+                        <a:t>idx</a:t>
+                      </a:r>
+                      <a:r>
+                        <a:rPr lang="en-US" sz="1600" b="1" baseline="0" dirty="0">
+                          <a:solidFill>
+                            <a:schemeClr val="tx1"/>
+                          </a:solidFill>
+                          <a:latin typeface="Courier New" panose="02070309020205020404" pitchFamily="49" charset="0"/>
+                          <a:cs typeface="Courier New" panose="02070309020205020404" pitchFamily="49" charset="0"/>
+                        </a:rPr>
+                        <a:t>):</a:t>
+                      </a:r>
+                      <a:br>
+                        <a:rPr lang="en-US" sz="1600" b="1" baseline="0" dirty="0">
+                          <a:solidFill>
+                            <a:schemeClr val="tx1"/>
+                          </a:solidFill>
+                          <a:latin typeface="Courier New" panose="02070309020205020404" pitchFamily="49" charset="0"/>
+                          <a:cs typeface="Courier New" panose="02070309020205020404" pitchFamily="49" charset="0"/>
+                        </a:rPr>
+                      </a:br>
+                      <a:r>
+                        <a:rPr lang="en-US" sz="1600" b="1" baseline="0" dirty="0">
+                          <a:solidFill>
+                            <a:schemeClr val="accent6"/>
+                          </a:solidFill>
+                          <a:latin typeface="Courier New" panose="02070309020205020404" pitchFamily="49" charset="0"/>
+                          <a:cs typeface="Courier New" panose="02070309020205020404" pitchFamily="49" charset="0"/>
+                        </a:rPr>
+                        <a:t>        print('getting item', </a:t>
+                      </a:r>
+                      <a:r>
+                        <a:rPr lang="en-US" sz="1600" b="1" baseline="0" dirty="0" err="1">
+                          <a:solidFill>
+                            <a:schemeClr val="accent6"/>
+                          </a:solidFill>
+                          <a:latin typeface="Courier New" panose="02070309020205020404" pitchFamily="49" charset="0"/>
+                          <a:cs typeface="Courier New" panose="02070309020205020404" pitchFamily="49" charset="0"/>
+                        </a:rPr>
+                        <a:t>idx</a:t>
+                      </a:r>
+                      <a:r>
+                        <a:rPr lang="en-US" sz="1600" b="1" baseline="0" dirty="0">
+                          <a:solidFill>
+                            <a:schemeClr val="accent6"/>
+                          </a:solidFill>
+                          <a:latin typeface="Courier New" panose="02070309020205020404" pitchFamily="49" charset="0"/>
+                          <a:cs typeface="Courier New" panose="02070309020205020404" pitchFamily="49" charset="0"/>
+                        </a:rPr>
+                        <a:t>)</a:t>
+                      </a:r>
+                      <a:br>
+                        <a:rPr lang="en-US" sz="1600" b="1" baseline="0" dirty="0">
+                          <a:solidFill>
+                            <a:schemeClr val="accent6"/>
+                          </a:solidFill>
+                          <a:latin typeface="Courier New" panose="02070309020205020404" pitchFamily="49" charset="0"/>
+                          <a:cs typeface="Courier New" panose="02070309020205020404" pitchFamily="49" charset="0"/>
+                        </a:rPr>
+                      </a:br>
+                      <a:r>
+                        <a:rPr lang="en-US" sz="1600" b="1" baseline="0" dirty="0">
+                          <a:solidFill>
+                            <a:schemeClr val="tx1"/>
+                          </a:solidFill>
+                          <a:latin typeface="Courier New" panose="02070309020205020404" pitchFamily="49" charset="0"/>
+                          <a:cs typeface="Courier New" panose="02070309020205020404" pitchFamily="49" charset="0"/>
+                        </a:rPr>
+                        <a:t>        if not 0 &lt;= </a:t>
+                      </a:r>
+                      <a:r>
+                        <a:rPr lang="en-US" sz="1600" b="1" baseline="0" dirty="0" err="1">
+                          <a:solidFill>
+                            <a:schemeClr val="tx1"/>
+                          </a:solidFill>
+                          <a:latin typeface="Courier New" panose="02070309020205020404" pitchFamily="49" charset="0"/>
+                          <a:cs typeface="Courier New" panose="02070309020205020404" pitchFamily="49" charset="0"/>
+                        </a:rPr>
+                        <a:t>idx</a:t>
+                      </a:r>
+                      <a:r>
+                        <a:rPr lang="en-US" sz="1600" b="1" baseline="0" dirty="0">
+                          <a:solidFill>
+                            <a:schemeClr val="tx1"/>
+                          </a:solidFill>
+                          <a:latin typeface="Courier New" panose="02070309020205020404" pitchFamily="49" charset="0"/>
+                          <a:cs typeface="Courier New" panose="02070309020205020404" pitchFamily="49" charset="0"/>
+                        </a:rPr>
+                        <a:t> &lt; 10:</a:t>
+                      </a:r>
+                      <a:br>
+                        <a:rPr lang="en-US" sz="1600" b="1" baseline="0" dirty="0">
+                          <a:solidFill>
+                            <a:schemeClr val="tx1"/>
+                          </a:solidFill>
+                          <a:latin typeface="Courier New" panose="02070309020205020404" pitchFamily="49" charset="0"/>
+                          <a:cs typeface="Courier New" panose="02070309020205020404" pitchFamily="49" charset="0"/>
+                        </a:rPr>
+                      </a:br>
+                      <a:r>
+                        <a:rPr lang="en-US" sz="1600" b="1" baseline="0" dirty="0">
+                          <a:solidFill>
+                            <a:schemeClr val="tx1"/>
+                          </a:solidFill>
+                          <a:latin typeface="Courier New" panose="02070309020205020404" pitchFamily="49" charset="0"/>
+                          <a:cs typeface="Courier New" panose="02070309020205020404" pitchFamily="49" charset="0"/>
+                        </a:rPr>
+                        <a:t>            raise </a:t>
+                      </a:r>
+                      <a:r>
+                        <a:rPr lang="en-US" sz="1600" b="1" baseline="0" dirty="0" err="1">
+                          <a:solidFill>
+                            <a:schemeClr val="tx1"/>
+                          </a:solidFill>
+                          <a:latin typeface="Courier New" panose="02070309020205020404" pitchFamily="49" charset="0"/>
+                          <a:cs typeface="Courier New" panose="02070309020205020404" pitchFamily="49" charset="0"/>
+                        </a:rPr>
+                        <a:t>IndexError</a:t>
+                      </a:r>
+                      <a:br>
+                        <a:rPr lang="en-US" sz="1600" b="1" baseline="0" dirty="0">
+                          <a:solidFill>
+                            <a:schemeClr val="tx1"/>
+                          </a:solidFill>
+                          <a:latin typeface="Courier New" panose="02070309020205020404" pitchFamily="49" charset="0"/>
+                          <a:cs typeface="Courier New" panose="02070309020205020404" pitchFamily="49" charset="0"/>
+                        </a:rPr>
+                      </a:br>
+                      <a:r>
+                        <a:rPr lang="en-US" sz="1600" b="1" baseline="0" dirty="0">
+                          <a:solidFill>
+                            <a:schemeClr val="tx1"/>
+                          </a:solidFill>
+                          <a:latin typeface="Courier New" panose="02070309020205020404" pitchFamily="49" charset="0"/>
+                          <a:cs typeface="Courier New" panose="02070309020205020404" pitchFamily="49" charset="0"/>
+                        </a:rPr>
+                        <a:t>        </a:t>
+                      </a:r>
+                      <a:r>
+                        <a:rPr lang="en-US" sz="1600" b="1" baseline="0" dirty="0">
+                          <a:solidFill>
+                            <a:schemeClr val="accent1">
+                              <a:lumMod val="50000"/>
+                            </a:schemeClr>
+                          </a:solidFill>
+                          <a:latin typeface="Courier New" panose="02070309020205020404" pitchFamily="49" charset="0"/>
+                          <a:cs typeface="Courier New" panose="02070309020205020404" pitchFamily="49" charset="0"/>
+                        </a:rPr>
+                        <a:t>return</a:t>
+                      </a:r>
+                      <a:r>
+                        <a:rPr lang="en-US" sz="1600" b="1" baseline="0" dirty="0">
+                          <a:solidFill>
+                            <a:schemeClr val="tx1"/>
+                          </a:solidFill>
+                          <a:latin typeface="Courier New" panose="02070309020205020404" pitchFamily="49" charset="0"/>
+                          <a:cs typeface="Courier New" panose="02070309020205020404" pitchFamily="49" charset="0"/>
+                        </a:rPr>
+                        <a:t> 2 * </a:t>
+                      </a:r>
+                      <a:r>
+                        <a:rPr lang="en-US" sz="1600" b="1" baseline="0" dirty="0" err="1">
+                          <a:solidFill>
+                            <a:schemeClr val="tx1"/>
+                          </a:solidFill>
+                          <a:latin typeface="Courier New" panose="02070309020205020404" pitchFamily="49" charset="0"/>
+                          <a:cs typeface="Courier New" panose="02070309020205020404" pitchFamily="49" charset="0"/>
+                        </a:rPr>
+                        <a:t>idx</a:t>
+                      </a:r>
+                      <a:r>
+                        <a:rPr lang="en-US" sz="1600" b="1" baseline="0" dirty="0">
+                          <a:solidFill>
+                            <a:schemeClr val="tx1"/>
+                          </a:solidFill>
+                          <a:latin typeface="Courier New" panose="02070309020205020404" pitchFamily="49" charset="0"/>
+                          <a:cs typeface="Courier New" panose="02070309020205020404" pitchFamily="49" charset="0"/>
+                        </a:rPr>
+                        <a:t> + 1</a:t>
+                      </a:r>
+                    </a:p>
+                    <a:p>
+                      <a:pPr marL="266700" marR="0" lvl="0" indent="-266700" algn="l" defTabSz="914400" rtl="0" eaLnBrk="1" fontAlgn="auto" latinLnBrk="0" hangingPunct="1">
+                        <a:lnSpc>
+                          <a:spcPct val="100000"/>
+                        </a:lnSpc>
+                        <a:spcBef>
+                          <a:spcPts val="0"/>
+                        </a:spcBef>
+                        <a:spcAft>
+                          <a:spcPts val="0"/>
+                        </a:spcAft>
+                        <a:buClr>
+                          <a:srgbClr val="C00000"/>
+                        </a:buClr>
+                        <a:buSzPct val="100000"/>
+                        <a:buFont typeface="Courier New" panose="02070309020205020404" pitchFamily="49" charset="0"/>
+                        <a:buChar char="&gt;"/>
+                        <a:tabLst/>
+                        <a:defRPr/>
+                      </a:pPr>
+                      <a:r>
+                        <a:rPr lang="en-US" sz="1600" b="1" baseline="0" dirty="0">
+                          <a:solidFill>
+                            <a:schemeClr val="tx1"/>
+                          </a:solidFill>
+                          <a:latin typeface="Courier New" panose="02070309020205020404" pitchFamily="49" charset="0"/>
+                          <a:cs typeface="Courier New" panose="02070309020205020404" pitchFamily="49" charset="0"/>
+                        </a:rPr>
+                        <a:t>odds = </a:t>
+                      </a:r>
+                      <a:r>
+                        <a:rPr lang="en-US" sz="1600" b="1" baseline="0" dirty="0" err="1">
+                          <a:solidFill>
+                            <a:schemeClr val="tx1"/>
+                          </a:solidFill>
+                          <a:latin typeface="Courier New" panose="02070309020205020404" pitchFamily="49" charset="0"/>
+                          <a:cs typeface="Courier New" panose="02070309020205020404" pitchFamily="49" charset="0"/>
+                        </a:rPr>
+                        <a:t>Odd_numbers</a:t>
+                      </a:r>
+                      <a:r>
+                        <a:rPr lang="en-US" sz="1600" b="1" baseline="0" dirty="0">
+                          <a:solidFill>
+                            <a:schemeClr val="tx1"/>
+                          </a:solidFill>
+                          <a:latin typeface="Courier New" panose="02070309020205020404" pitchFamily="49" charset="0"/>
+                          <a:cs typeface="Courier New" panose="02070309020205020404" pitchFamily="49" charset="0"/>
+                        </a:rPr>
+                        <a:t>()</a:t>
+                      </a:r>
+                    </a:p>
+                    <a:p>
+                      <a:pPr marL="266700" marR="0" lvl="0" indent="-266700" algn="l" defTabSz="914400" rtl="0" eaLnBrk="1" fontAlgn="auto" latinLnBrk="0" hangingPunct="1">
+                        <a:lnSpc>
+                          <a:spcPct val="100000"/>
+                        </a:lnSpc>
+                        <a:spcBef>
+                          <a:spcPts val="0"/>
+                        </a:spcBef>
+                        <a:spcAft>
+                          <a:spcPts val="0"/>
+                        </a:spcAft>
+                        <a:buClr>
+                          <a:srgbClr val="C00000"/>
+                        </a:buClr>
+                        <a:buSzPct val="100000"/>
+                        <a:buFont typeface="Courier New" panose="02070309020205020404" pitchFamily="49" charset="0"/>
+                        <a:buChar char="&gt;"/>
+                        <a:tabLst/>
+                        <a:defRPr/>
+                      </a:pPr>
+                      <a:r>
+                        <a:rPr lang="en-US" sz="1600" b="1" baseline="0" dirty="0">
+                          <a:solidFill>
+                            <a:schemeClr val="tx1"/>
+                          </a:solidFill>
+                          <a:latin typeface="Courier New" panose="02070309020205020404" pitchFamily="49" charset="0"/>
+                          <a:cs typeface="Courier New" panose="02070309020205020404" pitchFamily="49" charset="0"/>
+                        </a:rPr>
+                        <a:t>odds</a:t>
+                      </a:r>
+                      <a:r>
+                        <a:rPr lang="en-US" sz="1600" b="1" baseline="0" dirty="0">
+                          <a:solidFill>
+                            <a:srgbClr val="C00000"/>
+                          </a:solidFill>
+                          <a:latin typeface="Courier New" panose="02070309020205020404" pitchFamily="49" charset="0"/>
+                          <a:cs typeface="Courier New" panose="02070309020205020404" pitchFamily="49" charset="0"/>
+                        </a:rPr>
+                        <a:t>[</a:t>
+                      </a:r>
+                      <a:r>
+                        <a:rPr lang="en-US" sz="1600" b="1" baseline="0" dirty="0">
+                          <a:solidFill>
+                            <a:schemeClr val="tx1"/>
+                          </a:solidFill>
+                          <a:latin typeface="Courier New" panose="02070309020205020404" pitchFamily="49" charset="0"/>
+                          <a:cs typeface="Courier New" panose="02070309020205020404" pitchFamily="49" charset="0"/>
+                        </a:rPr>
+                        <a:t>3</a:t>
+                      </a:r>
+                      <a:r>
+                        <a:rPr lang="en-US" sz="1600" b="1" baseline="0" dirty="0">
+                          <a:solidFill>
+                            <a:srgbClr val="C00000"/>
+                          </a:solidFill>
+                          <a:latin typeface="Courier New" panose="02070309020205020404" pitchFamily="49" charset="0"/>
+                          <a:cs typeface="Courier New" panose="02070309020205020404" pitchFamily="49" charset="0"/>
+                        </a:rPr>
+                        <a:t>]</a:t>
+                      </a:r>
+                    </a:p>
+                    <a:p>
+                      <a:pPr marL="266700" marR="0" lvl="0" indent="-266700" algn="l" defTabSz="914400" rtl="0" eaLnBrk="1" fontAlgn="auto" latinLnBrk="0" hangingPunct="1">
+                        <a:lnSpc>
+                          <a:spcPct val="100000"/>
+                        </a:lnSpc>
+                        <a:spcBef>
+                          <a:spcPts val="0"/>
+                        </a:spcBef>
+                        <a:spcAft>
+                          <a:spcPts val="0"/>
+                        </a:spcAft>
+                        <a:buClr>
+                          <a:srgbClr val="C00000"/>
+                        </a:buClr>
+                        <a:buSzPct val="100000"/>
+                        <a:buFont typeface="Courier New" panose="02070309020205020404" pitchFamily="49" charset="0"/>
+                        <a:buChar char="&gt;"/>
+                        <a:tabLst/>
+                        <a:defRPr/>
+                      </a:pPr>
+                      <a:r>
+                        <a:rPr lang="en-US" sz="1600" b="1" baseline="0" dirty="0">
+                          <a:solidFill>
+                            <a:schemeClr val="accent6"/>
+                          </a:solidFill>
+                          <a:latin typeface="Courier New" panose="02070309020205020404" pitchFamily="49" charset="0"/>
+                          <a:cs typeface="Courier New" panose="02070309020205020404" pitchFamily="49" charset="0"/>
+                        </a:rPr>
+                        <a:t>getting item</a:t>
+                      </a:r>
+                      <a:r>
+                        <a:rPr lang="en-US" sz="1600" b="1" baseline="0" dirty="0">
+                          <a:solidFill>
+                            <a:schemeClr val="tx1"/>
+                          </a:solidFill>
+                          <a:latin typeface="Courier New" panose="02070309020205020404" pitchFamily="49" charset="0"/>
+                          <a:cs typeface="Courier New" panose="02070309020205020404" pitchFamily="49" charset="0"/>
+                        </a:rPr>
+                        <a:t> </a:t>
+                      </a:r>
+                      <a:r>
+                        <a:rPr lang="en-US" sz="1600" b="1" baseline="0" dirty="0">
+                          <a:solidFill>
+                            <a:schemeClr val="accent6"/>
+                          </a:solidFill>
+                          <a:latin typeface="Courier New" panose="02070309020205020404" pitchFamily="49" charset="0"/>
+                          <a:cs typeface="Courier New" panose="02070309020205020404" pitchFamily="49" charset="0"/>
+                        </a:rPr>
+                        <a:t>3</a:t>
+                      </a:r>
+                    </a:p>
+                    <a:p>
+                      <a:pPr marL="266700" marR="0" lvl="0" indent="-266700" algn="l" defTabSz="914400" rtl="0" eaLnBrk="1" fontAlgn="auto" latinLnBrk="0" hangingPunct="1">
+                        <a:lnSpc>
+                          <a:spcPct val="100000"/>
+                        </a:lnSpc>
+                        <a:spcBef>
+                          <a:spcPts val="0"/>
+                        </a:spcBef>
+                        <a:spcAft>
+                          <a:spcPts val="0"/>
+                        </a:spcAft>
+                        <a:buClr>
+                          <a:schemeClr val="accent1">
+                            <a:lumMod val="50000"/>
+                          </a:schemeClr>
+                        </a:buClr>
+                        <a:buSzPct val="120000"/>
+                        <a:buFont typeface="Courier New" panose="02070309020205020404" pitchFamily="49" charset="0"/>
+                        <a:buChar char="|"/>
+                        <a:tabLst/>
+                        <a:defRPr/>
+                      </a:pPr>
+                      <a:r>
+                        <a:rPr lang="en-US" sz="1600" b="1" baseline="0" dirty="0">
+                          <a:solidFill>
+                            <a:schemeClr val="tx1"/>
+                          </a:solidFill>
+                          <a:latin typeface="Courier New" panose="02070309020205020404" pitchFamily="49" charset="0"/>
+                          <a:cs typeface="Courier New" panose="02070309020205020404" pitchFamily="49" charset="0"/>
+                        </a:rPr>
+                        <a:t>7</a:t>
+                      </a:r>
+                    </a:p>
+                    <a:p>
+                      <a:pPr marL="266700" marR="0" lvl="0" indent="-266700" algn="l" defTabSz="914400" rtl="0" eaLnBrk="1" fontAlgn="auto" latinLnBrk="0" hangingPunct="1">
+                        <a:lnSpc>
+                          <a:spcPct val="100000"/>
+                        </a:lnSpc>
+                        <a:spcBef>
+                          <a:spcPts val="0"/>
+                        </a:spcBef>
+                        <a:spcAft>
+                          <a:spcPts val="0"/>
+                        </a:spcAft>
+                        <a:buClr>
+                          <a:srgbClr val="C00000"/>
+                        </a:buClr>
+                        <a:buSzPct val="100000"/>
+                        <a:buFont typeface="Courier New" panose="02070309020205020404" pitchFamily="49" charset="0"/>
+                        <a:buChar char="&gt;"/>
+                        <a:tabLst/>
+                        <a:defRPr/>
+                      </a:pPr>
+                      <a:r>
+                        <a:rPr lang="en-US" sz="1600" b="1" baseline="0" dirty="0">
+                          <a:solidFill>
+                            <a:schemeClr val="tx1"/>
+                          </a:solidFill>
+                          <a:latin typeface="Courier New" panose="02070309020205020404" pitchFamily="49" charset="0"/>
+                          <a:cs typeface="Courier New" panose="02070309020205020404" pitchFamily="49" charset="0"/>
+                        </a:rPr>
+                        <a:t>it = </a:t>
+                      </a:r>
+                      <a:r>
+                        <a:rPr lang="en-US" sz="1600" b="1" baseline="0" dirty="0" err="1">
+                          <a:solidFill>
+                            <a:schemeClr val="tx1"/>
+                          </a:solidFill>
+                          <a:latin typeface="Courier New" panose="02070309020205020404" pitchFamily="49" charset="0"/>
+                          <a:cs typeface="Courier New" panose="02070309020205020404" pitchFamily="49" charset="0"/>
+                        </a:rPr>
+                        <a:t>iter</a:t>
+                      </a:r>
+                      <a:r>
+                        <a:rPr lang="en-US" sz="1600" b="1" baseline="0" dirty="0">
+                          <a:solidFill>
+                            <a:schemeClr val="tx1"/>
+                          </a:solidFill>
+                          <a:latin typeface="Courier New" panose="02070309020205020404" pitchFamily="49" charset="0"/>
+                          <a:cs typeface="Courier New" panose="02070309020205020404" pitchFamily="49" charset="0"/>
+                        </a:rPr>
+                        <a:t>(odds)</a:t>
+                      </a:r>
+                    </a:p>
+                    <a:p>
+                      <a:pPr marL="266700" marR="0" lvl="0" indent="-266700" algn="l" defTabSz="914400" rtl="0" eaLnBrk="1" fontAlgn="auto" latinLnBrk="0" hangingPunct="1">
+                        <a:lnSpc>
+                          <a:spcPct val="100000"/>
+                        </a:lnSpc>
+                        <a:spcBef>
+                          <a:spcPts val="0"/>
+                        </a:spcBef>
+                        <a:spcAft>
+                          <a:spcPts val="0"/>
+                        </a:spcAft>
+                        <a:buClr>
+                          <a:srgbClr val="C00000"/>
+                        </a:buClr>
+                        <a:buSzPct val="100000"/>
+                        <a:buFont typeface="Courier New" panose="02070309020205020404" pitchFamily="49" charset="0"/>
+                        <a:buChar char="&gt;"/>
+                        <a:tabLst/>
+                        <a:defRPr/>
+                      </a:pPr>
+                      <a:r>
+                        <a:rPr lang="en-US" sz="1600" b="1" baseline="0" dirty="0">
+                          <a:solidFill>
+                            <a:schemeClr val="tx1"/>
+                          </a:solidFill>
+                          <a:latin typeface="Courier New" panose="02070309020205020404" pitchFamily="49" charset="0"/>
+                          <a:cs typeface="Courier New" panose="02070309020205020404" pitchFamily="49" charset="0"/>
+                        </a:rPr>
+                        <a:t>it</a:t>
+                      </a:r>
+                    </a:p>
+                    <a:p>
+                      <a:pPr marL="266700" marR="0" lvl="0" indent="-266700" algn="l" defTabSz="914400" rtl="0" eaLnBrk="1" fontAlgn="auto" latinLnBrk="0" hangingPunct="1">
+                        <a:lnSpc>
+                          <a:spcPct val="100000"/>
+                        </a:lnSpc>
+                        <a:spcBef>
+                          <a:spcPts val="0"/>
+                        </a:spcBef>
+                        <a:spcAft>
+                          <a:spcPts val="0"/>
+                        </a:spcAft>
+                        <a:buClr>
+                          <a:schemeClr val="accent1">
+                            <a:lumMod val="50000"/>
+                          </a:schemeClr>
+                        </a:buClr>
+                        <a:buSzPct val="120000"/>
+                        <a:buFont typeface="Courier New" panose="02070309020205020404" pitchFamily="49" charset="0"/>
+                        <a:buChar char="|"/>
+                        <a:tabLst/>
+                        <a:defRPr/>
+                      </a:pPr>
+                      <a:r>
+                        <a:rPr lang="en-US" sz="1600" b="1" baseline="0" dirty="0">
+                          <a:solidFill>
+                            <a:schemeClr val="tx1"/>
+                          </a:solidFill>
+                          <a:latin typeface="Courier New" panose="02070309020205020404" pitchFamily="49" charset="0"/>
+                          <a:cs typeface="Courier New" panose="02070309020205020404" pitchFamily="49" charset="0"/>
+                        </a:rPr>
+                        <a:t>&lt;iterator object at ...&gt;</a:t>
+                      </a:r>
+                    </a:p>
+                    <a:p>
+                      <a:pPr marL="266700" marR="0" lvl="0" indent="-266700" algn="l" defTabSz="914400" rtl="0" eaLnBrk="1" fontAlgn="auto" latinLnBrk="0" hangingPunct="1">
+                        <a:lnSpc>
+                          <a:spcPct val="100000"/>
+                        </a:lnSpc>
+                        <a:spcBef>
+                          <a:spcPts val="0"/>
+                        </a:spcBef>
+                        <a:spcAft>
+                          <a:spcPts val="0"/>
+                        </a:spcAft>
+                        <a:buClr>
+                          <a:srgbClr val="C00000"/>
+                        </a:buClr>
+                        <a:buSzPct val="100000"/>
+                        <a:buFont typeface="Courier New" panose="02070309020205020404" pitchFamily="49" charset="0"/>
+                        <a:buChar char="&gt;"/>
+                        <a:tabLst/>
+                        <a:defRPr/>
+                      </a:pPr>
+                      <a:r>
+                        <a:rPr lang="en-US" sz="1600" b="1" baseline="0" dirty="0">
+                          <a:solidFill>
+                            <a:schemeClr val="tx1"/>
+                          </a:solidFill>
+                          <a:latin typeface="Courier New" panose="02070309020205020404" pitchFamily="49" charset="0"/>
+                          <a:cs typeface="Courier New" panose="02070309020205020404" pitchFamily="49" charset="0"/>
+                        </a:rPr>
+                        <a:t>print(next(it), next(it), next(it))</a:t>
+                      </a:r>
+                    </a:p>
+                    <a:p>
+                      <a:pPr marL="266700" marR="0" lvl="0" indent="-266700" algn="l" defTabSz="914400" rtl="0" eaLnBrk="1" fontAlgn="auto" latinLnBrk="0" hangingPunct="1">
+                        <a:lnSpc>
+                          <a:spcPct val="100000"/>
+                        </a:lnSpc>
+                        <a:spcBef>
+                          <a:spcPts val="0"/>
+                        </a:spcBef>
+                        <a:spcAft>
+                          <a:spcPts val="0"/>
+                        </a:spcAft>
+                        <a:buClr>
+                          <a:schemeClr val="accent1">
+                            <a:lumMod val="50000"/>
+                          </a:schemeClr>
+                        </a:buClr>
+                        <a:buSzPct val="120000"/>
+                        <a:buFont typeface="Courier New" panose="02070309020205020404" pitchFamily="49" charset="0"/>
+                        <a:buChar char="|"/>
+                        <a:tabLst/>
+                        <a:defRPr/>
+                      </a:pPr>
+                      <a:r>
+                        <a:rPr lang="en-US" sz="1600" b="1" baseline="0" dirty="0">
+                          <a:solidFill>
+                            <a:schemeClr val="accent6"/>
+                          </a:solidFill>
+                          <a:latin typeface="Courier New" panose="02070309020205020404" pitchFamily="49" charset="0"/>
+                          <a:cs typeface="Courier New" panose="02070309020205020404" pitchFamily="49" charset="0"/>
+                        </a:rPr>
+                        <a:t>getting item 0</a:t>
+                      </a:r>
+                    </a:p>
+                    <a:p>
+                      <a:pPr marL="266700" marR="0" lvl="0" indent="-266700" algn="l" defTabSz="914400" rtl="0" eaLnBrk="1" fontAlgn="auto" latinLnBrk="0" hangingPunct="1">
+                        <a:lnSpc>
+                          <a:spcPct val="100000"/>
+                        </a:lnSpc>
+                        <a:spcBef>
+                          <a:spcPts val="0"/>
+                        </a:spcBef>
+                        <a:spcAft>
+                          <a:spcPts val="0"/>
+                        </a:spcAft>
+                        <a:buClr>
+                          <a:schemeClr val="accent1">
+                            <a:lumMod val="50000"/>
+                          </a:schemeClr>
+                        </a:buClr>
+                        <a:buSzPct val="120000"/>
+                        <a:buFont typeface="Courier New" panose="02070309020205020404" pitchFamily="49" charset="0"/>
+                        <a:buChar char="|"/>
+                        <a:tabLst/>
+                        <a:defRPr/>
+                      </a:pPr>
+                      <a:r>
+                        <a:rPr lang="en-US" sz="1600" b="1" baseline="0" dirty="0">
+                          <a:solidFill>
+                            <a:schemeClr val="accent6"/>
+                          </a:solidFill>
+                          <a:latin typeface="Courier New" panose="02070309020205020404" pitchFamily="49" charset="0"/>
+                          <a:cs typeface="Courier New" panose="02070309020205020404" pitchFamily="49" charset="0"/>
+                        </a:rPr>
+                        <a:t>getting item 1</a:t>
+                      </a:r>
+                    </a:p>
+                    <a:p>
+                      <a:pPr marL="266700" marR="0" lvl="0" indent="-266700" algn="l" defTabSz="914400" rtl="0" eaLnBrk="1" fontAlgn="auto" latinLnBrk="0" hangingPunct="1">
+                        <a:lnSpc>
+                          <a:spcPct val="100000"/>
+                        </a:lnSpc>
+                        <a:spcBef>
+                          <a:spcPts val="0"/>
+                        </a:spcBef>
+                        <a:spcAft>
+                          <a:spcPts val="0"/>
+                        </a:spcAft>
+                        <a:buClr>
+                          <a:schemeClr val="accent1">
+                            <a:lumMod val="50000"/>
+                          </a:schemeClr>
+                        </a:buClr>
+                        <a:buSzPct val="120000"/>
+                        <a:buFont typeface="Courier New" panose="02070309020205020404" pitchFamily="49" charset="0"/>
+                        <a:buChar char="|"/>
+                        <a:tabLst/>
+                        <a:defRPr/>
+                      </a:pPr>
+                      <a:r>
+                        <a:rPr lang="en-US" sz="1600" b="1" baseline="0" dirty="0">
+                          <a:solidFill>
+                            <a:schemeClr val="accent6"/>
+                          </a:solidFill>
+                          <a:latin typeface="Courier New" panose="02070309020205020404" pitchFamily="49" charset="0"/>
+                          <a:cs typeface="Courier New" panose="02070309020205020404" pitchFamily="49" charset="0"/>
+                        </a:rPr>
+                        <a:t>getting item 2</a:t>
+                      </a:r>
+                    </a:p>
+                    <a:p>
+                      <a:pPr marL="266700" marR="0" lvl="0" indent="-266700" algn="l" defTabSz="914400" rtl="0" eaLnBrk="1" fontAlgn="auto" latinLnBrk="0" hangingPunct="1">
+                        <a:lnSpc>
+                          <a:spcPct val="100000"/>
+                        </a:lnSpc>
+                        <a:spcBef>
+                          <a:spcPts val="0"/>
+                        </a:spcBef>
+                        <a:spcAft>
+                          <a:spcPts val="0"/>
+                        </a:spcAft>
+                        <a:buClr>
+                          <a:schemeClr val="accent1">
+                            <a:lumMod val="50000"/>
+                          </a:schemeClr>
+                        </a:buClr>
+                        <a:buSzPct val="120000"/>
+                        <a:buFont typeface="Courier New" panose="02070309020205020404" pitchFamily="49" charset="0"/>
+                        <a:buChar char="|"/>
+                        <a:tabLst/>
+                        <a:defRPr/>
+                      </a:pPr>
+                      <a:r>
+                        <a:rPr lang="en-US" sz="1600" b="1" baseline="0" dirty="0">
+                          <a:solidFill>
+                            <a:schemeClr val="tx1"/>
+                          </a:solidFill>
+                          <a:latin typeface="Courier New" panose="02070309020205020404" pitchFamily="49" charset="0"/>
+                          <a:cs typeface="Courier New" panose="02070309020205020404" pitchFamily="49" charset="0"/>
+                        </a:rPr>
+                        <a:t>1 3 5</a:t>
+                      </a:r>
+                    </a:p>
+                  </a:txBody>
+                  <a:tcPr>
+                    <a:lnL w="6350" cap="flat" cmpd="sng" algn="ctr">
+                      <a:solidFill>
+                        <a:schemeClr val="tx1"/>
+                      </a:solidFill>
+                      <a:prstDash val="solid"/>
+                      <a:round/>
+                      <a:headEnd type="none" w="med" len="med"/>
+                      <a:tailEnd type="none" w="med" len="med"/>
+                    </a:lnL>
+                    <a:lnR w="6350" cap="flat" cmpd="sng" algn="ctr">
+                      <a:solidFill>
+                        <a:schemeClr val="tx1"/>
+                      </a:solidFill>
+                      <a:prstDash val="solid"/>
+                      <a:round/>
+                      <a:headEnd type="none" w="med" len="med"/>
+                      <a:tailEnd type="none" w="med" len="med"/>
+                    </a:lnR>
+                    <a:lnT w="6350" cap="flat" cmpd="sng" algn="ctr">
+                      <a:solidFill>
+                        <a:schemeClr val="tx1"/>
+                      </a:solidFill>
+                      <a:prstDash val="solid"/>
+                      <a:round/>
+                      <a:headEnd type="none" w="med" len="med"/>
+                      <a:tailEnd type="none" w="med" len="med"/>
+                    </a:lnT>
+                    <a:lnB w="6350" cap="flat" cmpd="sng" algn="ctr">
+                      <a:solidFill>
+                        <a:schemeClr val="tx1"/>
+                      </a:solidFill>
+                      <a:prstDash val="solid"/>
+                      <a:round/>
+                      <a:headEnd type="none" w="med" len="med"/>
+                      <a:tailEnd type="none" w="med" len="med"/>
+                    </a:lnB>
+                    <a:lnTlToBr w="12700" cmpd="sng">
+                      <a:noFill/>
+                      <a:prstDash val="solid"/>
+                    </a:lnTlToBr>
+                    <a:lnBlToTr w="12700" cmpd="sng">
+                      <a:noFill/>
+                      <a:prstDash val="solid"/>
+                    </a:lnBlToTr>
+                    <a:solidFill>
+                      <a:schemeClr val="accent5">
+                        <a:lumMod val="20000"/>
+                        <a:lumOff val="80000"/>
+                      </a:schemeClr>
+                    </a:solidFill>
+                  </a:tcPr>
+                </a:tc>
+                <a:tc>
+                  <a:txBody>
+                    <a:bodyPr/>
+                    <a:lstStyle/>
+                    <a:p>
+                      <a:pPr marL="266700" marR="0" lvl="0" indent="-266700" algn="l" defTabSz="914400" rtl="0" eaLnBrk="1" fontAlgn="auto" latinLnBrk="0" hangingPunct="1">
+                        <a:lnSpc>
+                          <a:spcPct val="100000"/>
+                        </a:lnSpc>
+                        <a:spcBef>
+                          <a:spcPts val="0"/>
+                        </a:spcBef>
+                        <a:spcAft>
+                          <a:spcPts val="0"/>
+                        </a:spcAft>
+                        <a:buClr>
+                          <a:srgbClr val="C00000"/>
+                        </a:buClr>
+                        <a:buSzPct val="100000"/>
+                        <a:buFont typeface="Courier New" panose="02070309020205020404" pitchFamily="49" charset="0"/>
+                        <a:buChar char="&gt;"/>
+                        <a:tabLst/>
+                        <a:defRPr/>
+                      </a:pPr>
+                      <a:r>
+                        <a:rPr lang="en-US" sz="1600" b="1" baseline="0" dirty="0">
+                          <a:solidFill>
+                            <a:schemeClr val="tx1"/>
+                          </a:solidFill>
+                          <a:latin typeface="Courier New" panose="02070309020205020404" pitchFamily="49" charset="0"/>
+                          <a:cs typeface="Courier New" panose="02070309020205020404" pitchFamily="49" charset="0"/>
+                        </a:rPr>
+                        <a:t>5 </a:t>
+                      </a:r>
+                      <a:r>
+                        <a:rPr lang="en-US" sz="1600" b="1" baseline="0" dirty="0">
+                          <a:solidFill>
+                            <a:schemeClr val="accent1">
+                              <a:lumMod val="50000"/>
+                            </a:schemeClr>
+                          </a:solidFill>
+                          <a:latin typeface="Courier New" panose="02070309020205020404" pitchFamily="49" charset="0"/>
+                          <a:cs typeface="Courier New" panose="02070309020205020404" pitchFamily="49" charset="0"/>
+                        </a:rPr>
+                        <a:t>in</a:t>
+                      </a:r>
+                      <a:r>
+                        <a:rPr lang="en-US" sz="1600" b="1" baseline="0" dirty="0">
+                          <a:solidFill>
+                            <a:schemeClr val="tx1"/>
+                          </a:solidFill>
+                          <a:latin typeface="Courier New" panose="02070309020205020404" pitchFamily="49" charset="0"/>
+                          <a:cs typeface="Courier New" panose="02070309020205020404" pitchFamily="49" charset="0"/>
+                        </a:rPr>
+                        <a:t> odds</a:t>
+                      </a:r>
+                    </a:p>
+                    <a:p>
+                      <a:pPr marL="266700" marR="0" lvl="0" indent="-266700" algn="l" defTabSz="914400" rtl="0" eaLnBrk="1" fontAlgn="auto" latinLnBrk="0" hangingPunct="1">
+                        <a:lnSpc>
+                          <a:spcPct val="100000"/>
+                        </a:lnSpc>
+                        <a:spcBef>
+                          <a:spcPts val="0"/>
+                        </a:spcBef>
+                        <a:spcAft>
+                          <a:spcPts val="0"/>
+                        </a:spcAft>
+                        <a:buClr>
+                          <a:schemeClr val="accent1">
+                            <a:lumMod val="50000"/>
+                          </a:schemeClr>
+                        </a:buClr>
+                        <a:buSzPct val="120000"/>
+                        <a:buFont typeface="Courier New" panose="02070309020205020404" pitchFamily="49" charset="0"/>
+                        <a:buChar char="|"/>
+                        <a:tabLst/>
+                        <a:defRPr/>
+                      </a:pPr>
+                      <a:r>
+                        <a:rPr lang="en-US" sz="1600" b="1" baseline="0" dirty="0">
+                          <a:solidFill>
+                            <a:schemeClr val="accent6"/>
+                          </a:solidFill>
+                          <a:latin typeface="Courier New" panose="02070309020205020404" pitchFamily="49" charset="0"/>
+                          <a:cs typeface="Courier New" panose="02070309020205020404" pitchFamily="49" charset="0"/>
+                        </a:rPr>
+                        <a:t>getting item 0</a:t>
+                      </a:r>
+                    </a:p>
+                    <a:p>
+                      <a:pPr marL="266700" marR="0" lvl="0" indent="-266700" algn="l" defTabSz="914400" rtl="0" eaLnBrk="1" fontAlgn="auto" latinLnBrk="0" hangingPunct="1">
+                        <a:lnSpc>
+                          <a:spcPct val="100000"/>
+                        </a:lnSpc>
+                        <a:spcBef>
+                          <a:spcPts val="0"/>
+                        </a:spcBef>
+                        <a:spcAft>
+                          <a:spcPts val="0"/>
+                        </a:spcAft>
+                        <a:buClr>
+                          <a:schemeClr val="accent1">
+                            <a:lumMod val="50000"/>
+                          </a:schemeClr>
+                        </a:buClr>
+                        <a:buSzPct val="120000"/>
+                        <a:buFont typeface="Courier New" panose="02070309020205020404" pitchFamily="49" charset="0"/>
+                        <a:buChar char="|"/>
+                        <a:tabLst/>
+                        <a:defRPr/>
+                      </a:pPr>
+                      <a:r>
+                        <a:rPr lang="en-US" sz="1600" b="1" baseline="0" dirty="0">
+                          <a:solidFill>
+                            <a:schemeClr val="accent6"/>
+                          </a:solidFill>
+                          <a:latin typeface="Courier New" panose="02070309020205020404" pitchFamily="49" charset="0"/>
+                          <a:cs typeface="Courier New" panose="02070309020205020404" pitchFamily="49" charset="0"/>
+                        </a:rPr>
+                        <a:t>getting item 1</a:t>
+                      </a:r>
+                    </a:p>
+                    <a:p>
+                      <a:pPr marL="266700" marR="0" lvl="0" indent="-266700" algn="l" defTabSz="914400" rtl="0" eaLnBrk="1" fontAlgn="auto" latinLnBrk="0" hangingPunct="1">
+                        <a:lnSpc>
+                          <a:spcPct val="100000"/>
+                        </a:lnSpc>
+                        <a:spcBef>
+                          <a:spcPts val="0"/>
+                        </a:spcBef>
+                        <a:spcAft>
+                          <a:spcPts val="0"/>
+                        </a:spcAft>
+                        <a:buClr>
+                          <a:schemeClr val="accent1">
+                            <a:lumMod val="50000"/>
+                          </a:schemeClr>
+                        </a:buClr>
+                        <a:buSzPct val="120000"/>
+                        <a:buFont typeface="Courier New" panose="02070309020205020404" pitchFamily="49" charset="0"/>
+                        <a:buChar char="|"/>
+                        <a:tabLst/>
+                        <a:defRPr/>
+                      </a:pPr>
+                      <a:r>
+                        <a:rPr lang="en-US" sz="1600" b="1" baseline="0" dirty="0">
+                          <a:solidFill>
+                            <a:schemeClr val="accent6"/>
+                          </a:solidFill>
+                          <a:latin typeface="Courier New" panose="02070309020205020404" pitchFamily="49" charset="0"/>
+                          <a:cs typeface="Courier New" panose="02070309020205020404" pitchFamily="49" charset="0"/>
+                        </a:rPr>
+                        <a:t>getting item 2</a:t>
+                      </a:r>
+                    </a:p>
+                    <a:p>
+                      <a:pPr marL="266700" marR="0" lvl="0" indent="-266700" algn="l" defTabSz="914400" rtl="0" eaLnBrk="1" fontAlgn="auto" latinLnBrk="0" hangingPunct="1">
+                        <a:lnSpc>
+                          <a:spcPct val="100000"/>
+                        </a:lnSpc>
+                        <a:spcBef>
+                          <a:spcPts val="0"/>
+                        </a:spcBef>
+                        <a:spcAft>
+                          <a:spcPts val="0"/>
+                        </a:spcAft>
+                        <a:buClr>
+                          <a:schemeClr val="accent1">
+                            <a:lumMod val="50000"/>
+                          </a:schemeClr>
+                        </a:buClr>
+                        <a:buSzPct val="120000"/>
+                        <a:buFont typeface="Courier New" panose="02070309020205020404" pitchFamily="49" charset="0"/>
+                        <a:buChar char="|"/>
+                        <a:tabLst/>
+                        <a:defRPr/>
+                      </a:pPr>
+                      <a:r>
+                        <a:rPr lang="en-US" sz="1600" b="1" baseline="0" dirty="0">
+                          <a:solidFill>
+                            <a:schemeClr val="tx1"/>
+                          </a:solidFill>
+                          <a:latin typeface="Courier New" panose="02070309020205020404" pitchFamily="49" charset="0"/>
+                          <a:cs typeface="Courier New" panose="02070309020205020404" pitchFamily="49" charset="0"/>
+                        </a:rPr>
+                        <a:t>True</a:t>
+                      </a:r>
+                    </a:p>
+                    <a:p>
+                      <a:pPr marL="266700" marR="0" lvl="0" indent="-266700" algn="l" defTabSz="914400" rtl="0" eaLnBrk="1" fontAlgn="auto" latinLnBrk="0" hangingPunct="1">
+                        <a:lnSpc>
+                          <a:spcPct val="100000"/>
+                        </a:lnSpc>
+                        <a:spcBef>
+                          <a:spcPts val="0"/>
+                        </a:spcBef>
+                        <a:spcAft>
+                          <a:spcPts val="0"/>
+                        </a:spcAft>
+                        <a:buClr>
+                          <a:srgbClr val="C00000"/>
+                        </a:buClr>
+                        <a:buSzPct val="100000"/>
+                        <a:buFont typeface="Courier New" panose="02070309020205020404" pitchFamily="49" charset="0"/>
+                        <a:buChar char="&gt;"/>
+                        <a:tabLst/>
+                        <a:defRPr/>
+                      </a:pPr>
+                      <a:r>
+                        <a:rPr lang="en-US" sz="1600" b="1" baseline="0" dirty="0">
+                          <a:solidFill>
+                            <a:schemeClr val="tx1"/>
+                          </a:solidFill>
+                          <a:latin typeface="Courier New" panose="02070309020205020404" pitchFamily="49" charset="0"/>
+                          <a:cs typeface="Courier New" panose="02070309020205020404" pitchFamily="49" charset="0"/>
+                        </a:rPr>
+                        <a:t>6 </a:t>
+                      </a:r>
+                      <a:r>
+                        <a:rPr lang="en-US" sz="1600" b="1" baseline="0" dirty="0">
+                          <a:solidFill>
+                            <a:schemeClr val="accent1">
+                              <a:lumMod val="50000"/>
+                            </a:schemeClr>
+                          </a:solidFill>
+                          <a:latin typeface="Courier New" panose="02070309020205020404" pitchFamily="49" charset="0"/>
+                          <a:cs typeface="Courier New" panose="02070309020205020404" pitchFamily="49" charset="0"/>
+                        </a:rPr>
+                        <a:t>in</a:t>
+                      </a:r>
+                      <a:r>
+                        <a:rPr lang="en-US" sz="1600" b="1" baseline="0" dirty="0">
+                          <a:solidFill>
+                            <a:schemeClr val="tx1"/>
+                          </a:solidFill>
+                          <a:latin typeface="Courier New" panose="02070309020205020404" pitchFamily="49" charset="0"/>
+                          <a:cs typeface="Courier New" panose="02070309020205020404" pitchFamily="49" charset="0"/>
+                        </a:rPr>
+                        <a:t> odds</a:t>
+                      </a:r>
+                      <a:endParaRPr lang="en-US" sz="1600" b="1" baseline="0" dirty="0">
+                        <a:solidFill>
+                          <a:schemeClr val="accent6"/>
+                        </a:solidFill>
+                        <a:latin typeface="Courier New" panose="02070309020205020404" pitchFamily="49" charset="0"/>
+                        <a:cs typeface="Courier New" panose="02070309020205020404" pitchFamily="49" charset="0"/>
+                      </a:endParaRPr>
+                    </a:p>
+                    <a:p>
+                      <a:pPr marL="266700" marR="0" lvl="0" indent="-266700" algn="l" defTabSz="914400" rtl="0" eaLnBrk="1" fontAlgn="auto" latinLnBrk="0" hangingPunct="1">
+                        <a:lnSpc>
+                          <a:spcPct val="100000"/>
+                        </a:lnSpc>
+                        <a:spcBef>
+                          <a:spcPts val="0"/>
+                        </a:spcBef>
+                        <a:spcAft>
+                          <a:spcPts val="0"/>
+                        </a:spcAft>
+                        <a:buClr>
+                          <a:schemeClr val="accent1">
+                            <a:lumMod val="50000"/>
+                          </a:schemeClr>
+                        </a:buClr>
+                        <a:buSzPct val="120000"/>
+                        <a:buFont typeface="Courier New" panose="02070309020205020404" pitchFamily="49" charset="0"/>
+                        <a:buChar char="|"/>
+                        <a:tabLst/>
+                        <a:defRPr/>
+                      </a:pPr>
+                      <a:r>
+                        <a:rPr lang="en-US" sz="1600" b="1" baseline="0" dirty="0">
+                          <a:solidFill>
+                            <a:schemeClr val="accent6"/>
+                          </a:solidFill>
+                          <a:latin typeface="Courier New" panose="02070309020205020404" pitchFamily="49" charset="0"/>
+                          <a:cs typeface="Courier New" panose="02070309020205020404" pitchFamily="49" charset="0"/>
+                        </a:rPr>
+                        <a:t>getting item 0</a:t>
+                      </a:r>
+                    </a:p>
+                    <a:p>
+                      <a:pPr marL="266700" marR="0" lvl="0" indent="-266700" algn="l" defTabSz="914400" rtl="0" eaLnBrk="1" fontAlgn="auto" latinLnBrk="0" hangingPunct="1">
+                        <a:lnSpc>
+                          <a:spcPct val="100000"/>
+                        </a:lnSpc>
+                        <a:spcBef>
+                          <a:spcPts val="0"/>
+                        </a:spcBef>
+                        <a:spcAft>
+                          <a:spcPts val="0"/>
+                        </a:spcAft>
+                        <a:buClr>
+                          <a:schemeClr val="accent1">
+                            <a:lumMod val="50000"/>
+                          </a:schemeClr>
+                        </a:buClr>
+                        <a:buSzPct val="120000"/>
+                        <a:buFont typeface="Courier New" panose="02070309020205020404" pitchFamily="49" charset="0"/>
+                        <a:buChar char="|"/>
+                        <a:tabLst/>
+                        <a:defRPr/>
+                      </a:pPr>
+                      <a:r>
+                        <a:rPr lang="en-US" sz="1600" b="1" baseline="0" dirty="0">
+                          <a:solidFill>
+                            <a:schemeClr val="accent6"/>
+                          </a:solidFill>
+                          <a:latin typeface="Courier New" panose="02070309020205020404" pitchFamily="49" charset="0"/>
+                          <a:cs typeface="Courier New" panose="02070309020205020404" pitchFamily="49" charset="0"/>
+                        </a:rPr>
+                        <a:t>getting item 1</a:t>
+                      </a:r>
+                    </a:p>
+                    <a:p>
+                      <a:pPr marL="266700" marR="0" lvl="0" indent="-266700" algn="l" defTabSz="914400" rtl="0" eaLnBrk="1" fontAlgn="auto" latinLnBrk="0" hangingPunct="1">
+                        <a:lnSpc>
+                          <a:spcPct val="100000"/>
+                        </a:lnSpc>
+                        <a:spcBef>
+                          <a:spcPts val="0"/>
+                        </a:spcBef>
+                        <a:spcAft>
+                          <a:spcPts val="0"/>
+                        </a:spcAft>
+                        <a:buClr>
+                          <a:schemeClr val="accent1">
+                            <a:lumMod val="50000"/>
+                          </a:schemeClr>
+                        </a:buClr>
+                        <a:buSzPct val="120000"/>
+                        <a:buFont typeface="Courier New" panose="02070309020205020404" pitchFamily="49" charset="0"/>
+                        <a:buChar char="|"/>
+                        <a:tabLst/>
+                        <a:defRPr/>
+                      </a:pPr>
+                      <a:r>
+                        <a:rPr lang="en-US" sz="1600" b="1" baseline="0" dirty="0">
+                          <a:solidFill>
+                            <a:schemeClr val="accent6"/>
+                          </a:solidFill>
+                          <a:latin typeface="Courier New" panose="02070309020205020404" pitchFamily="49" charset="0"/>
+                          <a:cs typeface="Courier New" panose="02070309020205020404" pitchFamily="49" charset="0"/>
+                        </a:rPr>
+                        <a:t>getting item 2</a:t>
+                      </a:r>
+                    </a:p>
+                    <a:p>
+                      <a:pPr marL="266700" marR="0" lvl="0" indent="-266700" algn="l" defTabSz="914400" rtl="0" eaLnBrk="1" fontAlgn="auto" latinLnBrk="0" hangingPunct="1">
+                        <a:lnSpc>
+                          <a:spcPct val="100000"/>
+                        </a:lnSpc>
+                        <a:spcBef>
+                          <a:spcPts val="0"/>
+                        </a:spcBef>
+                        <a:spcAft>
+                          <a:spcPts val="0"/>
+                        </a:spcAft>
+                        <a:buClr>
+                          <a:schemeClr val="accent1">
+                            <a:lumMod val="50000"/>
+                          </a:schemeClr>
+                        </a:buClr>
+                        <a:buSzPct val="120000"/>
+                        <a:buFont typeface="Courier New" panose="02070309020205020404" pitchFamily="49" charset="0"/>
+                        <a:buChar char="|"/>
+                        <a:tabLst/>
+                        <a:defRPr/>
+                      </a:pPr>
+                      <a:r>
+                        <a:rPr lang="en-US" sz="1600" b="1" baseline="0" dirty="0">
+                          <a:solidFill>
+                            <a:schemeClr val="accent6"/>
+                          </a:solidFill>
+                          <a:latin typeface="Courier New" panose="02070309020205020404" pitchFamily="49" charset="0"/>
+                          <a:cs typeface="Courier New" panose="02070309020205020404" pitchFamily="49" charset="0"/>
+                        </a:rPr>
+                        <a:t>getting item 3</a:t>
+                      </a:r>
+                    </a:p>
+                    <a:p>
+                      <a:pPr marL="266700" marR="0" lvl="0" indent="-266700" algn="l" defTabSz="914400" rtl="0" eaLnBrk="1" fontAlgn="auto" latinLnBrk="0" hangingPunct="1">
+                        <a:lnSpc>
+                          <a:spcPct val="100000"/>
+                        </a:lnSpc>
+                        <a:spcBef>
+                          <a:spcPts val="0"/>
+                        </a:spcBef>
+                        <a:spcAft>
+                          <a:spcPts val="0"/>
+                        </a:spcAft>
+                        <a:buClr>
+                          <a:schemeClr val="accent1">
+                            <a:lumMod val="50000"/>
+                          </a:schemeClr>
+                        </a:buClr>
+                        <a:buSzPct val="120000"/>
+                        <a:buFont typeface="Courier New" panose="02070309020205020404" pitchFamily="49" charset="0"/>
+                        <a:buChar char="|"/>
+                        <a:tabLst/>
+                        <a:defRPr/>
+                      </a:pPr>
+                      <a:r>
+                        <a:rPr lang="en-US" sz="1600" b="1" baseline="0" dirty="0">
+                          <a:solidFill>
+                            <a:schemeClr val="accent6"/>
+                          </a:solidFill>
+                          <a:latin typeface="Courier New" panose="02070309020205020404" pitchFamily="49" charset="0"/>
+                          <a:cs typeface="Courier New" panose="02070309020205020404" pitchFamily="49" charset="0"/>
+                        </a:rPr>
+                        <a:t>getting item 4</a:t>
+                      </a:r>
+                    </a:p>
+                    <a:p>
+                      <a:pPr marL="266700" marR="0" lvl="0" indent="-266700" algn="l" defTabSz="914400" rtl="0" eaLnBrk="1" fontAlgn="auto" latinLnBrk="0" hangingPunct="1">
+                        <a:lnSpc>
+                          <a:spcPct val="100000"/>
+                        </a:lnSpc>
+                        <a:spcBef>
+                          <a:spcPts val="0"/>
+                        </a:spcBef>
+                        <a:spcAft>
+                          <a:spcPts val="0"/>
+                        </a:spcAft>
+                        <a:buClr>
+                          <a:schemeClr val="accent1">
+                            <a:lumMod val="50000"/>
+                          </a:schemeClr>
+                        </a:buClr>
+                        <a:buSzPct val="120000"/>
+                        <a:buFont typeface="Courier New" panose="02070309020205020404" pitchFamily="49" charset="0"/>
+                        <a:buChar char="|"/>
+                        <a:tabLst/>
+                        <a:defRPr/>
+                      </a:pPr>
+                      <a:r>
+                        <a:rPr lang="en-US" sz="1600" b="1" baseline="0" dirty="0">
+                          <a:solidFill>
+                            <a:schemeClr val="accent6"/>
+                          </a:solidFill>
+                          <a:latin typeface="Courier New" panose="02070309020205020404" pitchFamily="49" charset="0"/>
+                          <a:cs typeface="Courier New" panose="02070309020205020404" pitchFamily="49" charset="0"/>
+                        </a:rPr>
+                        <a:t>getting item 5</a:t>
+                      </a:r>
+                    </a:p>
+                    <a:p>
+                      <a:pPr marL="266700" marR="0" lvl="0" indent="-266700" algn="l" defTabSz="914400" rtl="0" eaLnBrk="1" fontAlgn="auto" latinLnBrk="0" hangingPunct="1">
+                        <a:lnSpc>
+                          <a:spcPct val="100000"/>
+                        </a:lnSpc>
+                        <a:spcBef>
+                          <a:spcPts val="0"/>
+                        </a:spcBef>
+                        <a:spcAft>
+                          <a:spcPts val="0"/>
+                        </a:spcAft>
+                        <a:buClr>
+                          <a:schemeClr val="accent1">
+                            <a:lumMod val="50000"/>
+                          </a:schemeClr>
+                        </a:buClr>
+                        <a:buSzPct val="120000"/>
+                        <a:buFont typeface="Courier New" panose="02070309020205020404" pitchFamily="49" charset="0"/>
+                        <a:buChar char="|"/>
+                        <a:tabLst/>
+                        <a:defRPr/>
+                      </a:pPr>
+                      <a:r>
+                        <a:rPr lang="en-US" sz="1600" b="1" baseline="0" dirty="0">
+                          <a:solidFill>
+                            <a:schemeClr val="accent6"/>
+                          </a:solidFill>
+                          <a:latin typeface="Courier New" panose="02070309020205020404" pitchFamily="49" charset="0"/>
+                          <a:cs typeface="Courier New" panose="02070309020205020404" pitchFamily="49" charset="0"/>
+                        </a:rPr>
+                        <a:t>getting item 6</a:t>
+                      </a:r>
+                    </a:p>
+                    <a:p>
+                      <a:pPr marL="266700" marR="0" lvl="0" indent="-266700" algn="l" defTabSz="914400" rtl="0" eaLnBrk="1" fontAlgn="auto" latinLnBrk="0" hangingPunct="1">
+                        <a:lnSpc>
+                          <a:spcPct val="100000"/>
+                        </a:lnSpc>
+                        <a:spcBef>
+                          <a:spcPts val="0"/>
+                        </a:spcBef>
+                        <a:spcAft>
+                          <a:spcPts val="0"/>
+                        </a:spcAft>
+                        <a:buClr>
+                          <a:schemeClr val="accent1">
+                            <a:lumMod val="50000"/>
+                          </a:schemeClr>
+                        </a:buClr>
+                        <a:buSzPct val="120000"/>
+                        <a:buFont typeface="Courier New" panose="02070309020205020404" pitchFamily="49" charset="0"/>
+                        <a:buChar char="|"/>
+                        <a:tabLst/>
+                        <a:defRPr/>
+                      </a:pPr>
+                      <a:r>
+                        <a:rPr lang="en-US" sz="1600" b="1" baseline="0" dirty="0">
+                          <a:solidFill>
+                            <a:schemeClr val="accent6"/>
+                          </a:solidFill>
+                          <a:latin typeface="Courier New" panose="02070309020205020404" pitchFamily="49" charset="0"/>
+                          <a:cs typeface="Courier New" panose="02070309020205020404" pitchFamily="49" charset="0"/>
+                        </a:rPr>
+                        <a:t>getting item 7</a:t>
+                      </a:r>
+                    </a:p>
+                    <a:p>
+                      <a:pPr marL="266700" marR="0" lvl="0" indent="-266700" algn="l" defTabSz="914400" rtl="0" eaLnBrk="1" fontAlgn="auto" latinLnBrk="0" hangingPunct="1">
+                        <a:lnSpc>
+                          <a:spcPct val="100000"/>
+                        </a:lnSpc>
+                        <a:spcBef>
+                          <a:spcPts val="0"/>
+                        </a:spcBef>
+                        <a:spcAft>
+                          <a:spcPts val="0"/>
+                        </a:spcAft>
+                        <a:buClr>
+                          <a:schemeClr val="accent1">
+                            <a:lumMod val="50000"/>
+                          </a:schemeClr>
+                        </a:buClr>
+                        <a:buSzPct val="120000"/>
+                        <a:buFont typeface="Courier New" panose="02070309020205020404" pitchFamily="49" charset="0"/>
+                        <a:buChar char="|"/>
+                        <a:tabLst/>
+                        <a:defRPr/>
+                      </a:pPr>
+                      <a:r>
+                        <a:rPr lang="en-US" sz="1600" b="1" baseline="0" dirty="0">
+                          <a:solidFill>
+                            <a:schemeClr val="accent6"/>
+                          </a:solidFill>
+                          <a:latin typeface="Courier New" panose="02070309020205020404" pitchFamily="49" charset="0"/>
+                          <a:cs typeface="Courier New" panose="02070309020205020404" pitchFamily="49" charset="0"/>
+                        </a:rPr>
+                        <a:t>getting item 8</a:t>
+                      </a:r>
+                    </a:p>
+                    <a:p>
+                      <a:pPr marL="266700" marR="0" lvl="0" indent="-266700" algn="l" defTabSz="914400" rtl="0" eaLnBrk="1" fontAlgn="auto" latinLnBrk="0" hangingPunct="1">
+                        <a:lnSpc>
+                          <a:spcPct val="100000"/>
+                        </a:lnSpc>
+                        <a:spcBef>
+                          <a:spcPts val="0"/>
+                        </a:spcBef>
+                        <a:spcAft>
+                          <a:spcPts val="0"/>
+                        </a:spcAft>
+                        <a:buClr>
+                          <a:schemeClr val="accent1">
+                            <a:lumMod val="50000"/>
+                          </a:schemeClr>
+                        </a:buClr>
+                        <a:buSzPct val="120000"/>
+                        <a:buFont typeface="Courier New" panose="02070309020205020404" pitchFamily="49" charset="0"/>
+                        <a:buChar char="|"/>
+                        <a:tabLst/>
+                        <a:defRPr/>
+                      </a:pPr>
+                      <a:r>
+                        <a:rPr lang="en-US" sz="1600" b="1" baseline="0" dirty="0">
+                          <a:solidFill>
+                            <a:schemeClr val="accent6"/>
+                          </a:solidFill>
+                          <a:latin typeface="Courier New" panose="02070309020205020404" pitchFamily="49" charset="0"/>
+                          <a:cs typeface="Courier New" panose="02070309020205020404" pitchFamily="49" charset="0"/>
+                        </a:rPr>
+                        <a:t>getting item 9</a:t>
+                      </a:r>
+                    </a:p>
+                    <a:p>
+                      <a:pPr marL="266700" marR="0" lvl="0" indent="-266700" algn="l" defTabSz="914400" rtl="0" eaLnBrk="1" fontAlgn="auto" latinLnBrk="0" hangingPunct="1">
+                        <a:lnSpc>
+                          <a:spcPct val="100000"/>
+                        </a:lnSpc>
+                        <a:spcBef>
+                          <a:spcPts val="0"/>
+                        </a:spcBef>
+                        <a:spcAft>
+                          <a:spcPts val="0"/>
+                        </a:spcAft>
+                        <a:buClr>
+                          <a:schemeClr val="accent1">
+                            <a:lumMod val="50000"/>
+                          </a:schemeClr>
+                        </a:buClr>
+                        <a:buSzPct val="120000"/>
+                        <a:buFont typeface="Courier New" panose="02070309020205020404" pitchFamily="49" charset="0"/>
+                        <a:buChar char="|"/>
+                        <a:tabLst/>
+                        <a:defRPr/>
+                      </a:pPr>
+                      <a:r>
+                        <a:rPr lang="en-US" sz="1600" b="1" baseline="0" dirty="0">
+                          <a:solidFill>
+                            <a:schemeClr val="accent6"/>
+                          </a:solidFill>
+                          <a:latin typeface="Courier New" panose="02070309020205020404" pitchFamily="49" charset="0"/>
+                          <a:cs typeface="Courier New" panose="02070309020205020404" pitchFamily="49" charset="0"/>
+                        </a:rPr>
+                        <a:t>getting item 10</a:t>
+                      </a:r>
+                    </a:p>
+                    <a:p>
+                      <a:pPr marL="266700" marR="0" lvl="0" indent="-266700" algn="l" defTabSz="914400" rtl="0" eaLnBrk="1" fontAlgn="auto" latinLnBrk="0" hangingPunct="1">
+                        <a:lnSpc>
+                          <a:spcPct val="100000"/>
+                        </a:lnSpc>
+                        <a:spcBef>
+                          <a:spcPts val="0"/>
+                        </a:spcBef>
+                        <a:spcAft>
+                          <a:spcPts val="0"/>
+                        </a:spcAft>
+                        <a:buClr>
+                          <a:schemeClr val="accent1">
+                            <a:lumMod val="50000"/>
+                          </a:schemeClr>
+                        </a:buClr>
+                        <a:buSzPct val="120000"/>
+                        <a:buFont typeface="Courier New" panose="02070309020205020404" pitchFamily="49" charset="0"/>
+                        <a:buChar char="|"/>
+                        <a:tabLst/>
+                        <a:defRPr/>
+                      </a:pPr>
+                      <a:r>
+                        <a:rPr lang="en-US" sz="1600" b="1" baseline="0" dirty="0">
+                          <a:solidFill>
+                            <a:schemeClr val="tx1"/>
+                          </a:solidFill>
+                          <a:latin typeface="Courier New" panose="02070309020205020404" pitchFamily="49" charset="0"/>
+                          <a:cs typeface="Courier New" panose="02070309020205020404" pitchFamily="49" charset="0"/>
+                        </a:rPr>
+                        <a:t>False</a:t>
+                      </a:r>
+                    </a:p>
+                  </a:txBody>
+                  <a:tcPr>
+                    <a:lnL w="6350" cap="flat" cmpd="sng" algn="ctr">
+                      <a:solidFill>
+                        <a:schemeClr val="tx1"/>
+                      </a:solidFill>
+                      <a:prstDash val="solid"/>
+                      <a:round/>
+                      <a:headEnd type="none" w="med" len="med"/>
+                      <a:tailEnd type="none" w="med" len="med"/>
+                    </a:lnL>
+                    <a:lnR w="6350" cap="flat" cmpd="sng" algn="ctr">
+                      <a:solidFill>
+                        <a:schemeClr val="tx1"/>
+                      </a:solidFill>
+                      <a:prstDash val="solid"/>
+                      <a:round/>
+                      <a:headEnd type="none" w="med" len="med"/>
+                      <a:tailEnd type="none" w="med" len="med"/>
+                    </a:lnR>
+                    <a:lnT w="6350" cap="flat" cmpd="sng" algn="ctr">
+                      <a:solidFill>
+                        <a:schemeClr val="tx1"/>
+                      </a:solidFill>
+                      <a:prstDash val="solid"/>
+                      <a:round/>
+                      <a:headEnd type="none" w="med" len="med"/>
+                      <a:tailEnd type="none" w="med" len="med"/>
+                    </a:lnT>
+                    <a:lnB w="6350" cap="flat" cmpd="sng" algn="ctr">
+                      <a:solidFill>
+                        <a:schemeClr val="tx1"/>
+                      </a:solidFill>
+                      <a:prstDash val="solid"/>
+                      <a:round/>
+                      <a:headEnd type="none" w="med" len="med"/>
+                      <a:tailEnd type="none" w="med" len="med"/>
+                    </a:lnB>
+                    <a:lnTlToBr w="12700" cmpd="sng">
+                      <a:noFill/>
+                      <a:prstDash val="solid"/>
+                    </a:lnTlToBr>
+                    <a:lnBlToTr w="12700" cmpd="sng">
+                      <a:noFill/>
+                      <a:prstDash val="solid"/>
+                    </a:lnBlToTr>
+                    <a:solidFill>
+                      <a:schemeClr val="accent5">
+                        <a:lumMod val="20000"/>
+                        <a:lumOff val="80000"/>
+                      </a:schemeClr>
+                    </a:solidFill>
+                  </a:tcPr>
+                </a:tc>
+                <a:extLst>
+                  <a:ext uri="{0D108BD9-81ED-4DB2-BD59-A6C34878D82A}">
+                    <a16:rowId xmlns:a16="http://schemas.microsoft.com/office/drawing/2014/main" val="4112970457"/>
+                  </a:ext>
+                </a:extLst>
+              </a:tr>
+            </a:tbl>
+          </a:graphicData>
+        </a:graphic>
+      </p:graphicFrame>
+      <p:sp>
+        <p:nvSpPr>
+          <p:cNvPr id="8" name="TextBox 7">
+            <a:extLst>
+              <a:ext uri="{FF2B5EF4-FFF2-40B4-BE49-F238E27FC236}">
+                <a16:creationId xmlns:a16="http://schemas.microsoft.com/office/drawing/2014/main" id="{BF9B9ECB-D779-D139-ACE1-1DF1A3FDFE00}"/>
+              </a:ext>
+            </a:extLst>
+          </p:cNvPr>
+          <p:cNvSpPr txBox="1"/>
+          <p:nvPr/>
+        </p:nvSpPr>
+        <p:spPr>
+          <a:xfrm>
+            <a:off x="4691159" y="6488668"/>
+            <a:ext cx="7377748" cy="369332"/>
+          </a:xfrm>
+          <a:prstGeom prst="rect">
+            <a:avLst/>
+          </a:prstGeom>
+          <a:noFill/>
+        </p:spPr>
+        <p:txBody>
+          <a:bodyPr wrap="square">
+            <a:spAutoFit/>
+          </a:bodyPr>
+          <a:lstStyle/>
+          <a:p>
+            <a:pPr algn="r"/>
+            <a:r>
+              <a:rPr lang="da-DK" dirty="0">
+                <a:hlinkClick r:id="rId3"/>
+              </a:rPr>
+              <a:t>https://docs.python.org/3/reference/datamodel.html#object.__contains__</a:t>
+            </a:r>
+            <a:endParaRPr lang="da-DK" dirty="0"/>
+          </a:p>
+        </p:txBody>
+      </p:sp>
+      <p:sp>
+        <p:nvSpPr>
+          <p:cNvPr id="26" name="Rectangle 25">
+            <a:extLst>
+              <a:ext uri="{FF2B5EF4-FFF2-40B4-BE49-F238E27FC236}">
+                <a16:creationId xmlns:a16="http://schemas.microsoft.com/office/drawing/2014/main" id="{F9AEF6FF-9E68-4748-909B-AF3227784463}"/>
+              </a:ext>
+            </a:extLst>
+          </p:cNvPr>
+          <p:cNvSpPr/>
+          <p:nvPr/>
+        </p:nvSpPr>
+        <p:spPr>
+          <a:xfrm>
+            <a:off x="9340645" y="119419"/>
+            <a:ext cx="2728261" cy="617745"/>
+          </a:xfrm>
+          <a:prstGeom prst="rect">
+            <a:avLst/>
+          </a:prstGeom>
+          <a:solidFill>
+            <a:srgbClr val="FFFF00"/>
+          </a:solidFill>
+          <a:ln w="6350">
+            <a:solidFill>
+              <a:schemeClr val="tx1"/>
+            </a:solidFill>
+          </a:ln>
+        </p:spPr>
+        <p:style>
+          <a:lnRef idx="2">
+            <a:schemeClr val="accent1">
+              <a:shade val="50000"/>
+            </a:schemeClr>
+          </a:lnRef>
+          <a:fillRef idx="1">
+            <a:schemeClr val="accent1"/>
+          </a:fillRef>
+          <a:effectRef idx="0">
+            <a:schemeClr val="accent1"/>
+          </a:effectRef>
+          <a:fontRef idx="minor">
+            <a:schemeClr val="lt1"/>
+          </a:fontRef>
+        </p:style>
+        <p:txBody>
+          <a:bodyPr rtlCol="0" anchor="ctr"/>
+          <a:lstStyle/>
+          <a:p>
+            <a:pPr algn="ctr"/>
+            <a:r>
+              <a:rPr lang="en-US" dirty="0">
+                <a:solidFill>
+                  <a:schemeClr val="tx1"/>
+                </a:solidFill>
+              </a:rPr>
+              <a:t>This is a reminiscence from Python 1 – now rarely used</a:t>
+            </a:r>
+            <a:endParaRPr lang="da-DK" dirty="0">
+              <a:solidFill>
+                <a:schemeClr val="tx1"/>
+              </a:solidFill>
+            </a:endParaRPr>
+          </a:p>
+        </p:txBody>
+      </p:sp>
+      <p:cxnSp>
+        <p:nvCxnSpPr>
+          <p:cNvPr id="10" name="Straight Arrow Connector 9">
+            <a:extLst>
+              <a:ext uri="{FF2B5EF4-FFF2-40B4-BE49-F238E27FC236}">
+                <a16:creationId xmlns:a16="http://schemas.microsoft.com/office/drawing/2014/main" id="{DA53FA89-5FD7-23F9-743B-DD5245CA8AF7}"/>
+              </a:ext>
+            </a:extLst>
+          </p:cNvPr>
+          <p:cNvCxnSpPr>
+            <a:cxnSpLocks/>
+          </p:cNvCxnSpPr>
+          <p:nvPr/>
+        </p:nvCxnSpPr>
+        <p:spPr>
+          <a:xfrm flipH="1">
+            <a:off x="6045148" y="1497806"/>
+            <a:ext cx="734271" cy="445241"/>
+          </a:xfrm>
+          <a:prstGeom prst="straightConnector1">
+            <a:avLst/>
+          </a:prstGeom>
+          <a:ln w="57150">
+            <a:solidFill>
+              <a:schemeClr val="accent5">
+                <a:lumMod val="20000"/>
+                <a:lumOff val="80000"/>
+              </a:schemeClr>
+            </a:solidFill>
+            <a:headEnd type="none" w="lg" len="lg"/>
+            <a:tailEnd type="triangle" w="lg" len="lg"/>
+          </a:ln>
+        </p:spPr>
+        <p:style>
+          <a:lnRef idx="1">
+            <a:schemeClr val="accent1"/>
+          </a:lnRef>
+          <a:fillRef idx="0">
+            <a:schemeClr val="accent1"/>
+          </a:fillRef>
+          <a:effectRef idx="0">
+            <a:schemeClr val="accent1"/>
+          </a:effectRef>
+          <a:fontRef idx="minor">
+            <a:schemeClr val="tx1"/>
+          </a:fontRef>
+        </p:style>
+      </p:cxnSp>
+      <p:sp>
+        <p:nvSpPr>
+          <p:cNvPr id="27" name="Rectangle 26">
+            <a:extLst>
+              <a:ext uri="{FF2B5EF4-FFF2-40B4-BE49-F238E27FC236}">
+                <a16:creationId xmlns:a16="http://schemas.microsoft.com/office/drawing/2014/main" id="{C9C7C5A9-27F4-C293-4C4D-D4A7879C7476}"/>
+              </a:ext>
+            </a:extLst>
+          </p:cNvPr>
+          <p:cNvSpPr/>
+          <p:nvPr/>
+        </p:nvSpPr>
+        <p:spPr>
+          <a:xfrm>
+            <a:off x="6656439" y="1294448"/>
+            <a:ext cx="432106" cy="219412"/>
+          </a:xfrm>
+          <a:prstGeom prst="rect">
+            <a:avLst/>
+          </a:prstGeom>
+          <a:solidFill>
+            <a:schemeClr val="bg1"/>
+          </a:solidFill>
+          <a:ln>
+            <a:noFill/>
+          </a:ln>
+        </p:spPr>
+        <p:style>
+          <a:lnRef idx="2">
+            <a:schemeClr val="accent1">
+              <a:shade val="50000"/>
+            </a:schemeClr>
+          </a:lnRef>
+          <a:fillRef idx="1">
+            <a:schemeClr val="accent1"/>
+          </a:fillRef>
+          <a:effectRef idx="0">
+            <a:schemeClr val="accent1"/>
+          </a:effectRef>
+          <a:fontRef idx="minor">
+            <a:schemeClr val="lt1"/>
+          </a:fontRef>
+        </p:style>
+        <p:txBody>
+          <a:bodyPr rtlCol="0" anchor="ctr"/>
+          <a:lstStyle/>
+          <a:p>
+            <a:pPr algn="ctr"/>
+            <a:endParaRPr lang="da-DK"/>
+          </a:p>
+        </p:txBody>
+      </p:sp>
+      <p:cxnSp>
+        <p:nvCxnSpPr>
+          <p:cNvPr id="12" name="Straight Arrow Connector 11">
+            <a:extLst>
+              <a:ext uri="{FF2B5EF4-FFF2-40B4-BE49-F238E27FC236}">
+                <a16:creationId xmlns:a16="http://schemas.microsoft.com/office/drawing/2014/main" id="{D6315816-4F4B-81B0-B96B-5BEBDDF202AD}"/>
+              </a:ext>
+            </a:extLst>
+          </p:cNvPr>
+          <p:cNvCxnSpPr>
+            <a:cxnSpLocks/>
+          </p:cNvCxnSpPr>
+          <p:nvPr/>
+        </p:nvCxnSpPr>
+        <p:spPr>
+          <a:xfrm flipH="1">
+            <a:off x="6099175" y="1373187"/>
+            <a:ext cx="882650" cy="533400"/>
+          </a:xfrm>
+          <a:prstGeom prst="straightConnector1">
+            <a:avLst/>
+          </a:prstGeom>
+          <a:ln w="38100">
+            <a:solidFill>
+              <a:srgbClr val="C00000"/>
+            </a:solidFill>
+            <a:headEnd type="none" w="lg" len="lg"/>
+            <a:tailEnd type="triangle" w="lg" len="lg"/>
+          </a:ln>
+        </p:spPr>
+        <p:style>
+          <a:lnRef idx="1">
+            <a:schemeClr val="accent1"/>
+          </a:lnRef>
+          <a:fillRef idx="0">
+            <a:schemeClr val="accent1"/>
+          </a:fillRef>
+          <a:effectRef idx="0">
+            <a:schemeClr val="accent1"/>
+          </a:effectRef>
+          <a:fontRef idx="minor">
+            <a:schemeClr val="tx1"/>
+          </a:fontRef>
+        </p:style>
+      </p:cxnSp>
+      <p:sp>
+        <p:nvSpPr>
+          <p:cNvPr id="13" name="TextBox 12">
+            <a:extLst>
+              <a:ext uri="{FF2B5EF4-FFF2-40B4-BE49-F238E27FC236}">
+                <a16:creationId xmlns:a16="http://schemas.microsoft.com/office/drawing/2014/main" id="{DB01946D-D27F-6A7A-0D52-01295BA1DABD}"/>
+              </a:ext>
+            </a:extLst>
+          </p:cNvPr>
+          <p:cNvSpPr txBox="1"/>
+          <p:nvPr/>
+        </p:nvSpPr>
+        <p:spPr>
+          <a:xfrm>
+            <a:off x="6907545" y="1120695"/>
+            <a:ext cx="4884590" cy="400110"/>
+          </a:xfrm>
+          <a:prstGeom prst="rect">
+            <a:avLst/>
+          </a:prstGeom>
+          <a:noFill/>
+        </p:spPr>
+        <p:txBody>
+          <a:bodyPr wrap="square" rtlCol="0">
+            <a:spAutoFit/>
+          </a:bodyPr>
+          <a:lstStyle/>
+          <a:p>
+            <a:r>
+              <a:rPr lang="en-US" sz="2000" dirty="0" err="1">
+                <a:solidFill>
+                  <a:srgbClr val="C00000"/>
+                </a:solidFill>
+                <a:latin typeface="Courier"/>
+              </a:rPr>
+              <a:t>odds.__contains</a:t>
+            </a:r>
+            <a:r>
+              <a:rPr lang="en-US" sz="2000" dirty="0">
+                <a:solidFill>
+                  <a:srgbClr val="C00000"/>
+                </a:solidFill>
+                <a:latin typeface="Courier"/>
+              </a:rPr>
+              <a:t>__</a:t>
+            </a:r>
+            <a:r>
+              <a:rPr lang="en-US" sz="2000" dirty="0">
+                <a:solidFill>
+                  <a:srgbClr val="C00000"/>
+                </a:solidFill>
+              </a:rPr>
+              <a:t> does not exist</a:t>
+            </a:r>
+          </a:p>
+        </p:txBody>
+      </p:sp>
+    </p:spTree>
+    <p:extLst>
+      <p:ext uri="{BB962C8B-B14F-4D97-AF65-F5344CB8AC3E}">
+        <p14:creationId xmlns:p14="http://schemas.microsoft.com/office/powerpoint/2010/main" val="3533997958"/>
+      </p:ext>
+    </p:extLst>
+  </p:cSld>
+  <p:clrMapOvr>
+    <a:masterClrMapping/>
+  </p:clrMapOvr>
+</p:sld>
+</file>
+
+<file path=ppt/slides/slide12.xml><?xml version="1.0" encoding="utf-8"?>
+<p:sld xmlns:a="http://schemas.openxmlformats.org/drawingml/2006/main" xmlns:r="http://schemas.openxmlformats.org/officeDocument/2006/relationships" xmlns:p="http://schemas.openxmlformats.org/presentationml/2006/main">
+  <p:cSld>
+    <p:spTree>
+      <p:nvGrpSpPr>
+        <p:cNvPr id="1" name=""/>
+        <p:cNvGrpSpPr/>
+        <p:nvPr/>
+      </p:nvGrpSpPr>
+      <p:grpSpPr>
+        <a:xfrm>
+          <a:off x="0" y="0"/>
+          <a:ext cx="0" cy="0"/>
+          <a:chOff x="0" y="0"/>
+          <a:chExt cx="0" cy="0"/>
+        </a:xfrm>
+      </p:grpSpPr>
+      <p:sp>
+        <p:nvSpPr>
           <p:cNvPr id="2" name="Title 1"/>
           <p:cNvSpPr>
             <a:spLocks noGrp="1"/>
@@ -7527,7 +10075,7 @@
 </p:sld>
 </file>
 
-<file path=ppt/slides/slide12.xml><?xml version="1.0" encoding="utf-8"?>
+<file path=ppt/slides/slide13.xml><?xml version="1.0" encoding="utf-8"?>
 <p:sld xmlns:a="http://schemas.openxmlformats.org/drawingml/2006/main" xmlns:r="http://schemas.openxmlformats.org/officeDocument/2006/relationships" xmlns:p="http://schemas.openxmlformats.org/presentationml/2006/main">
   <p:cSld>
     <p:spTree>
@@ -8166,7 +10714,7 @@
 </p:sld>
 </file>
 
-<file path=ppt/slides/slide13.xml><?xml version="1.0" encoding="utf-8"?>
+<file path=ppt/slides/slide14.xml><?xml version="1.0" encoding="utf-8"?>
 <p:sld xmlns:a="http://schemas.openxmlformats.org/drawingml/2006/main" xmlns:r="http://schemas.openxmlformats.org/officeDocument/2006/relationships" xmlns:p="http://schemas.openxmlformats.org/presentationml/2006/main">
   <p:cSld>
     <p:spTree>
@@ -8911,7 +11459,7 @@
 </p:sld>
 </file>
 
-<file path=ppt/slides/slide14.xml><?xml version="1.0" encoding="utf-8"?>
+<file path=ppt/slides/slide15.xml><?xml version="1.0" encoding="utf-8"?>
 <p:sld xmlns:a="http://schemas.openxmlformats.org/drawingml/2006/main" xmlns:r="http://schemas.openxmlformats.org/officeDocument/2006/relationships" xmlns:p="http://schemas.openxmlformats.org/presentationml/2006/main">
   <p:cSld>
     <p:spTree>
@@ -8971,7 +11519,7 @@
 </p:sld>
 </file>
 
-<file path=ppt/slides/slide15.xml><?xml version="1.0" encoding="utf-8"?>
+<file path=ppt/slides/slide16.xml><?xml version="1.0" encoding="utf-8"?>
 <p:sld xmlns:a="http://schemas.openxmlformats.org/drawingml/2006/main" xmlns:r="http://schemas.openxmlformats.org/officeDocument/2006/relationships" xmlns:p="http://schemas.openxmlformats.org/presentationml/2006/main">
   <p:cSld>
     <p:spTree>
@@ -9856,7 +12404,7 @@
 </p:sld>
 </file>
 
-<file path=ppt/slides/slide16.xml><?xml version="1.0" encoding="utf-8"?>
+<file path=ppt/slides/slide17.xml><?xml version="1.0" encoding="utf-8"?>
 <p:sld xmlns:a="http://schemas.openxmlformats.org/drawingml/2006/main" xmlns:r="http://schemas.openxmlformats.org/officeDocument/2006/relationships" xmlns:p="http://schemas.openxmlformats.org/presentationml/2006/main">
   <p:cSld>
     <p:spTree>
@@ -10596,7 +13144,7 @@
 </p:sld>
 </file>
 
-<file path=ppt/slides/slide17.xml><?xml version="1.0" encoding="utf-8"?>
+<file path=ppt/slides/slide18.xml><?xml version="1.0" encoding="utf-8"?>
 <p:sld xmlns:a="http://schemas.openxmlformats.org/drawingml/2006/main" xmlns:r="http://schemas.openxmlformats.org/officeDocument/2006/relationships" xmlns:p="http://schemas.openxmlformats.org/presentationml/2006/main">
   <p:cSld>
     <p:spTree>
@@ -11231,7 +13779,7 @@
 </p:sld>
 </file>
 
-<file path=ppt/slides/slide18.xml><?xml version="1.0" encoding="utf-8"?>
+<file path=ppt/slides/slide19.xml><?xml version="1.0" encoding="utf-8"?>
 <p:sld xmlns:a="http://schemas.openxmlformats.org/drawingml/2006/main" xmlns:r="http://schemas.openxmlformats.org/officeDocument/2006/relationships" xmlns:p="http://schemas.openxmlformats.org/presentationml/2006/main">
   <p:cSld>
     <p:spTree>
@@ -12513,745 +15061,6 @@
 </p:sld>
 </file>
 
-<file path=ppt/slides/slide19.xml><?xml version="1.0" encoding="utf-8"?>
-<p:sld xmlns:a="http://schemas.openxmlformats.org/drawingml/2006/main" xmlns:r="http://schemas.openxmlformats.org/officeDocument/2006/relationships" xmlns:p="http://schemas.openxmlformats.org/presentationml/2006/main">
-  <p:cSld>
-    <p:spTree>
-      <p:nvGrpSpPr>
-        <p:cNvPr id="1" name=""/>
-        <p:cNvGrpSpPr/>
-        <p:nvPr/>
-      </p:nvGrpSpPr>
-      <p:grpSpPr>
-        <a:xfrm>
-          <a:off x="0" y="0"/>
-          <a:ext cx="0" cy="0"/>
-          <a:chOff x="0" y="0"/>
-          <a:chExt cx="0" cy="0"/>
-        </a:xfrm>
-      </p:grpSpPr>
-      <p:sp>
-        <p:nvSpPr>
-          <p:cNvPr id="2" name="Title 1"/>
-          <p:cNvSpPr>
-            <a:spLocks noGrp="1"/>
-          </p:cNvSpPr>
-          <p:nvPr>
-            <p:ph type="title"/>
-          </p:nvPr>
-        </p:nvSpPr>
-        <p:spPr/>
-        <p:txBody>
-          <a:bodyPr/>
-          <a:lstStyle/>
-          <a:p>
-            <a:r>
-              <a:rPr lang="en-US" dirty="0"/>
-              <a:t>Generator functions (II)</a:t>
-            </a:r>
-          </a:p>
-        </p:txBody>
-      </p:sp>
-      <p:graphicFrame>
-        <p:nvGraphicFramePr>
-          <p:cNvPr id="4" name="Table 3"/>
-          <p:cNvGraphicFramePr>
-            <a:graphicFrameLocks noGrp="1"/>
-          </p:cNvGraphicFramePr>
-          <p:nvPr>
-            <p:extLst>
-              <p:ext uri="{D42A27DB-BD31-4B8C-83A1-F6EECF244321}">
-                <p14:modId xmlns:p14="http://schemas.microsoft.com/office/powerpoint/2010/main" val="3221695435"/>
-              </p:ext>
-            </p:extLst>
-          </p:nvPr>
-        </p:nvGraphicFramePr>
-        <p:xfrm>
-          <a:off x="2048510" y="1767551"/>
-          <a:ext cx="8094980" cy="4754880"/>
-        </p:xfrm>
-        <a:graphic>
-          <a:graphicData uri="http://schemas.openxmlformats.org/drawingml/2006/table">
-            <a:tbl>
-              <a:tblPr firstRow="1" bandRow="1">
-                <a:tableStyleId>{5C22544A-7EE6-4342-B048-85BDC9FD1C3A}</a:tableStyleId>
-              </a:tblPr>
-              <a:tblGrid>
-                <a:gridCol w="8094980">
-                  <a:extLst>
-                    <a:ext uri="{9D8B030D-6E8A-4147-A177-3AD203B41FA5}">
-                      <a16:colId xmlns:a16="http://schemas.microsoft.com/office/drawing/2014/main" val="1873682825"/>
-                    </a:ext>
-                  </a:extLst>
-                </a:gridCol>
-              </a:tblGrid>
-              <a:tr h="148143">
-                <a:tc>
-                  <a:txBody>
-                    <a:bodyPr/>
-                    <a:lstStyle/>
-                    <a:p>
-                      <a:r>
-                        <a:rPr lang="da-DK" sz="1800" b="1" dirty="0">
-                          <a:latin typeface="Courier New" panose="02070309020205020404" pitchFamily="49" charset="0"/>
-                          <a:cs typeface="Courier New" panose="02070309020205020404" pitchFamily="49" charset="0"/>
-                        </a:rPr>
-                        <a:t>my_generator.py</a:t>
-                      </a:r>
-                    </a:p>
-                  </a:txBody>
-                  <a:tcPr anchor="ctr">
-                    <a:lnL w="6350" cap="flat" cmpd="sng" algn="ctr">
-                      <a:solidFill>
-                        <a:schemeClr val="tx1"/>
-                      </a:solidFill>
-                      <a:prstDash val="solid"/>
-                      <a:round/>
-                      <a:headEnd type="none" w="med" len="med"/>
-                      <a:tailEnd type="none" w="med" len="med"/>
-                    </a:lnL>
-                    <a:lnR w="6350" cap="flat" cmpd="sng" algn="ctr">
-                      <a:solidFill>
-                        <a:schemeClr val="tx1"/>
-                      </a:solidFill>
-                      <a:prstDash val="solid"/>
-                      <a:round/>
-                      <a:headEnd type="none" w="med" len="med"/>
-                      <a:tailEnd type="none" w="med" len="med"/>
-                    </a:lnR>
-                    <a:lnT w="6350" cap="flat" cmpd="sng" algn="ctr">
-                      <a:solidFill>
-                        <a:schemeClr val="tx1"/>
-                      </a:solidFill>
-                      <a:prstDash val="solid"/>
-                      <a:round/>
-                      <a:headEnd type="none" w="med" len="med"/>
-                      <a:tailEnd type="none" w="med" len="med"/>
-                    </a:lnT>
-                    <a:lnB w="6350" cap="flat" cmpd="sng" algn="ctr">
-                      <a:solidFill>
-                        <a:schemeClr val="tx1"/>
-                      </a:solidFill>
-                      <a:prstDash val="solid"/>
-                      <a:round/>
-                      <a:headEnd type="none" w="med" len="med"/>
-                      <a:tailEnd type="none" w="med" len="med"/>
-                    </a:lnB>
-                    <a:lnTlToBr w="12700" cmpd="sng">
-                      <a:noFill/>
-                      <a:prstDash val="solid"/>
-                    </a:lnTlToBr>
-                    <a:lnBlToTr w="12700" cmpd="sng">
-                      <a:noFill/>
-                      <a:prstDash val="solid"/>
-                    </a:lnBlToTr>
-                    <a:solidFill>
-                      <a:srgbClr val="C00000"/>
-                    </a:solidFill>
-                  </a:tcPr>
-                </a:tc>
-                <a:extLst>
-                  <a:ext uri="{0D108BD9-81ED-4DB2-BD59-A6C34878D82A}">
-                    <a16:rowId xmlns:a16="http://schemas.microsoft.com/office/drawing/2014/main" val="3330819881"/>
-                  </a:ext>
-                </a:extLst>
-              </a:tr>
-              <a:tr h="297347">
-                <a:tc>
-                  <a:txBody>
-                    <a:bodyPr/>
-                    <a:lstStyle/>
-                    <a:p>
-                      <a:r>
-                        <a:rPr lang="en-US" sz="1800" b="1" dirty="0" err="1">
-                          <a:latin typeface="Courier New" panose="02070309020205020404" pitchFamily="49" charset="0"/>
-                          <a:cs typeface="Courier New" panose="02070309020205020404" pitchFamily="49" charset="0"/>
-                        </a:rPr>
-                        <a:t>def</a:t>
-                      </a:r>
-                      <a:r>
-                        <a:rPr lang="en-US" sz="1800" b="1" dirty="0">
-                          <a:latin typeface="Courier New" panose="02070309020205020404" pitchFamily="49" charset="0"/>
-                          <a:cs typeface="Courier New" panose="02070309020205020404" pitchFamily="49" charset="0"/>
-                        </a:rPr>
-                        <a:t> </a:t>
-                      </a:r>
-                      <a:r>
-                        <a:rPr lang="en-US" sz="1800" b="1" dirty="0" err="1">
-                          <a:latin typeface="Courier New" panose="02070309020205020404" pitchFamily="49" charset="0"/>
-                          <a:cs typeface="Courier New" panose="02070309020205020404" pitchFamily="49" charset="0"/>
-                        </a:rPr>
-                        <a:t>my_generator</a:t>
-                      </a:r>
-                      <a:r>
-                        <a:rPr lang="en-US" sz="1800" b="1" dirty="0">
-                          <a:latin typeface="Courier New" panose="02070309020205020404" pitchFamily="49" charset="0"/>
-                          <a:cs typeface="Courier New" panose="02070309020205020404" pitchFamily="49" charset="0"/>
-                        </a:rPr>
-                        <a:t>(n):</a:t>
-                      </a:r>
-                    </a:p>
-                    <a:p>
-                      <a:r>
-                        <a:rPr lang="en-US" sz="1800" b="1" dirty="0">
-                          <a:latin typeface="Courier New" panose="02070309020205020404" pitchFamily="49" charset="0"/>
-                          <a:cs typeface="Courier New" panose="02070309020205020404" pitchFamily="49" charset="0"/>
-                        </a:rPr>
-                        <a:t>    </a:t>
-                      </a:r>
-                      <a:r>
-                        <a:rPr lang="en-US" sz="1800" b="1" dirty="0">
-                          <a:solidFill>
-                            <a:srgbClr val="C00000"/>
-                          </a:solidFill>
-                          <a:latin typeface="Courier New" panose="02070309020205020404" pitchFamily="49" charset="0"/>
-                          <a:cs typeface="Courier New" panose="02070309020205020404" pitchFamily="49" charset="0"/>
-                        </a:rPr>
-                        <a:t>yield</a:t>
-                      </a:r>
-                      <a:r>
-                        <a:rPr lang="en-US" sz="1800" b="1" dirty="0">
-                          <a:latin typeface="Courier New" panose="02070309020205020404" pitchFamily="49" charset="0"/>
-                          <a:cs typeface="Courier New" panose="02070309020205020404" pitchFamily="49" charset="0"/>
-                        </a:rPr>
-                        <a:t> 'Start'</a:t>
-                      </a:r>
-                    </a:p>
-                    <a:p>
-                      <a:r>
-                        <a:rPr lang="en-US" sz="1800" b="1" dirty="0">
-                          <a:latin typeface="Courier New" panose="02070309020205020404" pitchFamily="49" charset="0"/>
-                          <a:cs typeface="Courier New" panose="02070309020205020404" pitchFamily="49" charset="0"/>
-                        </a:rPr>
-                        <a:t>    for i in range(n):</a:t>
-                      </a:r>
-                    </a:p>
-                    <a:p>
-                      <a:r>
-                        <a:rPr lang="en-US" sz="1800" b="1" dirty="0">
-                          <a:latin typeface="Courier New" panose="02070309020205020404" pitchFamily="49" charset="0"/>
-                          <a:cs typeface="Courier New" panose="02070309020205020404" pitchFamily="49" charset="0"/>
-                        </a:rPr>
-                        <a:t>        </a:t>
-                      </a:r>
-                      <a:r>
-                        <a:rPr lang="en-US" sz="1800" b="1" dirty="0">
-                          <a:solidFill>
-                            <a:srgbClr val="C00000"/>
-                          </a:solidFill>
-                          <a:latin typeface="Courier New" panose="02070309020205020404" pitchFamily="49" charset="0"/>
-                          <a:cs typeface="Courier New" panose="02070309020205020404" pitchFamily="49" charset="0"/>
-                        </a:rPr>
-                        <a:t>yield</a:t>
-                      </a:r>
-                      <a:r>
-                        <a:rPr lang="en-US" sz="1800" b="1" dirty="0">
-                          <a:latin typeface="Courier New" panose="02070309020205020404" pitchFamily="49" charset="0"/>
-                          <a:cs typeface="Courier New" panose="02070309020205020404" pitchFamily="49" charset="0"/>
-                        </a:rPr>
-                        <a:t> </a:t>
-                      </a:r>
-                      <a:r>
-                        <a:rPr lang="en-US" sz="1800" b="1" dirty="0" err="1">
-                          <a:latin typeface="Courier New" panose="02070309020205020404" pitchFamily="49" charset="0"/>
-                          <a:cs typeface="Courier New" panose="02070309020205020404" pitchFamily="49" charset="0"/>
-                        </a:rPr>
-                        <a:t>chr</a:t>
-                      </a:r>
-                      <a:r>
-                        <a:rPr lang="en-US" sz="1800" b="1" dirty="0">
-                          <a:latin typeface="Courier New" panose="02070309020205020404" pitchFamily="49" charset="0"/>
-                          <a:cs typeface="Courier New" panose="02070309020205020404" pitchFamily="49" charset="0"/>
-                        </a:rPr>
-                        <a:t>(</a:t>
-                      </a:r>
-                      <a:r>
-                        <a:rPr lang="en-US" sz="1800" b="1" dirty="0" err="1">
-                          <a:latin typeface="Courier New" panose="02070309020205020404" pitchFamily="49" charset="0"/>
-                          <a:cs typeface="Courier New" panose="02070309020205020404" pitchFamily="49" charset="0"/>
-                        </a:rPr>
-                        <a:t>ord</a:t>
-                      </a:r>
-                      <a:r>
-                        <a:rPr lang="en-US" sz="1800" b="1" dirty="0">
-                          <a:latin typeface="Courier New" panose="02070309020205020404" pitchFamily="49" charset="0"/>
-                          <a:cs typeface="Courier New" panose="02070309020205020404" pitchFamily="49" charset="0"/>
-                        </a:rPr>
-                        <a:t>('A') + i)</a:t>
-                      </a:r>
-                    </a:p>
-                    <a:p>
-                      <a:r>
-                        <a:rPr lang="en-US" sz="1800" b="1" dirty="0">
-                          <a:latin typeface="Courier New" panose="02070309020205020404" pitchFamily="49" charset="0"/>
-                          <a:cs typeface="Courier New" panose="02070309020205020404" pitchFamily="49" charset="0"/>
-                        </a:rPr>
-                        <a:t>    </a:t>
-                      </a:r>
-                      <a:r>
-                        <a:rPr lang="en-US" sz="1800" b="1" dirty="0">
-                          <a:solidFill>
-                            <a:srgbClr val="C00000"/>
-                          </a:solidFill>
-                          <a:latin typeface="Courier New" panose="02070309020205020404" pitchFamily="49" charset="0"/>
-                          <a:cs typeface="Courier New" panose="02070309020205020404" pitchFamily="49" charset="0"/>
-                        </a:rPr>
-                        <a:t>yield</a:t>
-                      </a:r>
-                      <a:r>
-                        <a:rPr lang="en-US" sz="1800" b="1" dirty="0">
-                          <a:latin typeface="Courier New" panose="02070309020205020404" pitchFamily="49" charset="0"/>
-                          <a:cs typeface="Courier New" panose="02070309020205020404" pitchFamily="49" charset="0"/>
-                        </a:rPr>
-                        <a:t> 'Done'</a:t>
-                      </a:r>
-                    </a:p>
-                  </a:txBody>
-                  <a:tcPr>
-                    <a:lnL w="6350" cap="flat" cmpd="sng" algn="ctr">
-                      <a:solidFill>
-                        <a:schemeClr val="tx1"/>
-                      </a:solidFill>
-                      <a:prstDash val="solid"/>
-                      <a:round/>
-                      <a:headEnd type="none" w="med" len="med"/>
-                      <a:tailEnd type="none" w="med" len="med"/>
-                    </a:lnL>
-                    <a:lnR w="6350" cap="flat" cmpd="sng" algn="ctr">
-                      <a:solidFill>
-                        <a:schemeClr val="tx1"/>
-                      </a:solidFill>
-                      <a:prstDash val="solid"/>
-                      <a:round/>
-                      <a:headEnd type="none" w="med" len="med"/>
-                      <a:tailEnd type="none" w="med" len="med"/>
-                    </a:lnR>
-                    <a:lnT w="6350" cap="flat" cmpd="sng" algn="ctr">
-                      <a:solidFill>
-                        <a:schemeClr val="tx1"/>
-                      </a:solidFill>
-                      <a:prstDash val="solid"/>
-                      <a:round/>
-                      <a:headEnd type="none" w="med" len="med"/>
-                      <a:tailEnd type="none" w="med" len="med"/>
-                    </a:lnT>
-                    <a:lnB w="6350" cap="flat" cmpd="sng" algn="ctr">
-                      <a:solidFill>
-                        <a:schemeClr val="tx1"/>
-                      </a:solidFill>
-                      <a:prstDash val="solid"/>
-                      <a:round/>
-                      <a:headEnd type="none" w="med" len="med"/>
-                      <a:tailEnd type="none" w="med" len="med"/>
-                    </a:lnB>
-                    <a:lnTlToBr w="12700" cmpd="sng">
-                      <a:noFill/>
-                      <a:prstDash val="solid"/>
-                    </a:lnTlToBr>
-                    <a:lnBlToTr w="12700" cmpd="sng">
-                      <a:noFill/>
-                      <a:prstDash val="solid"/>
-                    </a:lnBlToTr>
-                    <a:solidFill>
-                      <a:schemeClr val="accent5">
-                        <a:lumMod val="20000"/>
-                        <a:lumOff val="80000"/>
-                      </a:schemeClr>
-                    </a:solidFill>
-                  </a:tcPr>
-                </a:tc>
-                <a:extLst>
-                  <a:ext uri="{0D108BD9-81ED-4DB2-BD59-A6C34878D82A}">
-                    <a16:rowId xmlns:a16="http://schemas.microsoft.com/office/drawing/2014/main" val="4112970457"/>
-                  </a:ext>
-                </a:extLst>
-              </a:tr>
-              <a:tr h="148143">
-                <a:tc>
-                  <a:txBody>
-                    <a:bodyPr/>
-                    <a:lstStyle/>
-                    <a:p>
-                      <a:r>
-                        <a:rPr lang="da-DK" sz="1800" b="1" dirty="0" err="1">
-                          <a:solidFill>
-                            <a:schemeClr val="bg1"/>
-                          </a:solidFill>
-                          <a:latin typeface="Courier New" panose="02070309020205020404" pitchFamily="49" charset="0"/>
-                          <a:cs typeface="Courier New" panose="02070309020205020404" pitchFamily="49" charset="0"/>
-                        </a:rPr>
-                        <a:t>Python</a:t>
-                      </a:r>
-                      <a:r>
-                        <a:rPr lang="da-DK" sz="1800" b="1" dirty="0">
-                          <a:solidFill>
-                            <a:schemeClr val="bg1"/>
-                          </a:solidFill>
-                          <a:latin typeface="Courier New" panose="02070309020205020404" pitchFamily="49" charset="0"/>
-                          <a:cs typeface="Courier New" panose="02070309020205020404" pitchFamily="49" charset="0"/>
-                        </a:rPr>
-                        <a:t> </a:t>
-                      </a:r>
-                      <a:r>
-                        <a:rPr lang="da-DK" sz="1800" b="1" dirty="0" err="1">
-                          <a:solidFill>
-                            <a:schemeClr val="bg1"/>
-                          </a:solidFill>
-                          <a:latin typeface="Courier New" panose="02070309020205020404" pitchFamily="49" charset="0"/>
-                          <a:cs typeface="Courier New" panose="02070309020205020404" pitchFamily="49" charset="0"/>
-                        </a:rPr>
-                        <a:t>shell</a:t>
-                      </a:r>
-                      <a:endParaRPr lang="da-DK" sz="1800" b="1" dirty="0">
-                        <a:solidFill>
-                          <a:schemeClr val="bg1"/>
-                        </a:solidFill>
-                        <a:latin typeface="Courier New" panose="02070309020205020404" pitchFamily="49" charset="0"/>
-                        <a:cs typeface="Courier New" panose="02070309020205020404" pitchFamily="49" charset="0"/>
-                      </a:endParaRPr>
-                    </a:p>
-                  </a:txBody>
-                  <a:tcPr>
-                    <a:lnL w="6350" cap="flat" cmpd="sng" algn="ctr">
-                      <a:solidFill>
-                        <a:schemeClr val="tx1"/>
-                      </a:solidFill>
-                      <a:prstDash val="solid"/>
-                      <a:round/>
-                      <a:headEnd type="none" w="med" len="med"/>
-                      <a:tailEnd type="none" w="med" len="med"/>
-                    </a:lnL>
-                    <a:lnR w="6350" cap="flat" cmpd="sng" algn="ctr">
-                      <a:solidFill>
-                        <a:schemeClr val="tx1"/>
-                      </a:solidFill>
-                      <a:prstDash val="solid"/>
-                      <a:round/>
-                      <a:headEnd type="none" w="med" len="med"/>
-                      <a:tailEnd type="none" w="med" len="med"/>
-                    </a:lnR>
-                    <a:lnT w="6350" cap="flat" cmpd="sng" algn="ctr">
-                      <a:solidFill>
-                        <a:schemeClr val="tx1"/>
-                      </a:solidFill>
-                      <a:prstDash val="solid"/>
-                      <a:round/>
-                      <a:headEnd type="none" w="med" len="med"/>
-                      <a:tailEnd type="none" w="med" len="med"/>
-                    </a:lnT>
-                    <a:lnB w="6350" cap="flat" cmpd="sng" algn="ctr">
-                      <a:solidFill>
-                        <a:schemeClr val="tx1"/>
-                      </a:solidFill>
-                      <a:prstDash val="solid"/>
-                      <a:round/>
-                      <a:headEnd type="none" w="med" len="med"/>
-                      <a:tailEnd type="none" w="med" len="med"/>
-                    </a:lnB>
-                    <a:lnTlToBr w="12700" cmpd="sng">
-                      <a:noFill/>
-                      <a:prstDash val="solid"/>
-                    </a:lnTlToBr>
-                    <a:lnBlToTr w="12700" cmpd="sng">
-                      <a:noFill/>
-                      <a:prstDash val="solid"/>
-                    </a:lnBlToTr>
-                    <a:solidFill>
-                      <a:srgbClr val="C00000"/>
-                    </a:solidFill>
-                  </a:tcPr>
-                </a:tc>
-                <a:extLst>
-                  <a:ext uri="{0D108BD9-81ED-4DB2-BD59-A6C34878D82A}">
-                    <a16:rowId xmlns:a16="http://schemas.microsoft.com/office/drawing/2014/main" val="2202042958"/>
-                  </a:ext>
-                </a:extLst>
-              </a:tr>
-              <a:tr h="481466">
-                <a:tc>
-                  <a:txBody>
-                    <a:bodyPr/>
-                    <a:lstStyle/>
-                    <a:p>
-                      <a:pPr marL="266700" indent="-266700">
-                        <a:buClr>
-                          <a:srgbClr val="C00000"/>
-                        </a:buClr>
-                        <a:buSzPct val="100000"/>
-                        <a:buFont typeface="Courier New" panose="02070309020205020404" pitchFamily="49" charset="0"/>
-                        <a:buChar char="&gt;"/>
-                      </a:pPr>
-                      <a:r>
-                        <a:rPr lang="pt-BR" sz="1800" b="1" baseline="0" dirty="0">
-                          <a:latin typeface="Courier New" panose="02070309020205020404" pitchFamily="49" charset="0"/>
-                          <a:cs typeface="Courier New" panose="02070309020205020404" pitchFamily="49" charset="0"/>
-                        </a:rPr>
-                        <a:t>g = my_generator(3)</a:t>
-                      </a:r>
-                    </a:p>
-                    <a:p>
-                      <a:pPr marL="266700" indent="-266700">
-                        <a:buClr>
-                          <a:srgbClr val="C00000"/>
-                        </a:buClr>
-                        <a:buSzPct val="100000"/>
-                        <a:buFont typeface="Courier New" panose="02070309020205020404" pitchFamily="49" charset="0"/>
-                        <a:buChar char="&gt;"/>
-                      </a:pPr>
-                      <a:r>
-                        <a:rPr lang="pt-BR" sz="1800" b="1" baseline="0" dirty="0">
-                          <a:latin typeface="Courier New" panose="02070309020205020404" pitchFamily="49" charset="0"/>
-                          <a:cs typeface="Courier New" panose="02070309020205020404" pitchFamily="49" charset="0"/>
-                        </a:rPr>
-                        <a:t>print(g)</a:t>
-                      </a:r>
-                    </a:p>
-                    <a:p>
-                      <a:pPr marL="266700" indent="-266700">
-                        <a:buClr>
-                          <a:schemeClr val="accent1">
-                            <a:lumMod val="50000"/>
-                          </a:schemeClr>
-                        </a:buClr>
-                        <a:buSzPct val="120000"/>
-                        <a:buFont typeface="Courier New" panose="02070309020205020404" pitchFamily="49" charset="0"/>
-                        <a:buChar char="|"/>
-                      </a:pPr>
-                      <a:r>
-                        <a:rPr lang="en-US" sz="1800" b="1" baseline="0" dirty="0">
-                          <a:latin typeface="Courier New" panose="02070309020205020404" pitchFamily="49" charset="0"/>
-                          <a:cs typeface="Courier New" panose="02070309020205020404" pitchFamily="49" charset="0"/>
-                        </a:rPr>
-                        <a:t>&lt;generator object </a:t>
-                      </a:r>
-                      <a:r>
-                        <a:rPr lang="en-US" sz="1800" b="1" baseline="0" dirty="0" err="1">
-                          <a:latin typeface="Courier New" panose="02070309020205020404" pitchFamily="49" charset="0"/>
-                          <a:cs typeface="Courier New" panose="02070309020205020404" pitchFamily="49" charset="0"/>
-                        </a:rPr>
-                        <a:t>my_generator</a:t>
-                      </a:r>
-                      <a:r>
-                        <a:rPr lang="en-US" sz="1800" b="1" baseline="0" dirty="0">
-                          <a:latin typeface="Courier New" panose="02070309020205020404" pitchFamily="49" charset="0"/>
-                          <a:cs typeface="Courier New" panose="02070309020205020404" pitchFamily="49" charset="0"/>
-                        </a:rPr>
-                        <a:t> at 0x03E2F6F0&gt;</a:t>
-                      </a:r>
-                      <a:endParaRPr lang="pt-BR" sz="1800" b="1" baseline="0" dirty="0">
-                        <a:latin typeface="Courier New" panose="02070309020205020404" pitchFamily="49" charset="0"/>
-                        <a:cs typeface="Courier New" panose="02070309020205020404" pitchFamily="49" charset="0"/>
-                      </a:endParaRPr>
-                    </a:p>
-                    <a:p>
-                      <a:pPr marL="266700" indent="-266700">
-                        <a:buClr>
-                          <a:srgbClr val="C00000"/>
-                        </a:buClr>
-                        <a:buSzPct val="100000"/>
-                        <a:buFont typeface="Courier New" panose="02070309020205020404" pitchFamily="49" charset="0"/>
-                        <a:buChar char="&gt;"/>
-                      </a:pPr>
-                      <a:r>
-                        <a:rPr lang="pt-BR" sz="1800" b="1" baseline="0" dirty="0">
-                          <a:latin typeface="Courier New" panose="02070309020205020404" pitchFamily="49" charset="0"/>
-                          <a:cs typeface="Courier New" panose="02070309020205020404" pitchFamily="49" charset="0"/>
-                        </a:rPr>
-                        <a:t>print(list(g))</a:t>
-                      </a:r>
-                    </a:p>
-                    <a:p>
-                      <a:pPr marL="266700" indent="-266700">
-                        <a:buClr>
-                          <a:schemeClr val="accent1">
-                            <a:lumMod val="50000"/>
-                          </a:schemeClr>
-                        </a:buClr>
-                        <a:buSzPct val="120000"/>
-                        <a:buFont typeface="Courier New" panose="02070309020205020404" pitchFamily="49" charset="0"/>
-                        <a:buChar char="|"/>
-                      </a:pPr>
-                      <a:r>
-                        <a:rPr lang="pt-BR" sz="1800" b="1" baseline="0" dirty="0">
-                          <a:latin typeface="Courier New" panose="02070309020205020404" pitchFamily="49" charset="0"/>
-                          <a:cs typeface="Courier New" panose="02070309020205020404" pitchFamily="49" charset="0"/>
-                        </a:rPr>
-                        <a:t>['Start', 'A', 'B', 'C', 'Done']</a:t>
-                      </a:r>
-                    </a:p>
-                    <a:p>
-                      <a:pPr marL="266700" indent="-266700">
-                        <a:buClr>
-                          <a:srgbClr val="C00000"/>
-                        </a:buClr>
-                        <a:buSzPct val="100000"/>
-                        <a:buFont typeface="Courier New" panose="02070309020205020404" pitchFamily="49" charset="0"/>
-                        <a:buChar char="&gt;"/>
-                      </a:pPr>
-                      <a:r>
-                        <a:rPr lang="pt-BR" sz="1800" b="1" baseline="0" dirty="0">
-                          <a:latin typeface="Courier New" panose="02070309020205020404" pitchFamily="49" charset="0"/>
-                          <a:cs typeface="Courier New" panose="02070309020205020404" pitchFamily="49" charset="0"/>
-                        </a:rPr>
-                        <a:t>print(list(g))  </a:t>
-                      </a:r>
-                      <a:r>
-                        <a:rPr lang="pt-BR" sz="1800" b="1" baseline="0" dirty="0">
-                          <a:solidFill>
-                            <a:schemeClr val="bg1">
-                              <a:lumMod val="50000"/>
-                            </a:schemeClr>
-                          </a:solidFill>
-                          <a:latin typeface="Courier New" panose="02070309020205020404" pitchFamily="49" charset="0"/>
-                          <a:cs typeface="Courier New" panose="02070309020205020404" pitchFamily="49" charset="0"/>
-                        </a:rPr>
-                        <a:t># generator object g exhausted</a:t>
-                      </a:r>
-                    </a:p>
-                    <a:p>
-                      <a:pPr marL="266700" indent="-266700">
-                        <a:buClr>
-                          <a:schemeClr val="accent1">
-                            <a:lumMod val="50000"/>
-                          </a:schemeClr>
-                        </a:buClr>
-                        <a:buSzPct val="120000"/>
-                        <a:buFont typeface="Courier New" panose="02070309020205020404" pitchFamily="49" charset="0"/>
-                        <a:buChar char="|"/>
-                      </a:pPr>
-                      <a:r>
-                        <a:rPr lang="pt-BR" sz="1800" b="1" baseline="0" dirty="0">
-                          <a:latin typeface="Courier New" panose="02070309020205020404" pitchFamily="49" charset="0"/>
-                          <a:cs typeface="Courier New" panose="02070309020205020404" pitchFamily="49" charset="0"/>
-                        </a:rPr>
-                        <a:t>[]</a:t>
-                      </a:r>
-                    </a:p>
-                    <a:p>
-                      <a:pPr marL="266700" indent="-266700">
-                        <a:buClr>
-                          <a:srgbClr val="C00000"/>
-                        </a:buClr>
-                        <a:buSzPct val="100000"/>
-                        <a:buFont typeface="Courier New" panose="02070309020205020404" pitchFamily="49" charset="0"/>
-                        <a:buChar char="&gt;"/>
-                      </a:pPr>
-                      <a:r>
-                        <a:rPr lang="pt-BR" sz="1800" b="1" baseline="0" dirty="0">
-                          <a:latin typeface="Courier New" panose="02070309020205020404" pitchFamily="49" charset="0"/>
-                          <a:cs typeface="Courier New" panose="02070309020205020404" pitchFamily="49" charset="0"/>
-                        </a:rPr>
-                        <a:t>print(*my_generator(5))  </a:t>
-                      </a:r>
-                      <a:r>
-                        <a:rPr lang="pt-BR" sz="1800" b="1" baseline="0" dirty="0">
-                          <a:solidFill>
-                            <a:schemeClr val="bg1">
-                              <a:lumMod val="50000"/>
-                            </a:schemeClr>
-                          </a:solidFill>
-                          <a:latin typeface="Courier New" panose="02070309020205020404" pitchFamily="49" charset="0"/>
-                          <a:cs typeface="Courier New" panose="02070309020205020404" pitchFamily="49" charset="0"/>
-                        </a:rPr>
-                        <a:t># * takes an iterable (PEP 448)</a:t>
-                      </a:r>
-                    </a:p>
-                    <a:p>
-                      <a:pPr marL="266700" indent="-266700">
-                        <a:buClr>
-                          <a:schemeClr val="accent1">
-                            <a:lumMod val="50000"/>
-                          </a:schemeClr>
-                        </a:buClr>
-                        <a:buSzPct val="120000"/>
-                        <a:buFont typeface="Courier New" panose="02070309020205020404" pitchFamily="49" charset="0"/>
-                        <a:buChar char="|"/>
-                      </a:pPr>
-                      <a:r>
-                        <a:rPr lang="en-US" sz="1800" b="1" baseline="0" dirty="0">
-                          <a:latin typeface="Courier New" panose="02070309020205020404" pitchFamily="49" charset="0"/>
-                          <a:cs typeface="Courier New" panose="02070309020205020404" pitchFamily="49" charset="0"/>
-                        </a:rPr>
-                        <a:t>Start A B C D E Done</a:t>
-                      </a:r>
-                    </a:p>
-                  </a:txBody>
-                  <a:tcPr>
-                    <a:lnL w="6350" cap="flat" cmpd="sng" algn="ctr">
-                      <a:solidFill>
-                        <a:schemeClr val="tx1"/>
-                      </a:solidFill>
-                      <a:prstDash val="solid"/>
-                      <a:round/>
-                      <a:headEnd type="none" w="med" len="med"/>
-                      <a:tailEnd type="none" w="med" len="med"/>
-                    </a:lnL>
-                    <a:lnR w="6350" cap="flat" cmpd="sng" algn="ctr">
-                      <a:solidFill>
-                        <a:schemeClr val="tx1"/>
-                      </a:solidFill>
-                      <a:prstDash val="solid"/>
-                      <a:round/>
-                      <a:headEnd type="none" w="med" len="med"/>
-                      <a:tailEnd type="none" w="med" len="med"/>
-                    </a:lnR>
-                    <a:lnT w="6350" cap="flat" cmpd="sng" algn="ctr">
-                      <a:solidFill>
-                        <a:schemeClr val="tx1"/>
-                      </a:solidFill>
-                      <a:prstDash val="solid"/>
-                      <a:round/>
-                      <a:headEnd type="none" w="med" len="med"/>
-                      <a:tailEnd type="none" w="med" len="med"/>
-                    </a:lnT>
-                    <a:lnB w="6350" cap="flat" cmpd="sng" algn="ctr">
-                      <a:solidFill>
-                        <a:schemeClr val="tx1"/>
-                      </a:solidFill>
-                      <a:prstDash val="solid"/>
-                      <a:round/>
-                      <a:headEnd type="none" w="med" len="med"/>
-                      <a:tailEnd type="none" w="med" len="med"/>
-                    </a:lnB>
-                    <a:lnTlToBr w="12700" cmpd="sng">
-                      <a:noFill/>
-                      <a:prstDash val="solid"/>
-                    </a:lnTlToBr>
-                    <a:lnBlToTr w="12700" cmpd="sng">
-                      <a:noFill/>
-                      <a:prstDash val="solid"/>
-                    </a:lnBlToTr>
-                    <a:solidFill>
-                      <a:schemeClr val="accent5">
-                        <a:lumMod val="20000"/>
-                        <a:lumOff val="80000"/>
-                      </a:schemeClr>
-                    </a:solidFill>
-                  </a:tcPr>
-                </a:tc>
-                <a:extLst>
-                  <a:ext uri="{0D108BD9-81ED-4DB2-BD59-A6C34878D82A}">
-                    <a16:rowId xmlns:a16="http://schemas.microsoft.com/office/drawing/2014/main" val="25355368"/>
-                  </a:ext>
-                </a:extLst>
-              </a:tr>
-            </a:tbl>
-          </a:graphicData>
-        </a:graphic>
-      </p:graphicFrame>
-    </p:spTree>
-    <p:extLst>
-      <p:ext uri="{BB962C8B-B14F-4D97-AF65-F5344CB8AC3E}">
-        <p14:creationId xmlns:p14="http://schemas.microsoft.com/office/powerpoint/2010/main" val="3361084387"/>
-      </p:ext>
-    </p:extLst>
-  </p:cSld>
-  <p:clrMapOvr>
-    <a:masterClrMapping/>
-  </p:clrMapOvr>
-</p:sld>
-</file>
-
 <file path=ppt/slides/slide2.xml><?xml version="1.0" encoding="utf-8"?>
 <p:sld xmlns:a="http://schemas.openxmlformats.org/drawingml/2006/main" xmlns:r="http://schemas.openxmlformats.org/officeDocument/2006/relationships" xmlns:p="http://schemas.openxmlformats.org/presentationml/2006/main">
   <p:cSld>
@@ -14722,6 +16531,745 @@
           <a:p>
             <a:r>
               <a:rPr lang="en-US" dirty="0"/>
+              <a:t>Generator functions (II)</a:t>
+            </a:r>
+          </a:p>
+        </p:txBody>
+      </p:sp>
+      <p:graphicFrame>
+        <p:nvGraphicFramePr>
+          <p:cNvPr id="4" name="Table 3"/>
+          <p:cNvGraphicFramePr>
+            <a:graphicFrameLocks noGrp="1"/>
+          </p:cNvGraphicFramePr>
+          <p:nvPr>
+            <p:extLst>
+              <p:ext uri="{D42A27DB-BD31-4B8C-83A1-F6EECF244321}">
+                <p14:modId xmlns:p14="http://schemas.microsoft.com/office/powerpoint/2010/main" val="3221695435"/>
+              </p:ext>
+            </p:extLst>
+          </p:nvPr>
+        </p:nvGraphicFramePr>
+        <p:xfrm>
+          <a:off x="2048510" y="1767551"/>
+          <a:ext cx="8094980" cy="4754880"/>
+        </p:xfrm>
+        <a:graphic>
+          <a:graphicData uri="http://schemas.openxmlformats.org/drawingml/2006/table">
+            <a:tbl>
+              <a:tblPr firstRow="1" bandRow="1">
+                <a:tableStyleId>{5C22544A-7EE6-4342-B048-85BDC9FD1C3A}</a:tableStyleId>
+              </a:tblPr>
+              <a:tblGrid>
+                <a:gridCol w="8094980">
+                  <a:extLst>
+                    <a:ext uri="{9D8B030D-6E8A-4147-A177-3AD203B41FA5}">
+                      <a16:colId xmlns:a16="http://schemas.microsoft.com/office/drawing/2014/main" val="1873682825"/>
+                    </a:ext>
+                  </a:extLst>
+                </a:gridCol>
+              </a:tblGrid>
+              <a:tr h="148143">
+                <a:tc>
+                  <a:txBody>
+                    <a:bodyPr/>
+                    <a:lstStyle/>
+                    <a:p>
+                      <a:r>
+                        <a:rPr lang="da-DK" sz="1800" b="1" dirty="0">
+                          <a:latin typeface="Courier New" panose="02070309020205020404" pitchFamily="49" charset="0"/>
+                          <a:cs typeface="Courier New" panose="02070309020205020404" pitchFamily="49" charset="0"/>
+                        </a:rPr>
+                        <a:t>my_generator.py</a:t>
+                      </a:r>
+                    </a:p>
+                  </a:txBody>
+                  <a:tcPr anchor="ctr">
+                    <a:lnL w="6350" cap="flat" cmpd="sng" algn="ctr">
+                      <a:solidFill>
+                        <a:schemeClr val="tx1"/>
+                      </a:solidFill>
+                      <a:prstDash val="solid"/>
+                      <a:round/>
+                      <a:headEnd type="none" w="med" len="med"/>
+                      <a:tailEnd type="none" w="med" len="med"/>
+                    </a:lnL>
+                    <a:lnR w="6350" cap="flat" cmpd="sng" algn="ctr">
+                      <a:solidFill>
+                        <a:schemeClr val="tx1"/>
+                      </a:solidFill>
+                      <a:prstDash val="solid"/>
+                      <a:round/>
+                      <a:headEnd type="none" w="med" len="med"/>
+                      <a:tailEnd type="none" w="med" len="med"/>
+                    </a:lnR>
+                    <a:lnT w="6350" cap="flat" cmpd="sng" algn="ctr">
+                      <a:solidFill>
+                        <a:schemeClr val="tx1"/>
+                      </a:solidFill>
+                      <a:prstDash val="solid"/>
+                      <a:round/>
+                      <a:headEnd type="none" w="med" len="med"/>
+                      <a:tailEnd type="none" w="med" len="med"/>
+                    </a:lnT>
+                    <a:lnB w="6350" cap="flat" cmpd="sng" algn="ctr">
+                      <a:solidFill>
+                        <a:schemeClr val="tx1"/>
+                      </a:solidFill>
+                      <a:prstDash val="solid"/>
+                      <a:round/>
+                      <a:headEnd type="none" w="med" len="med"/>
+                      <a:tailEnd type="none" w="med" len="med"/>
+                    </a:lnB>
+                    <a:lnTlToBr w="12700" cmpd="sng">
+                      <a:noFill/>
+                      <a:prstDash val="solid"/>
+                    </a:lnTlToBr>
+                    <a:lnBlToTr w="12700" cmpd="sng">
+                      <a:noFill/>
+                      <a:prstDash val="solid"/>
+                    </a:lnBlToTr>
+                    <a:solidFill>
+                      <a:srgbClr val="C00000"/>
+                    </a:solidFill>
+                  </a:tcPr>
+                </a:tc>
+                <a:extLst>
+                  <a:ext uri="{0D108BD9-81ED-4DB2-BD59-A6C34878D82A}">
+                    <a16:rowId xmlns:a16="http://schemas.microsoft.com/office/drawing/2014/main" val="3330819881"/>
+                  </a:ext>
+                </a:extLst>
+              </a:tr>
+              <a:tr h="297347">
+                <a:tc>
+                  <a:txBody>
+                    <a:bodyPr/>
+                    <a:lstStyle/>
+                    <a:p>
+                      <a:r>
+                        <a:rPr lang="en-US" sz="1800" b="1" dirty="0" err="1">
+                          <a:latin typeface="Courier New" panose="02070309020205020404" pitchFamily="49" charset="0"/>
+                          <a:cs typeface="Courier New" panose="02070309020205020404" pitchFamily="49" charset="0"/>
+                        </a:rPr>
+                        <a:t>def</a:t>
+                      </a:r>
+                      <a:r>
+                        <a:rPr lang="en-US" sz="1800" b="1" dirty="0">
+                          <a:latin typeface="Courier New" panose="02070309020205020404" pitchFamily="49" charset="0"/>
+                          <a:cs typeface="Courier New" panose="02070309020205020404" pitchFamily="49" charset="0"/>
+                        </a:rPr>
+                        <a:t> </a:t>
+                      </a:r>
+                      <a:r>
+                        <a:rPr lang="en-US" sz="1800" b="1" dirty="0" err="1">
+                          <a:latin typeface="Courier New" panose="02070309020205020404" pitchFamily="49" charset="0"/>
+                          <a:cs typeface="Courier New" panose="02070309020205020404" pitchFamily="49" charset="0"/>
+                        </a:rPr>
+                        <a:t>my_generator</a:t>
+                      </a:r>
+                      <a:r>
+                        <a:rPr lang="en-US" sz="1800" b="1" dirty="0">
+                          <a:latin typeface="Courier New" panose="02070309020205020404" pitchFamily="49" charset="0"/>
+                          <a:cs typeface="Courier New" panose="02070309020205020404" pitchFamily="49" charset="0"/>
+                        </a:rPr>
+                        <a:t>(n):</a:t>
+                      </a:r>
+                    </a:p>
+                    <a:p>
+                      <a:r>
+                        <a:rPr lang="en-US" sz="1800" b="1" dirty="0">
+                          <a:latin typeface="Courier New" panose="02070309020205020404" pitchFamily="49" charset="0"/>
+                          <a:cs typeface="Courier New" panose="02070309020205020404" pitchFamily="49" charset="0"/>
+                        </a:rPr>
+                        <a:t>    </a:t>
+                      </a:r>
+                      <a:r>
+                        <a:rPr lang="en-US" sz="1800" b="1" dirty="0">
+                          <a:solidFill>
+                            <a:srgbClr val="C00000"/>
+                          </a:solidFill>
+                          <a:latin typeface="Courier New" panose="02070309020205020404" pitchFamily="49" charset="0"/>
+                          <a:cs typeface="Courier New" panose="02070309020205020404" pitchFamily="49" charset="0"/>
+                        </a:rPr>
+                        <a:t>yield</a:t>
+                      </a:r>
+                      <a:r>
+                        <a:rPr lang="en-US" sz="1800" b="1" dirty="0">
+                          <a:latin typeface="Courier New" panose="02070309020205020404" pitchFamily="49" charset="0"/>
+                          <a:cs typeface="Courier New" panose="02070309020205020404" pitchFamily="49" charset="0"/>
+                        </a:rPr>
+                        <a:t> 'Start'</a:t>
+                      </a:r>
+                    </a:p>
+                    <a:p>
+                      <a:r>
+                        <a:rPr lang="en-US" sz="1800" b="1" dirty="0">
+                          <a:latin typeface="Courier New" panose="02070309020205020404" pitchFamily="49" charset="0"/>
+                          <a:cs typeface="Courier New" panose="02070309020205020404" pitchFamily="49" charset="0"/>
+                        </a:rPr>
+                        <a:t>    for i in range(n):</a:t>
+                      </a:r>
+                    </a:p>
+                    <a:p>
+                      <a:r>
+                        <a:rPr lang="en-US" sz="1800" b="1" dirty="0">
+                          <a:latin typeface="Courier New" panose="02070309020205020404" pitchFamily="49" charset="0"/>
+                          <a:cs typeface="Courier New" panose="02070309020205020404" pitchFamily="49" charset="0"/>
+                        </a:rPr>
+                        <a:t>        </a:t>
+                      </a:r>
+                      <a:r>
+                        <a:rPr lang="en-US" sz="1800" b="1" dirty="0">
+                          <a:solidFill>
+                            <a:srgbClr val="C00000"/>
+                          </a:solidFill>
+                          <a:latin typeface="Courier New" panose="02070309020205020404" pitchFamily="49" charset="0"/>
+                          <a:cs typeface="Courier New" panose="02070309020205020404" pitchFamily="49" charset="0"/>
+                        </a:rPr>
+                        <a:t>yield</a:t>
+                      </a:r>
+                      <a:r>
+                        <a:rPr lang="en-US" sz="1800" b="1" dirty="0">
+                          <a:latin typeface="Courier New" panose="02070309020205020404" pitchFamily="49" charset="0"/>
+                          <a:cs typeface="Courier New" panose="02070309020205020404" pitchFamily="49" charset="0"/>
+                        </a:rPr>
+                        <a:t> </a:t>
+                      </a:r>
+                      <a:r>
+                        <a:rPr lang="en-US" sz="1800" b="1" dirty="0" err="1">
+                          <a:latin typeface="Courier New" panose="02070309020205020404" pitchFamily="49" charset="0"/>
+                          <a:cs typeface="Courier New" panose="02070309020205020404" pitchFamily="49" charset="0"/>
+                        </a:rPr>
+                        <a:t>chr</a:t>
+                      </a:r>
+                      <a:r>
+                        <a:rPr lang="en-US" sz="1800" b="1" dirty="0">
+                          <a:latin typeface="Courier New" panose="02070309020205020404" pitchFamily="49" charset="0"/>
+                          <a:cs typeface="Courier New" panose="02070309020205020404" pitchFamily="49" charset="0"/>
+                        </a:rPr>
+                        <a:t>(</a:t>
+                      </a:r>
+                      <a:r>
+                        <a:rPr lang="en-US" sz="1800" b="1" dirty="0" err="1">
+                          <a:latin typeface="Courier New" panose="02070309020205020404" pitchFamily="49" charset="0"/>
+                          <a:cs typeface="Courier New" panose="02070309020205020404" pitchFamily="49" charset="0"/>
+                        </a:rPr>
+                        <a:t>ord</a:t>
+                      </a:r>
+                      <a:r>
+                        <a:rPr lang="en-US" sz="1800" b="1" dirty="0">
+                          <a:latin typeface="Courier New" panose="02070309020205020404" pitchFamily="49" charset="0"/>
+                          <a:cs typeface="Courier New" panose="02070309020205020404" pitchFamily="49" charset="0"/>
+                        </a:rPr>
+                        <a:t>('A') + i)</a:t>
+                      </a:r>
+                    </a:p>
+                    <a:p>
+                      <a:r>
+                        <a:rPr lang="en-US" sz="1800" b="1" dirty="0">
+                          <a:latin typeface="Courier New" panose="02070309020205020404" pitchFamily="49" charset="0"/>
+                          <a:cs typeface="Courier New" panose="02070309020205020404" pitchFamily="49" charset="0"/>
+                        </a:rPr>
+                        <a:t>    </a:t>
+                      </a:r>
+                      <a:r>
+                        <a:rPr lang="en-US" sz="1800" b="1" dirty="0">
+                          <a:solidFill>
+                            <a:srgbClr val="C00000"/>
+                          </a:solidFill>
+                          <a:latin typeface="Courier New" panose="02070309020205020404" pitchFamily="49" charset="0"/>
+                          <a:cs typeface="Courier New" panose="02070309020205020404" pitchFamily="49" charset="0"/>
+                        </a:rPr>
+                        <a:t>yield</a:t>
+                      </a:r>
+                      <a:r>
+                        <a:rPr lang="en-US" sz="1800" b="1" dirty="0">
+                          <a:latin typeface="Courier New" panose="02070309020205020404" pitchFamily="49" charset="0"/>
+                          <a:cs typeface="Courier New" panose="02070309020205020404" pitchFamily="49" charset="0"/>
+                        </a:rPr>
+                        <a:t> 'Done'</a:t>
+                      </a:r>
+                    </a:p>
+                  </a:txBody>
+                  <a:tcPr>
+                    <a:lnL w="6350" cap="flat" cmpd="sng" algn="ctr">
+                      <a:solidFill>
+                        <a:schemeClr val="tx1"/>
+                      </a:solidFill>
+                      <a:prstDash val="solid"/>
+                      <a:round/>
+                      <a:headEnd type="none" w="med" len="med"/>
+                      <a:tailEnd type="none" w="med" len="med"/>
+                    </a:lnL>
+                    <a:lnR w="6350" cap="flat" cmpd="sng" algn="ctr">
+                      <a:solidFill>
+                        <a:schemeClr val="tx1"/>
+                      </a:solidFill>
+                      <a:prstDash val="solid"/>
+                      <a:round/>
+                      <a:headEnd type="none" w="med" len="med"/>
+                      <a:tailEnd type="none" w="med" len="med"/>
+                    </a:lnR>
+                    <a:lnT w="6350" cap="flat" cmpd="sng" algn="ctr">
+                      <a:solidFill>
+                        <a:schemeClr val="tx1"/>
+                      </a:solidFill>
+                      <a:prstDash val="solid"/>
+                      <a:round/>
+                      <a:headEnd type="none" w="med" len="med"/>
+                      <a:tailEnd type="none" w="med" len="med"/>
+                    </a:lnT>
+                    <a:lnB w="6350" cap="flat" cmpd="sng" algn="ctr">
+                      <a:solidFill>
+                        <a:schemeClr val="tx1"/>
+                      </a:solidFill>
+                      <a:prstDash val="solid"/>
+                      <a:round/>
+                      <a:headEnd type="none" w="med" len="med"/>
+                      <a:tailEnd type="none" w="med" len="med"/>
+                    </a:lnB>
+                    <a:lnTlToBr w="12700" cmpd="sng">
+                      <a:noFill/>
+                      <a:prstDash val="solid"/>
+                    </a:lnTlToBr>
+                    <a:lnBlToTr w="12700" cmpd="sng">
+                      <a:noFill/>
+                      <a:prstDash val="solid"/>
+                    </a:lnBlToTr>
+                    <a:solidFill>
+                      <a:schemeClr val="accent5">
+                        <a:lumMod val="20000"/>
+                        <a:lumOff val="80000"/>
+                      </a:schemeClr>
+                    </a:solidFill>
+                  </a:tcPr>
+                </a:tc>
+                <a:extLst>
+                  <a:ext uri="{0D108BD9-81ED-4DB2-BD59-A6C34878D82A}">
+                    <a16:rowId xmlns:a16="http://schemas.microsoft.com/office/drawing/2014/main" val="4112970457"/>
+                  </a:ext>
+                </a:extLst>
+              </a:tr>
+              <a:tr h="148143">
+                <a:tc>
+                  <a:txBody>
+                    <a:bodyPr/>
+                    <a:lstStyle/>
+                    <a:p>
+                      <a:r>
+                        <a:rPr lang="da-DK" sz="1800" b="1" dirty="0" err="1">
+                          <a:solidFill>
+                            <a:schemeClr val="bg1"/>
+                          </a:solidFill>
+                          <a:latin typeface="Courier New" panose="02070309020205020404" pitchFamily="49" charset="0"/>
+                          <a:cs typeface="Courier New" panose="02070309020205020404" pitchFamily="49" charset="0"/>
+                        </a:rPr>
+                        <a:t>Python</a:t>
+                      </a:r>
+                      <a:r>
+                        <a:rPr lang="da-DK" sz="1800" b="1" dirty="0">
+                          <a:solidFill>
+                            <a:schemeClr val="bg1"/>
+                          </a:solidFill>
+                          <a:latin typeface="Courier New" panose="02070309020205020404" pitchFamily="49" charset="0"/>
+                          <a:cs typeface="Courier New" panose="02070309020205020404" pitchFamily="49" charset="0"/>
+                        </a:rPr>
+                        <a:t> </a:t>
+                      </a:r>
+                      <a:r>
+                        <a:rPr lang="da-DK" sz="1800" b="1" dirty="0" err="1">
+                          <a:solidFill>
+                            <a:schemeClr val="bg1"/>
+                          </a:solidFill>
+                          <a:latin typeface="Courier New" panose="02070309020205020404" pitchFamily="49" charset="0"/>
+                          <a:cs typeface="Courier New" panose="02070309020205020404" pitchFamily="49" charset="0"/>
+                        </a:rPr>
+                        <a:t>shell</a:t>
+                      </a:r>
+                      <a:endParaRPr lang="da-DK" sz="1800" b="1" dirty="0">
+                        <a:solidFill>
+                          <a:schemeClr val="bg1"/>
+                        </a:solidFill>
+                        <a:latin typeface="Courier New" panose="02070309020205020404" pitchFamily="49" charset="0"/>
+                        <a:cs typeface="Courier New" panose="02070309020205020404" pitchFamily="49" charset="0"/>
+                      </a:endParaRPr>
+                    </a:p>
+                  </a:txBody>
+                  <a:tcPr>
+                    <a:lnL w="6350" cap="flat" cmpd="sng" algn="ctr">
+                      <a:solidFill>
+                        <a:schemeClr val="tx1"/>
+                      </a:solidFill>
+                      <a:prstDash val="solid"/>
+                      <a:round/>
+                      <a:headEnd type="none" w="med" len="med"/>
+                      <a:tailEnd type="none" w="med" len="med"/>
+                    </a:lnL>
+                    <a:lnR w="6350" cap="flat" cmpd="sng" algn="ctr">
+                      <a:solidFill>
+                        <a:schemeClr val="tx1"/>
+                      </a:solidFill>
+                      <a:prstDash val="solid"/>
+                      <a:round/>
+                      <a:headEnd type="none" w="med" len="med"/>
+                      <a:tailEnd type="none" w="med" len="med"/>
+                    </a:lnR>
+                    <a:lnT w="6350" cap="flat" cmpd="sng" algn="ctr">
+                      <a:solidFill>
+                        <a:schemeClr val="tx1"/>
+                      </a:solidFill>
+                      <a:prstDash val="solid"/>
+                      <a:round/>
+                      <a:headEnd type="none" w="med" len="med"/>
+                      <a:tailEnd type="none" w="med" len="med"/>
+                    </a:lnT>
+                    <a:lnB w="6350" cap="flat" cmpd="sng" algn="ctr">
+                      <a:solidFill>
+                        <a:schemeClr val="tx1"/>
+                      </a:solidFill>
+                      <a:prstDash val="solid"/>
+                      <a:round/>
+                      <a:headEnd type="none" w="med" len="med"/>
+                      <a:tailEnd type="none" w="med" len="med"/>
+                    </a:lnB>
+                    <a:lnTlToBr w="12700" cmpd="sng">
+                      <a:noFill/>
+                      <a:prstDash val="solid"/>
+                    </a:lnTlToBr>
+                    <a:lnBlToTr w="12700" cmpd="sng">
+                      <a:noFill/>
+                      <a:prstDash val="solid"/>
+                    </a:lnBlToTr>
+                    <a:solidFill>
+                      <a:srgbClr val="C00000"/>
+                    </a:solidFill>
+                  </a:tcPr>
+                </a:tc>
+                <a:extLst>
+                  <a:ext uri="{0D108BD9-81ED-4DB2-BD59-A6C34878D82A}">
+                    <a16:rowId xmlns:a16="http://schemas.microsoft.com/office/drawing/2014/main" val="2202042958"/>
+                  </a:ext>
+                </a:extLst>
+              </a:tr>
+              <a:tr h="481466">
+                <a:tc>
+                  <a:txBody>
+                    <a:bodyPr/>
+                    <a:lstStyle/>
+                    <a:p>
+                      <a:pPr marL="266700" indent="-266700">
+                        <a:buClr>
+                          <a:srgbClr val="C00000"/>
+                        </a:buClr>
+                        <a:buSzPct val="100000"/>
+                        <a:buFont typeface="Courier New" panose="02070309020205020404" pitchFamily="49" charset="0"/>
+                        <a:buChar char="&gt;"/>
+                      </a:pPr>
+                      <a:r>
+                        <a:rPr lang="pt-BR" sz="1800" b="1" baseline="0" dirty="0">
+                          <a:latin typeface="Courier New" panose="02070309020205020404" pitchFamily="49" charset="0"/>
+                          <a:cs typeface="Courier New" panose="02070309020205020404" pitchFamily="49" charset="0"/>
+                        </a:rPr>
+                        <a:t>g = my_generator(3)</a:t>
+                      </a:r>
+                    </a:p>
+                    <a:p>
+                      <a:pPr marL="266700" indent="-266700">
+                        <a:buClr>
+                          <a:srgbClr val="C00000"/>
+                        </a:buClr>
+                        <a:buSzPct val="100000"/>
+                        <a:buFont typeface="Courier New" panose="02070309020205020404" pitchFamily="49" charset="0"/>
+                        <a:buChar char="&gt;"/>
+                      </a:pPr>
+                      <a:r>
+                        <a:rPr lang="pt-BR" sz="1800" b="1" baseline="0" dirty="0">
+                          <a:latin typeface="Courier New" panose="02070309020205020404" pitchFamily="49" charset="0"/>
+                          <a:cs typeface="Courier New" panose="02070309020205020404" pitchFamily="49" charset="0"/>
+                        </a:rPr>
+                        <a:t>print(g)</a:t>
+                      </a:r>
+                    </a:p>
+                    <a:p>
+                      <a:pPr marL="266700" indent="-266700">
+                        <a:buClr>
+                          <a:schemeClr val="accent1">
+                            <a:lumMod val="50000"/>
+                          </a:schemeClr>
+                        </a:buClr>
+                        <a:buSzPct val="120000"/>
+                        <a:buFont typeface="Courier New" panose="02070309020205020404" pitchFamily="49" charset="0"/>
+                        <a:buChar char="|"/>
+                      </a:pPr>
+                      <a:r>
+                        <a:rPr lang="en-US" sz="1800" b="1" baseline="0" dirty="0">
+                          <a:latin typeface="Courier New" panose="02070309020205020404" pitchFamily="49" charset="0"/>
+                          <a:cs typeface="Courier New" panose="02070309020205020404" pitchFamily="49" charset="0"/>
+                        </a:rPr>
+                        <a:t>&lt;generator object </a:t>
+                      </a:r>
+                      <a:r>
+                        <a:rPr lang="en-US" sz="1800" b="1" baseline="0" dirty="0" err="1">
+                          <a:latin typeface="Courier New" panose="02070309020205020404" pitchFamily="49" charset="0"/>
+                          <a:cs typeface="Courier New" panose="02070309020205020404" pitchFamily="49" charset="0"/>
+                        </a:rPr>
+                        <a:t>my_generator</a:t>
+                      </a:r>
+                      <a:r>
+                        <a:rPr lang="en-US" sz="1800" b="1" baseline="0" dirty="0">
+                          <a:latin typeface="Courier New" panose="02070309020205020404" pitchFamily="49" charset="0"/>
+                          <a:cs typeface="Courier New" panose="02070309020205020404" pitchFamily="49" charset="0"/>
+                        </a:rPr>
+                        <a:t> at 0x03E2F6F0&gt;</a:t>
+                      </a:r>
+                      <a:endParaRPr lang="pt-BR" sz="1800" b="1" baseline="0" dirty="0">
+                        <a:latin typeface="Courier New" panose="02070309020205020404" pitchFamily="49" charset="0"/>
+                        <a:cs typeface="Courier New" panose="02070309020205020404" pitchFamily="49" charset="0"/>
+                      </a:endParaRPr>
+                    </a:p>
+                    <a:p>
+                      <a:pPr marL="266700" indent="-266700">
+                        <a:buClr>
+                          <a:srgbClr val="C00000"/>
+                        </a:buClr>
+                        <a:buSzPct val="100000"/>
+                        <a:buFont typeface="Courier New" panose="02070309020205020404" pitchFamily="49" charset="0"/>
+                        <a:buChar char="&gt;"/>
+                      </a:pPr>
+                      <a:r>
+                        <a:rPr lang="pt-BR" sz="1800" b="1" baseline="0" dirty="0">
+                          <a:latin typeface="Courier New" panose="02070309020205020404" pitchFamily="49" charset="0"/>
+                          <a:cs typeface="Courier New" panose="02070309020205020404" pitchFamily="49" charset="0"/>
+                        </a:rPr>
+                        <a:t>print(list(g))</a:t>
+                      </a:r>
+                    </a:p>
+                    <a:p>
+                      <a:pPr marL="266700" indent="-266700">
+                        <a:buClr>
+                          <a:schemeClr val="accent1">
+                            <a:lumMod val="50000"/>
+                          </a:schemeClr>
+                        </a:buClr>
+                        <a:buSzPct val="120000"/>
+                        <a:buFont typeface="Courier New" panose="02070309020205020404" pitchFamily="49" charset="0"/>
+                        <a:buChar char="|"/>
+                      </a:pPr>
+                      <a:r>
+                        <a:rPr lang="pt-BR" sz="1800" b="1" baseline="0" dirty="0">
+                          <a:latin typeface="Courier New" panose="02070309020205020404" pitchFamily="49" charset="0"/>
+                          <a:cs typeface="Courier New" panose="02070309020205020404" pitchFamily="49" charset="0"/>
+                        </a:rPr>
+                        <a:t>['Start', 'A', 'B', 'C', 'Done']</a:t>
+                      </a:r>
+                    </a:p>
+                    <a:p>
+                      <a:pPr marL="266700" indent="-266700">
+                        <a:buClr>
+                          <a:srgbClr val="C00000"/>
+                        </a:buClr>
+                        <a:buSzPct val="100000"/>
+                        <a:buFont typeface="Courier New" panose="02070309020205020404" pitchFamily="49" charset="0"/>
+                        <a:buChar char="&gt;"/>
+                      </a:pPr>
+                      <a:r>
+                        <a:rPr lang="pt-BR" sz="1800" b="1" baseline="0" dirty="0">
+                          <a:latin typeface="Courier New" panose="02070309020205020404" pitchFamily="49" charset="0"/>
+                          <a:cs typeface="Courier New" panose="02070309020205020404" pitchFamily="49" charset="0"/>
+                        </a:rPr>
+                        <a:t>print(list(g))  </a:t>
+                      </a:r>
+                      <a:r>
+                        <a:rPr lang="pt-BR" sz="1800" b="1" baseline="0" dirty="0">
+                          <a:solidFill>
+                            <a:schemeClr val="bg1">
+                              <a:lumMod val="50000"/>
+                            </a:schemeClr>
+                          </a:solidFill>
+                          <a:latin typeface="Courier New" panose="02070309020205020404" pitchFamily="49" charset="0"/>
+                          <a:cs typeface="Courier New" panose="02070309020205020404" pitchFamily="49" charset="0"/>
+                        </a:rPr>
+                        <a:t># generator object g exhausted</a:t>
+                      </a:r>
+                    </a:p>
+                    <a:p>
+                      <a:pPr marL="266700" indent="-266700">
+                        <a:buClr>
+                          <a:schemeClr val="accent1">
+                            <a:lumMod val="50000"/>
+                          </a:schemeClr>
+                        </a:buClr>
+                        <a:buSzPct val="120000"/>
+                        <a:buFont typeface="Courier New" panose="02070309020205020404" pitchFamily="49" charset="0"/>
+                        <a:buChar char="|"/>
+                      </a:pPr>
+                      <a:r>
+                        <a:rPr lang="pt-BR" sz="1800" b="1" baseline="0" dirty="0">
+                          <a:latin typeface="Courier New" panose="02070309020205020404" pitchFamily="49" charset="0"/>
+                          <a:cs typeface="Courier New" panose="02070309020205020404" pitchFamily="49" charset="0"/>
+                        </a:rPr>
+                        <a:t>[]</a:t>
+                      </a:r>
+                    </a:p>
+                    <a:p>
+                      <a:pPr marL="266700" indent="-266700">
+                        <a:buClr>
+                          <a:srgbClr val="C00000"/>
+                        </a:buClr>
+                        <a:buSzPct val="100000"/>
+                        <a:buFont typeface="Courier New" panose="02070309020205020404" pitchFamily="49" charset="0"/>
+                        <a:buChar char="&gt;"/>
+                      </a:pPr>
+                      <a:r>
+                        <a:rPr lang="pt-BR" sz="1800" b="1" baseline="0" dirty="0">
+                          <a:latin typeface="Courier New" panose="02070309020205020404" pitchFamily="49" charset="0"/>
+                          <a:cs typeface="Courier New" panose="02070309020205020404" pitchFamily="49" charset="0"/>
+                        </a:rPr>
+                        <a:t>print(*my_generator(5))  </a:t>
+                      </a:r>
+                      <a:r>
+                        <a:rPr lang="pt-BR" sz="1800" b="1" baseline="0" dirty="0">
+                          <a:solidFill>
+                            <a:schemeClr val="bg1">
+                              <a:lumMod val="50000"/>
+                            </a:schemeClr>
+                          </a:solidFill>
+                          <a:latin typeface="Courier New" panose="02070309020205020404" pitchFamily="49" charset="0"/>
+                          <a:cs typeface="Courier New" panose="02070309020205020404" pitchFamily="49" charset="0"/>
+                        </a:rPr>
+                        <a:t># * takes an iterable (PEP 448)</a:t>
+                      </a:r>
+                    </a:p>
+                    <a:p>
+                      <a:pPr marL="266700" indent="-266700">
+                        <a:buClr>
+                          <a:schemeClr val="accent1">
+                            <a:lumMod val="50000"/>
+                          </a:schemeClr>
+                        </a:buClr>
+                        <a:buSzPct val="120000"/>
+                        <a:buFont typeface="Courier New" panose="02070309020205020404" pitchFamily="49" charset="0"/>
+                        <a:buChar char="|"/>
+                      </a:pPr>
+                      <a:r>
+                        <a:rPr lang="en-US" sz="1800" b="1" baseline="0" dirty="0">
+                          <a:latin typeface="Courier New" panose="02070309020205020404" pitchFamily="49" charset="0"/>
+                          <a:cs typeface="Courier New" panose="02070309020205020404" pitchFamily="49" charset="0"/>
+                        </a:rPr>
+                        <a:t>Start A B C D E Done</a:t>
+                      </a:r>
+                    </a:p>
+                  </a:txBody>
+                  <a:tcPr>
+                    <a:lnL w="6350" cap="flat" cmpd="sng" algn="ctr">
+                      <a:solidFill>
+                        <a:schemeClr val="tx1"/>
+                      </a:solidFill>
+                      <a:prstDash val="solid"/>
+                      <a:round/>
+                      <a:headEnd type="none" w="med" len="med"/>
+                      <a:tailEnd type="none" w="med" len="med"/>
+                    </a:lnL>
+                    <a:lnR w="6350" cap="flat" cmpd="sng" algn="ctr">
+                      <a:solidFill>
+                        <a:schemeClr val="tx1"/>
+                      </a:solidFill>
+                      <a:prstDash val="solid"/>
+                      <a:round/>
+                      <a:headEnd type="none" w="med" len="med"/>
+                      <a:tailEnd type="none" w="med" len="med"/>
+                    </a:lnR>
+                    <a:lnT w="6350" cap="flat" cmpd="sng" algn="ctr">
+                      <a:solidFill>
+                        <a:schemeClr val="tx1"/>
+                      </a:solidFill>
+                      <a:prstDash val="solid"/>
+                      <a:round/>
+                      <a:headEnd type="none" w="med" len="med"/>
+                      <a:tailEnd type="none" w="med" len="med"/>
+                    </a:lnT>
+                    <a:lnB w="6350" cap="flat" cmpd="sng" algn="ctr">
+                      <a:solidFill>
+                        <a:schemeClr val="tx1"/>
+                      </a:solidFill>
+                      <a:prstDash val="solid"/>
+                      <a:round/>
+                      <a:headEnd type="none" w="med" len="med"/>
+                      <a:tailEnd type="none" w="med" len="med"/>
+                    </a:lnB>
+                    <a:lnTlToBr w="12700" cmpd="sng">
+                      <a:noFill/>
+                      <a:prstDash val="solid"/>
+                    </a:lnTlToBr>
+                    <a:lnBlToTr w="12700" cmpd="sng">
+                      <a:noFill/>
+                      <a:prstDash val="solid"/>
+                    </a:lnBlToTr>
+                    <a:solidFill>
+                      <a:schemeClr val="accent5">
+                        <a:lumMod val="20000"/>
+                        <a:lumOff val="80000"/>
+                      </a:schemeClr>
+                    </a:solidFill>
+                  </a:tcPr>
+                </a:tc>
+                <a:extLst>
+                  <a:ext uri="{0D108BD9-81ED-4DB2-BD59-A6C34878D82A}">
+                    <a16:rowId xmlns:a16="http://schemas.microsoft.com/office/drawing/2014/main" val="25355368"/>
+                  </a:ext>
+                </a:extLst>
+              </a:tr>
+            </a:tbl>
+          </a:graphicData>
+        </a:graphic>
+      </p:graphicFrame>
+    </p:spTree>
+    <p:extLst>
+      <p:ext uri="{BB962C8B-B14F-4D97-AF65-F5344CB8AC3E}">
+        <p14:creationId xmlns:p14="http://schemas.microsoft.com/office/powerpoint/2010/main" val="3361084387"/>
+      </p:ext>
+    </p:extLst>
+  </p:cSld>
+  <p:clrMapOvr>
+    <a:masterClrMapping/>
+  </p:clrMapOvr>
+</p:sld>
+</file>
+
+<file path=ppt/slides/slide21.xml><?xml version="1.0" encoding="utf-8"?>
+<p:sld xmlns:a="http://schemas.openxmlformats.org/drawingml/2006/main" xmlns:r="http://schemas.openxmlformats.org/officeDocument/2006/relationships" xmlns:p="http://schemas.openxmlformats.org/presentationml/2006/main">
+  <p:cSld>
+    <p:spTree>
+      <p:nvGrpSpPr>
+        <p:cNvPr id="1" name=""/>
+        <p:cNvGrpSpPr/>
+        <p:nvPr/>
+      </p:nvGrpSpPr>
+      <p:grpSpPr>
+        <a:xfrm>
+          <a:off x="0" y="0"/>
+          <a:ext cx="0" cy="0"/>
+          <a:chOff x="0" y="0"/>
+          <a:chExt cx="0" cy="0"/>
+        </a:xfrm>
+      </p:grpSpPr>
+      <p:sp>
+        <p:nvSpPr>
+          <p:cNvPr id="2" name="Title 1"/>
+          <p:cNvSpPr>
+            <a:spLocks noGrp="1"/>
+          </p:cNvSpPr>
+          <p:nvPr>
+            <p:ph type="title"/>
+          </p:nvPr>
+        </p:nvSpPr>
+        <p:spPr/>
+        <p:txBody>
+          <a:bodyPr/>
+          <a:lstStyle/>
+          <a:p>
+            <a:r>
+              <a:rPr lang="en-US" dirty="0"/>
               <a:t>Generator functions (III)</a:t>
             </a:r>
           </a:p>
@@ -15227,7 +17775,7 @@
 </p:sld>
 </file>
 
-<file path=ppt/slides/slide21.xml><?xml version="1.0" encoding="utf-8"?>
+<file path=ppt/slides/slide22.xml><?xml version="1.0" encoding="utf-8"?>
 <p:sld xmlns:a="http://schemas.openxmlformats.org/drawingml/2006/main" xmlns:r="http://schemas.openxmlformats.org/officeDocument/2006/relationships" xmlns:p="http://schemas.openxmlformats.org/presentationml/2006/main">
   <p:cSld>
     <p:spTree>
@@ -16063,7 +18611,7 @@
 </p:sld>
 </file>
 
-<file path=ppt/slides/slide22.xml><?xml version="1.0" encoding="utf-8"?>
+<file path=ppt/slides/slide23.xml><?xml version="1.0" encoding="utf-8"?>
 <p:sld xmlns:a="http://schemas.openxmlformats.org/drawingml/2006/main" xmlns:r="http://schemas.openxmlformats.org/officeDocument/2006/relationships" xmlns:p="http://schemas.openxmlformats.org/presentationml/2006/main">
   <p:cSld>
     <p:spTree>
@@ -17045,7 +19593,7 @@
 </p:sld>
 </file>
 
-<file path=ppt/slides/slide23.xml><?xml version="1.0" encoding="utf-8"?>
+<file path=ppt/slides/slide24.xml><?xml version="1.0" encoding="utf-8"?>
 <p:sld xmlns:a="http://schemas.openxmlformats.org/drawingml/2006/main" xmlns:r="http://schemas.openxmlformats.org/officeDocument/2006/relationships" xmlns:p="http://schemas.openxmlformats.org/presentationml/2006/main">
   <p:cSld>
     <p:spTree>
@@ -19011,7 +21559,7 @@
 </p:sld>
 </file>
 
-<file path=ppt/slides/slide24.xml><?xml version="1.0" encoding="utf-8"?>
+<file path=ppt/slides/slide25.xml><?xml version="1.0" encoding="utf-8"?>
 <p:sld xmlns:a="http://schemas.openxmlformats.org/drawingml/2006/main" xmlns:r="http://schemas.openxmlformats.org/officeDocument/2006/relationships" xmlns:p="http://schemas.openxmlformats.org/presentationml/2006/main">
   <p:cSld>
     <p:bg>
@@ -20027,7 +22575,7 @@
 </p:sld>
 </file>
 
-<file path=ppt/slides/slide25.xml><?xml version="1.0" encoding="utf-8"?>
+<file path=ppt/slides/slide26.xml><?xml version="1.0" encoding="utf-8"?>
 <p:sld xmlns:a="http://schemas.openxmlformats.org/drawingml/2006/main" xmlns:r="http://schemas.openxmlformats.org/officeDocument/2006/relationships" xmlns:p="http://schemas.openxmlformats.org/presentationml/2006/main">
   <p:cSld>
     <p:spTree>
@@ -20371,7 +22919,7 @@
 </p:sld>
 </file>
 
-<file path=ppt/slides/slide26.xml><?xml version="1.0" encoding="utf-8"?>
+<file path=ppt/slides/slide27.xml><?xml version="1.0" encoding="utf-8"?>
 <p:sld xmlns:a="http://schemas.openxmlformats.org/drawingml/2006/main" xmlns:r="http://schemas.openxmlformats.org/officeDocument/2006/relationships" xmlns:p="http://schemas.openxmlformats.org/presentationml/2006/main">
   <p:cSld>
     <p:spTree>
@@ -20431,7 +22979,7 @@
 </p:sld>
 </file>
 
-<file path=ppt/slides/slide27.xml><?xml version="1.0" encoding="utf-8"?>
+<file path=ppt/slides/slide28.xml><?xml version="1.0" encoding="utf-8"?>
 <p:sld xmlns:a="http://schemas.openxmlformats.org/drawingml/2006/main" xmlns:r="http://schemas.openxmlformats.org/officeDocument/2006/relationships" xmlns:p="http://schemas.openxmlformats.org/presentationml/2006/main">
   <p:cSld>
     <p:spTree>
@@ -21542,7 +24090,7 @@
 </p:sld>
 </file>
 
-<file path=ppt/slides/slide28.xml><?xml version="1.0" encoding="utf-8"?>
+<file path=ppt/slides/slide29.xml><?xml version="1.0" encoding="utf-8"?>
 <p:sld xmlns:a="http://schemas.openxmlformats.org/drawingml/2006/main" xmlns:r="http://schemas.openxmlformats.org/officeDocument/2006/relationships" xmlns:p="http://schemas.openxmlformats.org/presentationml/2006/main">
   <p:cSld>
     <p:spTree>

</xml_diff>

<commit_message>
all-slides.pdf code.zip generator.pdf generator.pptx linear_programming.pdf linear_programming.pptx
</commit_message>
<xml_diff>
--- a/ipsa/slides/generator.pptx
+++ b/ipsa/slides/generator.pptx
@@ -143,14 +143,6 @@
     </p:ext>
   </p:extLst>
 </p:presentation>
-</file>
-
-<file path=ppt/revisionInfo.xml><?xml version="1.0" encoding="utf-8"?>
-<p1510:revInfo xmlns:a="http://schemas.openxmlformats.org/drawingml/2006/main" xmlns:r="http://schemas.openxmlformats.org/officeDocument/2006/relationships" xmlns:p1510="http://schemas.microsoft.com/office/powerpoint/2015/10/main">
-  <p1510:revLst>
-    <p1510:client id="{E4089CCC-B90E-46C4-9B2A-F81B79956F50}" v="35" dt="2023-11-15T17:54:49.390"/>
-  </p1510:revLst>
-</p1510:revInfo>
 </file>
 
 <file path=ppt/changesInfos/changesInfo1.xml><?xml version="1.0" encoding="utf-8"?>
@@ -307,6 +299,44 @@
       </pc:sldChg>
       <pc:sldChg chg="modNotesTx">
         <pc:chgData name="Gerth Stølting Brodal" userId="04ef4784-6591-4f86-a140-f5c3b108582a" providerId="ADAL" clId="{8F01AD35-76F1-436A-A724-AA1C8EE65345}" dt="2022-04-06T10:34:12.261" v="403" actId="20577"/>
+        <pc:sldMkLst>
+          <pc:docMk/>
+          <pc:sldMk cId="2357954353" sldId="799"/>
+        </pc:sldMkLst>
+      </pc:sldChg>
+    </pc:docChg>
+  </pc:docChgLst>
+  <pc:docChgLst>
+    <pc:chgData name="Gerth Stølting Brodal" userId="04ef4784-6591-4f86-a140-f5c3b108582a" providerId="ADAL" clId="{5DA4543F-F583-43DE-937B-D22729584F75}"/>
+    <pc:docChg chg="modSld">
+      <pc:chgData name="Gerth Stølting Brodal" userId="04ef4784-6591-4f86-a140-f5c3b108582a" providerId="ADAL" clId="{5DA4543F-F583-43DE-937B-D22729584F75}" dt="2024-04-14T20:18:53.022" v="40" actId="20577"/>
+      <pc:docMkLst>
+        <pc:docMk/>
+      </pc:docMkLst>
+      <pc:sldChg chg="modNotesTx">
+        <pc:chgData name="Gerth Stølting Brodal" userId="04ef4784-6591-4f86-a140-f5c3b108582a" providerId="ADAL" clId="{5DA4543F-F583-43DE-937B-D22729584F75}" dt="2024-04-14T18:53:04.967" v="1" actId="20577"/>
+        <pc:sldMkLst>
+          <pc:docMk/>
+          <pc:sldMk cId="298046743" sldId="766"/>
+        </pc:sldMkLst>
+      </pc:sldChg>
+      <pc:sldChg chg="modSp mod">
+        <pc:chgData name="Gerth Stølting Brodal" userId="04ef4784-6591-4f86-a140-f5c3b108582a" providerId="ADAL" clId="{5DA4543F-F583-43DE-937B-D22729584F75}" dt="2024-04-14T19:27:24.007" v="3" actId="20577"/>
+        <pc:sldMkLst>
+          <pc:docMk/>
+          <pc:sldMk cId="229453076" sldId="768"/>
+        </pc:sldMkLst>
+        <pc:spChg chg="mod">
+          <ac:chgData name="Gerth Stølting Brodal" userId="04ef4784-6591-4f86-a140-f5c3b108582a" providerId="ADAL" clId="{5DA4543F-F583-43DE-937B-D22729584F75}" dt="2024-04-14T19:27:24.007" v="3" actId="20577"/>
+          <ac:spMkLst>
+            <pc:docMk/>
+            <pc:sldMk cId="229453076" sldId="768"/>
+            <ac:spMk id="6" creationId="{00000000-0000-0000-0000-000000000000}"/>
+          </ac:spMkLst>
+        </pc:spChg>
+      </pc:sldChg>
+      <pc:sldChg chg="modNotesTx">
+        <pc:chgData name="Gerth Stølting Brodal" userId="04ef4784-6591-4f86-a140-f5c3b108582a" providerId="ADAL" clId="{5DA4543F-F583-43DE-937B-D22729584F75}" dt="2024-04-14T20:18:53.022" v="40" actId="20577"/>
         <pc:sldMkLst>
           <pc:docMk/>
           <pc:sldMk cId="2357954353" sldId="799"/>
@@ -1022,7 +1052,7 @@
           <a:p>
             <a:fld id="{FB1A172F-81D4-4DC4-9113-1DBD56EC3646}" type="datetimeFigureOut">
               <a:rPr lang="en-US" smtClean="0"/>
-              <a:t>11/15/2023</a:t>
+              <a:t>4/14/2024</a:t>
             </a:fld>
             <a:endParaRPr lang="en-US"/>
           </a:p>
@@ -1632,13 +1662,8 @@
           <a:p>
             <a:r>
               <a:rPr lang="en-US" b="0" baseline="0" dirty="0"/>
-              <a:t>“yield from G” does not improve performance over “for x in G</a:t>
-            </a:r>
-            <a:r>
-              <a:rPr lang="en-US" b="0" baseline="0"/>
-              <a:t>: yield x”</a:t>
-            </a:r>
-            <a:endParaRPr lang="en-US" b="0" baseline="0" dirty="0"/>
+              <a:t>“yield from G” does not improve performance over “for x in G: yield x”</a:t>
+            </a:r>
           </a:p>
           <a:p>
             <a:r>
@@ -1815,15 +1840,7 @@
           <a:p>
             <a:r>
               <a:rPr lang="en-US" dirty="0"/>
-              <a:t>Note: for squares only </a:t>
-            </a:r>
-            <a:r>
-              <a:rPr lang="en-US"/>
-              <a:t>the size </a:t>
-            </a:r>
-            <a:r>
-              <a:rPr lang="en-US" dirty="0"/>
-              <a:t>of the list is reported, </a:t>
+              <a:t>Note: for squares only the size of the list is reported, </a:t>
             </a:r>
             <a:r>
               <a:rPr lang="en-US" dirty="0" err="1"/>
@@ -1983,6 +2000,38 @@
           <a:bodyPr/>
           <a:lstStyle/>
           <a:p>
+            <a:pPr marL="0" marR="0" lvl="0" indent="0" algn="l" defTabSz="914400" rtl="0" eaLnBrk="1" fontAlgn="auto" latinLnBrk="0" hangingPunct="1">
+              <a:lnSpc>
+                <a:spcPct val="100000"/>
+              </a:lnSpc>
+              <a:spcBef>
+                <a:spcPts val="0"/>
+              </a:spcBef>
+              <a:spcAft>
+                <a:spcPts val="0"/>
+              </a:spcAft>
+              <a:buClrTx/>
+              <a:buSzTx/>
+              <a:buFontTx/>
+              <a:buNone/>
+              <a:tabLst/>
+              <a:defRPr/>
+            </a:pPr>
+            <a:r>
+              <a:rPr lang="en-US" dirty="0"/>
+              <a:t>2024: </a:t>
+            </a:r>
+            <a:r>
+              <a:rPr lang="da-DK" b="1" dirty="0"/>
+              <a:t>memory-profiler 0.61.0 is no longer </a:t>
+            </a:r>
+            <a:r>
+              <a:rPr lang="da-DK" b="1" dirty="0" err="1"/>
+              <a:t>maintained</a:t>
+            </a:r>
+            <a:endParaRPr lang="en-US" dirty="0"/>
+          </a:p>
+          <a:p>
             <a:r>
               <a:rPr lang="en-US" dirty="0" err="1"/>
               <a:t>mprof</a:t>
@@ -1993,9 +2042,6 @@
             </a:r>
           </a:p>
           <a:p>
-            <a:endParaRPr lang="en-US" baseline="0" dirty="0"/>
-          </a:p>
-          <a:p>
             <a:r>
               <a:rPr lang="en-US" baseline="0" dirty="0"/>
               <a:t>“</a:t>
@@ -2006,11 +2052,7 @@
             </a:r>
             <a:r>
               <a:rPr lang="en-US" baseline="0" dirty="0"/>
-              <a:t> run” creates a file “mprofile_20220406123307.dat” (number is the date </a:t>
-            </a:r>
-            <a:r>
-              <a:rPr lang="en-US" baseline="0"/>
-              <a:t>and time)</a:t>
+              <a:t> run” creates a file “mprofile_20220406123307.dat” (number is the date and time)</a:t>
             </a:r>
             <a:endParaRPr lang="en-US" dirty="0"/>
           </a:p>
@@ -2102,15 +2144,7 @@
             </a:r>
             <a:r>
               <a:rPr lang="en-US" baseline="0" dirty="0"/>
-              <a:t> tuples, sets, dictionaries support iteration (</a:t>
-            </a:r>
-            <a:r>
-              <a:rPr lang="en-US" baseline="0" dirty="0" err="1"/>
-              <a:t>dicitonaries</a:t>
-            </a:r>
-            <a:r>
-              <a:rPr lang="en-US" baseline="0" dirty="0"/>
-              <a:t> over the set of values)</a:t>
+              <a:t> tuples, sets, dictionaries support iteration (dictionaries over the set of values)</a:t>
             </a:r>
             <a:endParaRPr lang="en-US" dirty="0"/>
           </a:p>
@@ -3382,7 +3416,7 @@
           <a:p>
             <a:fld id="{0560A9CD-0304-4E0B-9E82-E7E0115DE05B}" type="datetimeFigureOut">
               <a:rPr lang="en-US" smtClean="0"/>
-              <a:t>11/15/2023</a:t>
+              <a:t>4/14/2024</a:t>
             </a:fld>
             <a:endParaRPr lang="en-US"/>
           </a:p>
@@ -3550,7 +3584,7 @@
           <a:p>
             <a:fld id="{0560A9CD-0304-4E0B-9E82-E7E0115DE05B}" type="datetimeFigureOut">
               <a:rPr lang="en-US" smtClean="0"/>
-              <a:t>11/15/2023</a:t>
+              <a:t>4/14/2024</a:t>
             </a:fld>
             <a:endParaRPr lang="en-US"/>
           </a:p>
@@ -3728,7 +3762,7 @@
           <a:p>
             <a:fld id="{0560A9CD-0304-4E0B-9E82-E7E0115DE05B}" type="datetimeFigureOut">
               <a:rPr lang="en-US" smtClean="0"/>
-              <a:t>11/15/2023</a:t>
+              <a:t>4/14/2024</a:t>
             </a:fld>
             <a:endParaRPr lang="en-US"/>
           </a:p>
@@ -3911,7 +3945,7 @@
           <a:p>
             <a:fld id="{0560A9CD-0304-4E0B-9E82-E7E0115DE05B}" type="datetimeFigureOut">
               <a:rPr lang="en-US" smtClean="0"/>
-              <a:t>11/15/2023</a:t>
+              <a:t>4/14/2024</a:t>
             </a:fld>
             <a:endParaRPr lang="en-US"/>
           </a:p>
@@ -4156,7 +4190,7 @@
           <a:p>
             <a:fld id="{0560A9CD-0304-4E0B-9E82-E7E0115DE05B}" type="datetimeFigureOut">
               <a:rPr lang="en-US" smtClean="0"/>
-              <a:t>11/15/2023</a:t>
+              <a:t>4/14/2024</a:t>
             </a:fld>
             <a:endParaRPr lang="en-US"/>
           </a:p>
@@ -4385,7 +4419,7 @@
           <a:p>
             <a:fld id="{0560A9CD-0304-4E0B-9E82-E7E0115DE05B}" type="datetimeFigureOut">
               <a:rPr lang="en-US" smtClean="0"/>
-              <a:t>11/15/2023</a:t>
+              <a:t>4/14/2024</a:t>
             </a:fld>
             <a:endParaRPr lang="en-US"/>
           </a:p>
@@ -4749,7 +4783,7 @@
           <a:p>
             <a:fld id="{0560A9CD-0304-4E0B-9E82-E7E0115DE05B}" type="datetimeFigureOut">
               <a:rPr lang="en-US" smtClean="0"/>
-              <a:t>11/15/2023</a:t>
+              <a:t>4/14/2024</a:t>
             </a:fld>
             <a:endParaRPr lang="en-US"/>
           </a:p>
@@ -4866,7 +4900,7 @@
           <a:p>
             <a:fld id="{0560A9CD-0304-4E0B-9E82-E7E0115DE05B}" type="datetimeFigureOut">
               <a:rPr lang="en-US" smtClean="0"/>
-              <a:t>11/15/2023</a:t>
+              <a:t>4/14/2024</a:t>
             </a:fld>
             <a:endParaRPr lang="en-US"/>
           </a:p>
@@ -4961,7 +4995,7 @@
           <a:p>
             <a:fld id="{0560A9CD-0304-4E0B-9E82-E7E0115DE05B}" type="datetimeFigureOut">
               <a:rPr lang="en-US" smtClean="0"/>
-              <a:t>11/15/2023</a:t>
+              <a:t>4/14/2024</a:t>
             </a:fld>
             <a:endParaRPr lang="en-US"/>
           </a:p>
@@ -5236,7 +5270,7 @@
           <a:p>
             <a:fld id="{0560A9CD-0304-4E0B-9E82-E7E0115DE05B}" type="datetimeFigureOut">
               <a:rPr lang="en-US" smtClean="0"/>
-              <a:t>11/15/2023</a:t>
+              <a:t>4/14/2024</a:t>
             </a:fld>
             <a:endParaRPr lang="en-US"/>
           </a:p>
@@ -5488,7 +5522,7 @@
           <a:p>
             <a:fld id="{0560A9CD-0304-4E0B-9E82-E7E0115DE05B}" type="datetimeFigureOut">
               <a:rPr lang="en-US" smtClean="0"/>
-              <a:t>11/15/2023</a:t>
+              <a:t>4/14/2024</a:t>
             </a:fld>
             <a:endParaRPr lang="en-US"/>
           </a:p>
@@ -5699,7 +5733,7 @@
           <a:p>
             <a:fld id="{0560A9CD-0304-4E0B-9E82-E7E0115DE05B}" type="datetimeFigureOut">
               <a:rPr lang="en-US" smtClean="0"/>
-              <a:t>11/15/2023</a:t>
+              <a:t>4/14/2024</a:t>
             </a:fld>
             <a:endParaRPr lang="en-US"/>
           </a:p>
@@ -9009,7 +9043,7 @@
           <a:p>
             <a:r>
               <a:rPr lang="en-US" dirty="0"/>
-              <a:t>Note that objects act both as an </a:t>
+              <a:t>Note that object acts both as an </a:t>
             </a:r>
             <a:r>
               <a:rPr lang="en-US" dirty="0" err="1"/>

</xml_diff>

<commit_message>
project-4-mnist.md all-slides.pdf code.zip generator.pdf generator.pptx text.pdf text.pptx
</commit_message>
<xml_diff>
--- a/ipsa/slides/generator.pptx
+++ b/ipsa/slides/generator.pptx
@@ -308,8 +308,8 @@
   </pc:docChgLst>
   <pc:docChgLst>
     <pc:chgData name="Gerth Stølting Brodal" userId="04ef4784-6591-4f86-a140-f5c3b108582a" providerId="ADAL" clId="{5DA4543F-F583-43DE-937B-D22729584F75}"/>
-    <pc:docChg chg="modSld">
-      <pc:chgData name="Gerth Stølting Brodal" userId="04ef4784-6591-4f86-a140-f5c3b108582a" providerId="ADAL" clId="{5DA4543F-F583-43DE-937B-D22729584F75}" dt="2024-04-14T20:18:53.022" v="40" actId="20577"/>
+    <pc:docChg chg="undo custSel modSld">
+      <pc:chgData name="Gerth Stølting Brodal" userId="04ef4784-6591-4f86-a140-f5c3b108582a" providerId="ADAL" clId="{5DA4543F-F583-43DE-937B-D22729584F75}" dt="2024-04-25T09:58:42.702" v="216" actId="20577"/>
       <pc:docMkLst>
         <pc:docMk/>
       </pc:docMkLst>
@@ -340,6 +340,13 @@
         <pc:sldMkLst>
           <pc:docMk/>
           <pc:sldMk cId="2357954353" sldId="799"/>
+        </pc:sldMkLst>
+      </pc:sldChg>
+      <pc:sldChg chg="modNotesTx">
+        <pc:chgData name="Gerth Stølting Brodal" userId="04ef4784-6591-4f86-a140-f5c3b108582a" providerId="ADAL" clId="{5DA4543F-F583-43DE-937B-D22729584F75}" dt="2024-04-25T09:58:42.702" v="216" actId="20577"/>
+        <pc:sldMkLst>
+          <pc:docMk/>
+          <pc:sldMk cId="702637341" sldId="804"/>
         </pc:sldMkLst>
       </pc:sldChg>
     </pc:docChg>
@@ -1052,7 +1059,7 @@
           <a:p>
             <a:fld id="{FB1A172F-81D4-4DC4-9113-1DBD56EC3646}" type="datetimeFigureOut">
               <a:rPr lang="en-US" smtClean="0"/>
-              <a:t>4/14/2024</a:t>
+              <a:t>4/25/2024</a:t>
             </a:fld>
             <a:endParaRPr lang="en-US"/>
           </a:p>
@@ -1754,7 +1761,44 @@
           <a:bodyPr/>
           <a:lstStyle/>
           <a:p>
-            <a:endParaRPr lang="en-US" dirty="0"/>
+            <a:r>
+              <a:rPr lang="da-DK" dirty="0"/>
+              <a:t>Python 3.12 bug: </a:t>
+            </a:r>
+            <a:r>
+              <a:rPr lang="da-DK" dirty="0" err="1"/>
+              <a:t>r.close</a:t>
+            </a:r>
+            <a:r>
+              <a:rPr lang="da-DK" dirty="0"/>
+              <a:t> </a:t>
+            </a:r>
+            <a:r>
+              <a:rPr lang="da-DK" dirty="0" err="1"/>
+              <a:t>does</a:t>
+            </a:r>
+            <a:r>
+              <a:rPr lang="da-DK" dirty="0"/>
+              <a:t> not release </a:t>
+            </a:r>
+            <a:r>
+              <a:rPr lang="da-DK" dirty="0" err="1"/>
+              <a:t>resources</a:t>
+            </a:r>
+            <a:endParaRPr lang="da-DK" dirty="0"/>
+          </a:p>
+          <a:p>
+            <a:r>
+              <a:rPr lang="da-DK" dirty="0"/>
+              <a:t>https://github.com/python/cpython/issues</a:t>
+            </a:r>
+            <a:r>
+              <a:rPr lang="da-DK"/>
+              <a:t>/118272</a:t>
+            </a:r>
+          </a:p>
+          <a:p>
+            <a:endParaRPr lang="da-DK" dirty="0"/>
           </a:p>
         </p:txBody>
       </p:sp>
@@ -1765,7 +1809,7 @@
             <a:spLocks noGrp="1"/>
           </p:cNvSpPr>
           <p:nvPr>
-            <p:ph type="sldNum" sz="quarter" idx="10"/>
+            <p:ph type="sldNum" sz="quarter" idx="5"/>
           </p:nvPr>
         </p:nvSpPr>
         <p:spPr/>
@@ -1775,7 +1819,7 @@
           <a:p>
             <a:fld id="{CD563DD8-32AB-41BE-B1C6-8EAC45222ACE}" type="slidenum">
               <a:rPr lang="en-US" smtClean="0"/>
-              <a:t>28</a:t>
+              <a:t>26</a:t>
             </a:fld>
             <a:endParaRPr lang="en-US"/>
           </a:p>
@@ -1784,7 +1828,7 @@
     </p:spTree>
     <p:extLst>
       <p:ext uri="{BB962C8B-B14F-4D97-AF65-F5344CB8AC3E}">
-        <p14:creationId xmlns:p14="http://schemas.microsoft.com/office/powerpoint/2010/main" val="3336099653"/>
+        <p14:creationId xmlns:p14="http://schemas.microsoft.com/office/powerpoint/2010/main" val="2710878540"/>
       </p:ext>
     </p:extLst>
   </p:cSld>
@@ -1838,6 +1882,90 @@
           <a:bodyPr/>
           <a:lstStyle/>
           <a:p>
+            <a:endParaRPr lang="en-US" dirty="0"/>
+          </a:p>
+        </p:txBody>
+      </p:sp>
+      <p:sp>
+        <p:nvSpPr>
+          <p:cNvPr id="4" name="Slide Number Placeholder 3"/>
+          <p:cNvSpPr>
+            <a:spLocks noGrp="1"/>
+          </p:cNvSpPr>
+          <p:nvPr>
+            <p:ph type="sldNum" sz="quarter" idx="10"/>
+          </p:nvPr>
+        </p:nvSpPr>
+        <p:spPr/>
+        <p:txBody>
+          <a:bodyPr/>
+          <a:lstStyle/>
+          <a:p>
+            <a:fld id="{CD563DD8-32AB-41BE-B1C6-8EAC45222ACE}" type="slidenum">
+              <a:rPr lang="en-US" smtClean="0"/>
+              <a:t>28</a:t>
+            </a:fld>
+            <a:endParaRPr lang="en-US"/>
+          </a:p>
+        </p:txBody>
+      </p:sp>
+    </p:spTree>
+    <p:extLst>
+      <p:ext uri="{BB962C8B-B14F-4D97-AF65-F5344CB8AC3E}">
+        <p14:creationId xmlns:p14="http://schemas.microsoft.com/office/powerpoint/2010/main" val="3336099653"/>
+      </p:ext>
+    </p:extLst>
+  </p:cSld>
+  <p:clrMapOvr>
+    <a:masterClrMapping/>
+  </p:clrMapOvr>
+</p:notes>
+</file>
+
+<file path=ppt/notesSlides/notesSlide15.xml><?xml version="1.0" encoding="utf-8"?>
+<p:notes xmlns:a="http://schemas.openxmlformats.org/drawingml/2006/main" xmlns:r="http://schemas.openxmlformats.org/officeDocument/2006/relationships" xmlns:p="http://schemas.openxmlformats.org/presentationml/2006/main">
+  <p:cSld>
+    <p:spTree>
+      <p:nvGrpSpPr>
+        <p:cNvPr id="1" name=""/>
+        <p:cNvGrpSpPr/>
+        <p:nvPr/>
+      </p:nvGrpSpPr>
+      <p:grpSpPr>
+        <a:xfrm>
+          <a:off x="0" y="0"/>
+          <a:ext cx="0" cy="0"/>
+          <a:chOff x="0" y="0"/>
+          <a:chExt cx="0" cy="0"/>
+        </a:xfrm>
+      </p:grpSpPr>
+      <p:sp>
+        <p:nvSpPr>
+          <p:cNvPr id="2" name="Slide Image Placeholder 1"/>
+          <p:cNvSpPr>
+            <a:spLocks noGrp="1" noRot="1" noChangeAspect="1"/>
+          </p:cNvSpPr>
+          <p:nvPr>
+            <p:ph type="sldImg"/>
+          </p:nvPr>
+        </p:nvSpPr>
+        <p:spPr/>
+      </p:sp>
+      <p:sp>
+        <p:nvSpPr>
+          <p:cNvPr id="3" name="Notes Placeholder 2"/>
+          <p:cNvSpPr>
+            <a:spLocks noGrp="1"/>
+          </p:cNvSpPr>
+          <p:nvPr>
+            <p:ph type="body" idx="1"/>
+          </p:nvPr>
+        </p:nvSpPr>
+        <p:spPr/>
+        <p:txBody>
+          <a:bodyPr/>
+          <a:lstStyle/>
+          <a:p>
             <a:r>
               <a:rPr lang="en-US" dirty="0"/>
               <a:t>Note: for squares only the size of the list is reported, </a:t>
@@ -1956,7 +2084,7 @@
 </p:notes>
 </file>
 
-<file path=ppt/notesSlides/notesSlide15.xml><?xml version="1.0" encoding="utf-8"?>
+<file path=ppt/notesSlides/notesSlide16.xml><?xml version="1.0" encoding="utf-8"?>
 <p:notes xmlns:a="http://schemas.openxmlformats.org/drawingml/2006/main" xmlns:r="http://schemas.openxmlformats.org/officeDocument/2006/relationships" xmlns:p="http://schemas.openxmlformats.org/presentationml/2006/main">
   <p:cSld>
     <p:spTree>
@@ -3416,7 +3544,7 @@
           <a:p>
             <a:fld id="{0560A9CD-0304-4E0B-9E82-E7E0115DE05B}" type="datetimeFigureOut">
               <a:rPr lang="en-US" smtClean="0"/>
-              <a:t>4/14/2024</a:t>
+              <a:t>4/25/2024</a:t>
             </a:fld>
             <a:endParaRPr lang="en-US"/>
           </a:p>
@@ -3584,7 +3712,7 @@
           <a:p>
             <a:fld id="{0560A9CD-0304-4E0B-9E82-E7E0115DE05B}" type="datetimeFigureOut">
               <a:rPr lang="en-US" smtClean="0"/>
-              <a:t>4/14/2024</a:t>
+              <a:t>4/25/2024</a:t>
             </a:fld>
             <a:endParaRPr lang="en-US"/>
           </a:p>
@@ -3762,7 +3890,7 @@
           <a:p>
             <a:fld id="{0560A9CD-0304-4E0B-9E82-E7E0115DE05B}" type="datetimeFigureOut">
               <a:rPr lang="en-US" smtClean="0"/>
-              <a:t>4/14/2024</a:t>
+              <a:t>4/25/2024</a:t>
             </a:fld>
             <a:endParaRPr lang="en-US"/>
           </a:p>
@@ -3945,7 +4073,7 @@
           <a:p>
             <a:fld id="{0560A9CD-0304-4E0B-9E82-E7E0115DE05B}" type="datetimeFigureOut">
               <a:rPr lang="en-US" smtClean="0"/>
-              <a:t>4/14/2024</a:t>
+              <a:t>4/25/2024</a:t>
             </a:fld>
             <a:endParaRPr lang="en-US"/>
           </a:p>
@@ -4190,7 +4318,7 @@
           <a:p>
             <a:fld id="{0560A9CD-0304-4E0B-9E82-E7E0115DE05B}" type="datetimeFigureOut">
               <a:rPr lang="en-US" smtClean="0"/>
-              <a:t>4/14/2024</a:t>
+              <a:t>4/25/2024</a:t>
             </a:fld>
             <a:endParaRPr lang="en-US"/>
           </a:p>
@@ -4419,7 +4547,7 @@
           <a:p>
             <a:fld id="{0560A9CD-0304-4E0B-9E82-E7E0115DE05B}" type="datetimeFigureOut">
               <a:rPr lang="en-US" smtClean="0"/>
-              <a:t>4/14/2024</a:t>
+              <a:t>4/25/2024</a:t>
             </a:fld>
             <a:endParaRPr lang="en-US"/>
           </a:p>
@@ -4783,7 +4911,7 @@
           <a:p>
             <a:fld id="{0560A9CD-0304-4E0B-9E82-E7E0115DE05B}" type="datetimeFigureOut">
               <a:rPr lang="en-US" smtClean="0"/>
-              <a:t>4/14/2024</a:t>
+              <a:t>4/25/2024</a:t>
             </a:fld>
             <a:endParaRPr lang="en-US"/>
           </a:p>
@@ -4900,7 +5028,7 @@
           <a:p>
             <a:fld id="{0560A9CD-0304-4E0B-9E82-E7E0115DE05B}" type="datetimeFigureOut">
               <a:rPr lang="en-US" smtClean="0"/>
-              <a:t>4/14/2024</a:t>
+              <a:t>4/25/2024</a:t>
             </a:fld>
             <a:endParaRPr lang="en-US"/>
           </a:p>
@@ -4995,7 +5123,7 @@
           <a:p>
             <a:fld id="{0560A9CD-0304-4E0B-9E82-E7E0115DE05B}" type="datetimeFigureOut">
               <a:rPr lang="en-US" smtClean="0"/>
-              <a:t>4/14/2024</a:t>
+              <a:t>4/25/2024</a:t>
             </a:fld>
             <a:endParaRPr lang="en-US"/>
           </a:p>
@@ -5270,7 +5398,7 @@
           <a:p>
             <a:fld id="{0560A9CD-0304-4E0B-9E82-E7E0115DE05B}" type="datetimeFigureOut">
               <a:rPr lang="en-US" smtClean="0"/>
-              <a:t>4/14/2024</a:t>
+              <a:t>4/25/2024</a:t>
             </a:fld>
             <a:endParaRPr lang="en-US"/>
           </a:p>
@@ -5522,7 +5650,7 @@
           <a:p>
             <a:fld id="{0560A9CD-0304-4E0B-9E82-E7E0115DE05B}" type="datetimeFigureOut">
               <a:rPr lang="en-US" smtClean="0"/>
-              <a:t>4/14/2024</a:t>
+              <a:t>4/25/2024</a:t>
             </a:fld>
             <a:endParaRPr lang="en-US"/>
           </a:p>
@@ -5733,7 +5861,7 @@
           <a:p>
             <a:fld id="{0560A9CD-0304-4E0B-9E82-E7E0115DE05B}" type="datetimeFigureOut">
               <a:rPr lang="en-US" smtClean="0"/>
-              <a:t>4/14/2024</a:t>
+              <a:t>4/25/2024</a:t>
             </a:fld>
             <a:endParaRPr lang="en-US"/>
           </a:p>
@@ -26254,7 +26382,7 @@
             <a:pPr algn="r"/>
             <a:r>
               <a:rPr lang="da-DK" dirty="0">
-                <a:hlinkClick r:id="rId2"/>
+                <a:hlinkClick r:id="rId3"/>
               </a:rPr>
               <a:t>docs.python.org/3/reference/expressions.html#generator.close</a:t>
             </a:r>

</xml_diff>

<commit_message>
all-slides.pdf code.zip generator.pdf generator.pptx modules.pdf modules.pptx numpy.pdf numpy.pptx
</commit_message>
<xml_diff>
--- a/ipsa/slides/generator.pptx
+++ b/ipsa/slides/generator.pptx
@@ -145,6 +145,14 @@
 </p:presentation>
 </file>
 
+<file path=ppt/revisionInfo.xml><?xml version="1.0" encoding="utf-8"?>
+<p1510:revInfo xmlns:a="http://schemas.openxmlformats.org/drawingml/2006/main" xmlns:r="http://schemas.openxmlformats.org/officeDocument/2006/relationships" xmlns:p1510="http://schemas.microsoft.com/office/powerpoint/2015/10/main">
+  <p1510:revLst>
+    <p1510:client id="{D8F300CF-040E-4FF6-8B35-86A8355B1F6F}" v="2" dt="2025-04-02T06:52:11.864"/>
+  </p1510:revLst>
+</p1510:revInfo>
+</file>
+
 <file path=ppt/changesInfos/changesInfo1.xml><?xml version="1.0" encoding="utf-8"?>
 <pc:chgInfo xmlns:a="http://schemas.openxmlformats.org/drawingml/2006/main" xmlns:r="http://schemas.openxmlformats.org/officeDocument/2006/relationships" xmlns:ac="http://schemas.microsoft.com/office/drawing/2013/main/command" xmlns:pc="http://schemas.microsoft.com/office/powerpoint/2013/main/command">
   <pc:docChgLst>
@@ -160,14 +168,6 @@
           <pc:docMk/>
           <pc:sldMk cId="4194574005" sldId="761"/>
         </pc:sldMkLst>
-        <pc:spChg chg="mod">
-          <ac:chgData name="Gerth Stølting Brodal" userId="04ef4784-6591-4f86-a140-f5c3b108582a" providerId="ADAL" clId="{8F01AD35-76F1-436A-A724-AA1C8EE65345}" dt="2022-04-06T05:23:58.433" v="112" actId="20577"/>
-          <ac:spMkLst>
-            <pc:docMk/>
-            <pc:sldMk cId="4194574005" sldId="761"/>
-            <ac:spMk id="3" creationId="{00000000-0000-0000-0000-000000000000}"/>
-          </ac:spMkLst>
-        </pc:spChg>
       </pc:sldChg>
       <pc:sldChg chg="modNotesTx">
         <pc:chgData name="Gerth Stølting Brodal" userId="04ef4784-6591-4f86-a140-f5c3b108582a" providerId="ADAL" clId="{8F01AD35-76F1-436A-A724-AA1C8EE65345}" dt="2022-04-05T08:08:23.743" v="105" actId="20577"/>
@@ -182,22 +182,6 @@
           <pc:docMk/>
           <pc:sldMk cId="1996554883" sldId="779"/>
         </pc:sldMkLst>
-        <pc:graphicFrameChg chg="modGraphic">
-          <ac:chgData name="Gerth Stølting Brodal" userId="04ef4784-6591-4f86-a140-f5c3b108582a" providerId="ADAL" clId="{8F01AD35-76F1-436A-A724-AA1C8EE65345}" dt="2022-04-06T10:18:01.107" v="241" actId="20577"/>
-          <ac:graphicFrameMkLst>
-            <pc:docMk/>
-            <pc:sldMk cId="1996554883" sldId="779"/>
-            <ac:graphicFrameMk id="3" creationId="{00000000-0000-0000-0000-000000000000}"/>
-          </ac:graphicFrameMkLst>
-        </pc:graphicFrameChg>
-        <pc:graphicFrameChg chg="modGraphic">
-          <ac:chgData name="Gerth Stølting Brodal" userId="04ef4784-6591-4f86-a140-f5c3b108582a" providerId="ADAL" clId="{8F01AD35-76F1-436A-A724-AA1C8EE65345}" dt="2022-04-06T10:18:32.180" v="246" actId="2161"/>
-          <ac:graphicFrameMkLst>
-            <pc:docMk/>
-            <pc:sldMk cId="1996554883" sldId="779"/>
-            <ac:graphicFrameMk id="4" creationId="{00000000-0000-0000-0000-000000000000}"/>
-          </ac:graphicFrameMkLst>
-        </pc:graphicFrameChg>
       </pc:sldChg>
       <pc:sldChg chg="modSp mod">
         <pc:chgData name="Gerth Stølting Brodal" userId="04ef4784-6591-4f86-a140-f5c3b108582a" providerId="ADAL" clId="{8F01AD35-76F1-436A-A724-AA1C8EE65345}" dt="2022-04-06T10:20:08.618" v="328" actId="20577"/>
@@ -205,14 +189,6 @@
           <pc:docMk/>
           <pc:sldMk cId="1764873955" sldId="780"/>
         </pc:sldMkLst>
-        <pc:graphicFrameChg chg="modGraphic">
-          <ac:chgData name="Gerth Stølting Brodal" userId="04ef4784-6591-4f86-a140-f5c3b108582a" providerId="ADAL" clId="{8F01AD35-76F1-436A-A724-AA1C8EE65345}" dt="2022-04-06T10:20:08.618" v="328" actId="20577"/>
-          <ac:graphicFrameMkLst>
-            <pc:docMk/>
-            <pc:sldMk cId="1764873955" sldId="780"/>
-            <ac:graphicFrameMk id="4" creationId="{00000000-0000-0000-0000-000000000000}"/>
-          </ac:graphicFrameMkLst>
-        </pc:graphicFrameChg>
       </pc:sldChg>
       <pc:sldChg chg="modSp mod">
         <pc:chgData name="Gerth Stølting Brodal" userId="04ef4784-6591-4f86-a140-f5c3b108582a" providerId="ADAL" clId="{8F01AD35-76F1-436A-A724-AA1C8EE65345}" dt="2022-04-06T15:26:48.171" v="422" actId="1036"/>
@@ -220,22 +196,6 @@
           <pc:docMk/>
           <pc:sldMk cId="3474449255" sldId="790"/>
         </pc:sldMkLst>
-        <pc:spChg chg="mod">
-          <ac:chgData name="Gerth Stølting Brodal" userId="04ef4784-6591-4f86-a140-f5c3b108582a" providerId="ADAL" clId="{8F01AD35-76F1-436A-A724-AA1C8EE65345}" dt="2022-04-06T15:26:42.601" v="412" actId="27636"/>
-          <ac:spMkLst>
-            <pc:docMk/>
-            <pc:sldMk cId="3474449255" sldId="790"/>
-            <ac:spMk id="3" creationId="{00000000-0000-0000-0000-000000000000}"/>
-          </ac:spMkLst>
-        </pc:spChg>
-        <pc:graphicFrameChg chg="mod modGraphic">
-          <ac:chgData name="Gerth Stølting Brodal" userId="04ef4784-6591-4f86-a140-f5c3b108582a" providerId="ADAL" clId="{8F01AD35-76F1-436A-A724-AA1C8EE65345}" dt="2022-04-06T15:26:48.171" v="422" actId="1036"/>
-          <ac:graphicFrameMkLst>
-            <pc:docMk/>
-            <pc:sldMk cId="3474449255" sldId="790"/>
-            <ac:graphicFrameMk id="5" creationId="{00000000-0000-0000-0000-000000000000}"/>
-          </ac:graphicFrameMkLst>
-        </pc:graphicFrameChg>
       </pc:sldChg>
       <pc:sldChg chg="modSp mod">
         <pc:chgData name="Gerth Stølting Brodal" userId="04ef4784-6591-4f86-a140-f5c3b108582a" providerId="ADAL" clId="{8F01AD35-76F1-436A-A724-AA1C8EE65345}" dt="2022-04-06T10:05:49.231" v="153" actId="6549"/>
@@ -243,14 +203,6 @@
           <pc:docMk/>
           <pc:sldMk cId="773748744" sldId="791"/>
         </pc:sldMkLst>
-        <pc:graphicFrameChg chg="mod modGraphic">
-          <ac:chgData name="Gerth Stølting Brodal" userId="04ef4784-6591-4f86-a140-f5c3b108582a" providerId="ADAL" clId="{8F01AD35-76F1-436A-A724-AA1C8EE65345}" dt="2022-04-06T10:05:49.231" v="153" actId="6549"/>
-          <ac:graphicFrameMkLst>
-            <pc:docMk/>
-            <pc:sldMk cId="773748744" sldId="791"/>
-            <ac:graphicFrameMk id="4" creationId="{00000000-0000-0000-0000-000000000000}"/>
-          </ac:graphicFrameMkLst>
-        </pc:graphicFrameChg>
       </pc:sldChg>
       <pc:sldChg chg="modSp mod">
         <pc:chgData name="Gerth Stølting Brodal" userId="04ef4784-6591-4f86-a140-f5c3b108582a" providerId="ADAL" clId="{8F01AD35-76F1-436A-A724-AA1C8EE65345}" dt="2022-04-06T10:04:18.355" v="124" actId="20577"/>
@@ -258,14 +210,6 @@
           <pc:docMk/>
           <pc:sldMk cId="617726596" sldId="792"/>
         </pc:sldMkLst>
-        <pc:graphicFrameChg chg="modGraphic">
-          <ac:chgData name="Gerth Stølting Brodal" userId="04ef4784-6591-4f86-a140-f5c3b108582a" providerId="ADAL" clId="{8F01AD35-76F1-436A-A724-AA1C8EE65345}" dt="2022-04-06T10:04:18.355" v="124" actId="20577"/>
-          <ac:graphicFrameMkLst>
-            <pc:docMk/>
-            <pc:sldMk cId="617726596" sldId="792"/>
-            <ac:graphicFrameMk id="4" creationId="{00000000-0000-0000-0000-000000000000}"/>
-          </ac:graphicFrameMkLst>
-        </pc:graphicFrameChg>
       </pc:sldChg>
       <pc:sldChg chg="modSp mod modNotesTx">
         <pc:chgData name="Gerth Stølting Brodal" userId="04ef4784-6591-4f86-a140-f5c3b108582a" providerId="ADAL" clId="{8F01AD35-76F1-436A-A724-AA1C8EE65345}" dt="2022-04-06T10:19:18.154" v="321" actId="20577"/>
@@ -273,14 +217,6 @@
           <pc:docMk/>
           <pc:sldMk cId="506658253" sldId="797"/>
         </pc:sldMkLst>
-        <pc:graphicFrameChg chg="mod modGraphic">
-          <ac:chgData name="Gerth Stølting Brodal" userId="04ef4784-6591-4f86-a140-f5c3b108582a" providerId="ADAL" clId="{8F01AD35-76F1-436A-A724-AA1C8EE65345}" dt="2022-04-06T10:19:06.874" v="320" actId="20577"/>
-          <ac:graphicFrameMkLst>
-            <pc:docMk/>
-            <pc:sldMk cId="506658253" sldId="797"/>
-            <ac:graphicFrameMk id="4" creationId="{00000000-0000-0000-0000-000000000000}"/>
-          </ac:graphicFrameMkLst>
-        </pc:graphicFrameChg>
       </pc:sldChg>
       <pc:sldChg chg="modSp mod">
         <pc:chgData name="Gerth Stølting Brodal" userId="04ef4784-6591-4f86-a140-f5c3b108582a" providerId="ADAL" clId="{8F01AD35-76F1-436A-A724-AA1C8EE65345}" dt="2022-04-06T10:30:00.974" v="334" actId="20577"/>
@@ -288,14 +224,6 @@
           <pc:docMk/>
           <pc:sldMk cId="3752852980" sldId="798"/>
         </pc:sldMkLst>
-        <pc:graphicFrameChg chg="modGraphic">
-          <ac:chgData name="Gerth Stølting Brodal" userId="04ef4784-6591-4f86-a140-f5c3b108582a" providerId="ADAL" clId="{8F01AD35-76F1-436A-A724-AA1C8EE65345}" dt="2022-04-06T10:30:00.974" v="334" actId="20577"/>
-          <ac:graphicFrameMkLst>
-            <pc:docMk/>
-            <pc:sldMk cId="3752852980" sldId="798"/>
-            <ac:graphicFrameMk id="4" creationId="{00000000-0000-0000-0000-000000000000}"/>
-          </ac:graphicFrameMkLst>
-        </pc:graphicFrameChg>
       </pc:sldChg>
       <pc:sldChg chg="modNotesTx">
         <pc:chgData name="Gerth Stølting Brodal" userId="04ef4784-6591-4f86-a140-f5c3b108582a" providerId="ADAL" clId="{8F01AD35-76F1-436A-A724-AA1C8EE65345}" dt="2022-04-06T10:34:12.261" v="403" actId="20577"/>
@@ -326,14 +254,6 @@
           <pc:docMk/>
           <pc:sldMk cId="229453076" sldId="768"/>
         </pc:sldMkLst>
-        <pc:spChg chg="mod">
-          <ac:chgData name="Gerth Stølting Brodal" userId="04ef4784-6591-4f86-a140-f5c3b108582a" providerId="ADAL" clId="{5DA4543F-F583-43DE-937B-D22729584F75}" dt="2024-04-14T19:27:24.007" v="3" actId="20577"/>
-          <ac:spMkLst>
-            <pc:docMk/>
-            <pc:sldMk cId="229453076" sldId="768"/>
-            <ac:spMk id="6" creationId="{00000000-0000-0000-0000-000000000000}"/>
-          </ac:spMkLst>
-        </pc:spChg>
       </pc:sldChg>
       <pc:sldChg chg="modNotesTx">
         <pc:chgData name="Gerth Stølting Brodal" userId="04ef4784-6591-4f86-a140-f5c3b108582a" providerId="ADAL" clId="{5DA4543F-F583-43DE-937B-D22729584F75}" dt="2024-04-14T20:18:53.022" v="40" actId="20577"/>
@@ -352,6 +272,30 @@
     </pc:docChg>
   </pc:docChgLst>
   <pc:docChgLst>
+    <pc:chgData name="Gerth Stølting Brodal" userId="04ef4784-6591-4f86-a140-f5c3b108582a" providerId="ADAL" clId="{D8F300CF-040E-4FF6-8B35-86A8355B1F6F}"/>
+    <pc:docChg chg="modSld">
+      <pc:chgData name="Gerth Stølting Brodal" userId="04ef4784-6591-4f86-a140-f5c3b108582a" providerId="ADAL" clId="{D8F300CF-040E-4FF6-8B35-86A8355B1F6F}" dt="2025-04-02T06:36:45.577" v="0" actId="20577"/>
+      <pc:docMkLst>
+        <pc:docMk/>
+      </pc:docMkLst>
+      <pc:sldChg chg="modSp">
+        <pc:chgData name="Gerth Stølting Brodal" userId="04ef4784-6591-4f86-a140-f5c3b108582a" providerId="ADAL" clId="{D8F300CF-040E-4FF6-8B35-86A8355B1F6F}" dt="2025-04-02T06:36:45.577" v="0" actId="20577"/>
+        <pc:sldMkLst>
+          <pc:docMk/>
+          <pc:sldMk cId="2832775796" sldId="783"/>
+        </pc:sldMkLst>
+        <pc:spChg chg="mod">
+          <ac:chgData name="Gerth Stølting Brodal" userId="04ef4784-6591-4f86-a140-f5c3b108582a" providerId="ADAL" clId="{D8F300CF-040E-4FF6-8B35-86A8355B1F6F}" dt="2025-04-02T06:36:45.577" v="0" actId="20577"/>
+          <ac:spMkLst>
+            <pc:docMk/>
+            <pc:sldMk cId="2832775796" sldId="783"/>
+            <ac:spMk id="12" creationId="{00000000-0000-0000-0000-000000000000}"/>
+          </ac:spMkLst>
+        </pc:spChg>
+      </pc:sldChg>
+    </pc:docChg>
+  </pc:docChgLst>
+  <pc:docChgLst>
     <pc:chgData name="Gerth Stølting Brodal" userId="04ef4784-6591-4f86-a140-f5c3b108582a" providerId="ADAL" clId="{E4089CCC-B90E-46C4-9B2A-F81B79956F50}"/>
     <pc:docChg chg="undo redo custSel addSld delSld modSld">
       <pc:chgData name="Gerth Stølting Brodal" userId="04ef4784-6591-4f86-a140-f5c3b108582a" providerId="ADAL" clId="{E4089CCC-B90E-46C4-9B2A-F81B79956F50}" dt="2023-11-15T17:55:11.226" v="1185" actId="1076"/>
@@ -364,38 +308,6 @@
           <pc:docMk/>
           <pc:sldMk cId="1764873955" sldId="780"/>
         </pc:sldMkLst>
-        <pc:spChg chg="add mod">
-          <ac:chgData name="Gerth Stølting Brodal" userId="04ef4784-6591-4f86-a140-f5c3b108582a" providerId="ADAL" clId="{E4089CCC-B90E-46C4-9B2A-F81B79956F50}" dt="2023-11-15T17:16:08.818" v="93" actId="1035"/>
-          <ac:spMkLst>
-            <pc:docMk/>
-            <pc:sldMk cId="1764873955" sldId="780"/>
-            <ac:spMk id="14" creationId="{978056D6-C424-74FA-BAE3-5493ACE8134B}"/>
-          </ac:spMkLst>
-        </pc:spChg>
-        <pc:spChg chg="add mod">
-          <ac:chgData name="Gerth Stølting Brodal" userId="04ef4784-6591-4f86-a140-f5c3b108582a" providerId="ADAL" clId="{E4089CCC-B90E-46C4-9B2A-F81B79956F50}" dt="2023-11-15T17:16:57.120" v="121" actId="20577"/>
-          <ac:spMkLst>
-            <pc:docMk/>
-            <pc:sldMk cId="1764873955" sldId="780"/>
-            <ac:spMk id="22" creationId="{73E98C91-FBF1-9B49-ED97-B99622E55B08}"/>
-          </ac:spMkLst>
-        </pc:spChg>
-        <pc:graphicFrameChg chg="mod">
-          <ac:chgData name="Gerth Stølting Brodal" userId="04ef4784-6591-4f86-a140-f5c3b108582a" providerId="ADAL" clId="{E4089CCC-B90E-46C4-9B2A-F81B79956F50}" dt="2023-11-15T17:16:08.818" v="93" actId="1035"/>
-          <ac:graphicFrameMkLst>
-            <pc:docMk/>
-            <pc:sldMk cId="1764873955" sldId="780"/>
-            <ac:graphicFrameMk id="4" creationId="{00000000-0000-0000-0000-000000000000}"/>
-          </ac:graphicFrameMkLst>
-        </pc:graphicFrameChg>
-        <pc:cxnChg chg="add mod">
-          <ac:chgData name="Gerth Stølting Brodal" userId="04ef4784-6591-4f86-a140-f5c3b108582a" providerId="ADAL" clId="{E4089CCC-B90E-46C4-9B2A-F81B79956F50}" dt="2023-11-15T17:16:08.818" v="93" actId="1035"/>
-          <ac:cxnSpMkLst>
-            <pc:docMk/>
-            <pc:sldMk cId="1764873955" sldId="780"/>
-            <ac:cxnSpMk id="18" creationId="{21FE5551-FE05-5632-52BB-F1C98A964A4D}"/>
-          </ac:cxnSpMkLst>
-        </pc:cxnChg>
       </pc:sldChg>
       <pc:sldChg chg="addSp delSp modSp new mod">
         <pc:chgData name="Gerth Stølting Brodal" userId="04ef4784-6591-4f86-a140-f5c3b108582a" providerId="ADAL" clId="{E4089CCC-B90E-46C4-9B2A-F81B79956F50}" dt="2023-11-15T17:55:11.226" v="1185" actId="1076"/>
@@ -403,70 +315,6 @@
           <pc:docMk/>
           <pc:sldMk cId="702637341" sldId="804"/>
         </pc:sldMkLst>
-        <pc:spChg chg="mod">
-          <ac:chgData name="Gerth Stølting Brodal" userId="04ef4784-6591-4f86-a140-f5c3b108582a" providerId="ADAL" clId="{E4089CCC-B90E-46C4-9B2A-F81B79956F50}" dt="2023-11-15T17:49:55.016" v="1066" actId="2711"/>
-          <ac:spMkLst>
-            <pc:docMk/>
-            <pc:sldMk cId="702637341" sldId="804"/>
-            <ac:spMk id="2" creationId="{A0B84023-3078-C4B5-5312-0AF582E51936}"/>
-          </ac:spMkLst>
-        </pc:spChg>
-        <pc:spChg chg="mod">
-          <ac:chgData name="Gerth Stølting Brodal" userId="04ef4784-6591-4f86-a140-f5c3b108582a" providerId="ADAL" clId="{E4089CCC-B90E-46C4-9B2A-F81B79956F50}" dt="2023-11-15T17:52:46.937" v="1169" actId="20577"/>
-          <ac:spMkLst>
-            <pc:docMk/>
-            <pc:sldMk cId="702637341" sldId="804"/>
-            <ac:spMk id="3" creationId="{CE40604B-5714-DD09-2AAD-A3CBA8DA447E}"/>
-          </ac:spMkLst>
-        </pc:spChg>
-        <pc:spChg chg="add del">
-          <ac:chgData name="Gerth Stølting Brodal" userId="04ef4784-6591-4f86-a140-f5c3b108582a" providerId="ADAL" clId="{E4089CCC-B90E-46C4-9B2A-F81B79956F50}" dt="2023-11-15T17:18:40.929" v="153" actId="22"/>
-          <ac:spMkLst>
-            <pc:docMk/>
-            <pc:sldMk cId="702637341" sldId="804"/>
-            <ac:spMk id="5" creationId="{E1D45184-34C5-B7E7-2B2A-B15F8CEADB91}"/>
-          </ac:spMkLst>
-        </pc:spChg>
-        <pc:spChg chg="add mod">
-          <ac:chgData name="Gerth Stølting Brodal" userId="04ef4784-6591-4f86-a140-f5c3b108582a" providerId="ADAL" clId="{E4089CCC-B90E-46C4-9B2A-F81B79956F50}" dt="2023-11-15T17:50:55.915" v="1129" actId="113"/>
-          <ac:spMkLst>
-            <pc:docMk/>
-            <pc:sldMk cId="702637341" sldId="804"/>
-            <ac:spMk id="10" creationId="{C1C5EE14-69FF-C096-E2FF-B209C461DA84}"/>
-          </ac:spMkLst>
-        </pc:spChg>
-        <pc:spChg chg="add mod">
-          <ac:chgData name="Gerth Stølting Brodal" userId="04ef4784-6591-4f86-a140-f5c3b108582a" providerId="ADAL" clId="{E4089CCC-B90E-46C4-9B2A-F81B79956F50}" dt="2023-11-15T17:55:11.226" v="1185" actId="1076"/>
-          <ac:spMkLst>
-            <pc:docMk/>
-            <pc:sldMk cId="702637341" sldId="804"/>
-            <ac:spMk id="12" creationId="{6D7AD44B-46D3-C5E3-6C5C-5E22B9C06C68}"/>
-          </ac:spMkLst>
-        </pc:spChg>
-        <pc:graphicFrameChg chg="add mod modGraphic">
-          <ac:chgData name="Gerth Stølting Brodal" userId="04ef4784-6591-4f86-a140-f5c3b108582a" providerId="ADAL" clId="{E4089CCC-B90E-46C4-9B2A-F81B79956F50}" dt="2023-11-15T17:51:26.348" v="1131" actId="14734"/>
-          <ac:graphicFrameMkLst>
-            <pc:docMk/>
-            <pc:sldMk cId="702637341" sldId="804"/>
-            <ac:graphicFrameMk id="6" creationId="{63D05D8F-E4CE-D2B7-50BA-3357697B4C3E}"/>
-          </ac:graphicFrameMkLst>
-        </pc:graphicFrameChg>
-        <pc:graphicFrameChg chg="add mod modGraphic">
-          <ac:chgData name="Gerth Stølting Brodal" userId="04ef4784-6591-4f86-a140-f5c3b108582a" providerId="ADAL" clId="{E4089CCC-B90E-46C4-9B2A-F81B79956F50}" dt="2023-11-15T17:48:48.580" v="1060" actId="1035"/>
-          <ac:graphicFrameMkLst>
-            <pc:docMk/>
-            <pc:sldMk cId="702637341" sldId="804"/>
-            <ac:graphicFrameMk id="7" creationId="{79649BBE-6858-C83D-689E-9BF61C41B799}"/>
-          </ac:graphicFrameMkLst>
-        </pc:graphicFrameChg>
-        <pc:cxnChg chg="add mod">
-          <ac:chgData name="Gerth Stølting Brodal" userId="04ef4784-6591-4f86-a140-f5c3b108582a" providerId="ADAL" clId="{E4089CCC-B90E-46C4-9B2A-F81B79956F50}" dt="2023-11-15T17:48:48.580" v="1060" actId="1035"/>
-          <ac:cxnSpMkLst>
-            <pc:docMk/>
-            <pc:sldMk cId="702637341" sldId="804"/>
-            <ac:cxnSpMk id="8" creationId="{394F8254-3B6B-9066-A3DF-07C5FD9B238B}"/>
-          </ac:cxnSpMkLst>
-        </pc:cxnChg>
       </pc:sldChg>
       <pc:sldChg chg="new del">
         <pc:chgData name="Gerth Stølting Brodal" userId="04ef4784-6591-4f86-a140-f5c3b108582a" providerId="ADAL" clId="{E4089CCC-B90E-46C4-9B2A-F81B79956F50}" dt="2023-11-15T17:18:11.069" v="124" actId="680"/>
@@ -497,22 +345,6 @@
           <pc:docMk/>
           <pc:sldMk cId="529165140" sldId="511"/>
         </pc:sldMkLst>
-        <pc:spChg chg="mod">
-          <ac:chgData name="Gerth Stølting Brodal" userId="04ef4784-6591-4f86-a140-f5c3b108582a" providerId="ADAL" clId="{D42492F9-9F0C-4C00-A413-C9ADD152F58A}" dt="2023-04-16T09:05:19.620" v="1770" actId="6549"/>
-          <ac:spMkLst>
-            <pc:docMk/>
-            <pc:sldMk cId="529165140" sldId="511"/>
-            <ac:spMk id="2" creationId="{00000000-0000-0000-0000-000000000000}"/>
-          </ac:spMkLst>
-        </pc:spChg>
-        <pc:spChg chg="mod">
-          <ac:chgData name="Gerth Stølting Brodal" userId="04ef4784-6591-4f86-a140-f5c3b108582a" providerId="ADAL" clId="{D42492F9-9F0C-4C00-A413-C9ADD152F58A}" dt="2023-04-16T09:07:21.022" v="1825" actId="14100"/>
-          <ac:spMkLst>
-            <pc:docMk/>
-            <pc:sldMk cId="529165140" sldId="511"/>
-            <ac:spMk id="3" creationId="{00000000-0000-0000-0000-000000000000}"/>
-          </ac:spMkLst>
-        </pc:spChg>
       </pc:sldChg>
       <pc:sldChg chg="addSp delSp modSp mod modAnim">
         <pc:chgData name="Gerth Stølting Brodal" userId="04ef4784-6591-4f86-a140-f5c3b108582a" providerId="ADAL" clId="{D42492F9-9F0C-4C00-A413-C9ADD152F58A}" dt="2023-04-16T08:21:42.044" v="1306" actId="1036"/>
@@ -520,70 +352,6 @@
           <pc:docMk/>
           <pc:sldMk cId="2832775796" sldId="783"/>
         </pc:sldMkLst>
-        <pc:spChg chg="add del">
-          <ac:chgData name="Gerth Stølting Brodal" userId="04ef4784-6591-4f86-a140-f5c3b108582a" providerId="ADAL" clId="{D42492F9-9F0C-4C00-A413-C9ADD152F58A}" dt="2023-04-16T08:18:38.224" v="1236" actId="22"/>
-          <ac:spMkLst>
-            <pc:docMk/>
-            <pc:sldMk cId="2832775796" sldId="783"/>
-            <ac:spMk id="7" creationId="{D72A7519-84B6-9033-84A8-26BFB1032721}"/>
-          </ac:spMkLst>
-        </pc:spChg>
-        <pc:spChg chg="mod">
-          <ac:chgData name="Gerth Stølting Brodal" userId="04ef4784-6591-4f86-a140-f5c3b108582a" providerId="ADAL" clId="{D42492F9-9F0C-4C00-A413-C9ADD152F58A}" dt="2023-04-16T08:18:22.128" v="1211" actId="1035"/>
-          <ac:spMkLst>
-            <pc:docMk/>
-            <pc:sldMk cId="2832775796" sldId="783"/>
-            <ac:spMk id="12" creationId="{00000000-0000-0000-0000-000000000000}"/>
-          </ac:spMkLst>
-        </pc:spChg>
-        <pc:spChg chg="mod">
-          <ac:chgData name="Gerth Stølting Brodal" userId="04ef4784-6591-4f86-a140-f5c3b108582a" providerId="ADAL" clId="{D42492F9-9F0C-4C00-A413-C9ADD152F58A}" dt="2023-04-16T08:21:42.044" v="1306" actId="1036"/>
-          <ac:spMkLst>
-            <pc:docMk/>
-            <pc:sldMk cId="2832775796" sldId="783"/>
-            <ac:spMk id="13" creationId="{AA4C9A04-140C-D580-AD21-8A49899858D6}"/>
-          </ac:spMkLst>
-        </pc:spChg>
-        <pc:grpChg chg="add mod">
-          <ac:chgData name="Gerth Stølting Brodal" userId="04ef4784-6591-4f86-a140-f5c3b108582a" providerId="ADAL" clId="{D42492F9-9F0C-4C00-A413-C9ADD152F58A}" dt="2023-04-16T08:18:46.376" v="1240" actId="1076"/>
-          <ac:grpSpMkLst>
-            <pc:docMk/>
-            <pc:sldMk cId="2832775796" sldId="783"/>
-            <ac:grpSpMk id="8" creationId="{E3053079-479A-85CC-6EEB-FBE23A979696}"/>
-          </ac:grpSpMkLst>
-        </pc:grpChg>
-        <pc:grpChg chg="mod">
-          <ac:chgData name="Gerth Stølting Brodal" userId="04ef4784-6591-4f86-a140-f5c3b108582a" providerId="ADAL" clId="{D42492F9-9F0C-4C00-A413-C9ADD152F58A}" dt="2023-04-16T08:18:22.128" v="1211" actId="1035"/>
-          <ac:grpSpMkLst>
-            <pc:docMk/>
-            <pc:sldMk cId="2832775796" sldId="783"/>
-            <ac:grpSpMk id="10" creationId="{00000000-0000-0000-0000-000000000000}"/>
-          </ac:grpSpMkLst>
-        </pc:grpChg>
-        <pc:graphicFrameChg chg="mod modGraphic">
-          <ac:chgData name="Gerth Stølting Brodal" userId="04ef4784-6591-4f86-a140-f5c3b108582a" providerId="ADAL" clId="{D42492F9-9F0C-4C00-A413-C9ADD152F58A}" dt="2023-04-16T08:20:41.462" v="1296" actId="207"/>
-          <ac:graphicFrameMkLst>
-            <pc:docMk/>
-            <pc:sldMk cId="2832775796" sldId="783"/>
-            <ac:graphicFrameMk id="4" creationId="{00000000-0000-0000-0000-000000000000}"/>
-          </ac:graphicFrameMkLst>
-        </pc:graphicFrameChg>
-        <pc:graphicFrameChg chg="mod">
-          <ac:chgData name="Gerth Stølting Brodal" userId="04ef4784-6591-4f86-a140-f5c3b108582a" providerId="ADAL" clId="{D42492F9-9F0C-4C00-A413-C9ADD152F58A}" dt="2023-04-16T08:18:22.128" v="1211" actId="1035"/>
-          <ac:graphicFrameMkLst>
-            <pc:docMk/>
-            <pc:sldMk cId="2832775796" sldId="783"/>
-            <ac:graphicFrameMk id="11" creationId="{00000000-0000-0000-0000-000000000000}"/>
-          </ac:graphicFrameMkLst>
-        </pc:graphicFrameChg>
-        <pc:cxnChg chg="mod">
-          <ac:chgData name="Gerth Stølting Brodal" userId="04ef4784-6591-4f86-a140-f5c3b108582a" providerId="ADAL" clId="{D42492F9-9F0C-4C00-A413-C9ADD152F58A}" dt="2023-04-16T08:20:57.038" v="1297" actId="1076"/>
-          <ac:cxnSpMkLst>
-            <pc:docMk/>
-            <pc:sldMk cId="2832775796" sldId="783"/>
-            <ac:cxnSpMk id="9" creationId="{32F0C4F0-2046-10AE-3F62-81662588B213}"/>
-          </ac:cxnSpMkLst>
-        </pc:cxnChg>
       </pc:sldChg>
       <pc:sldChg chg="modNotesTx">
         <pc:chgData name="Gerth Stølting Brodal" userId="04ef4784-6591-4f86-a140-f5c3b108582a" providerId="ADAL" clId="{D42492F9-9F0C-4C00-A413-C9ADD152F58A}" dt="2023-04-18T20:42:59.923" v="2100" actId="113"/>
@@ -598,14 +366,6 @@
           <pc:docMk/>
           <pc:sldMk cId="3474449255" sldId="790"/>
         </pc:sldMkLst>
-        <pc:graphicFrameChg chg="modGraphic">
-          <ac:chgData name="Gerth Stølting Brodal" userId="04ef4784-6591-4f86-a140-f5c3b108582a" providerId="ADAL" clId="{D42492F9-9F0C-4C00-A413-C9ADD152F58A}" dt="2023-04-16T08:45:47.838" v="1480" actId="6549"/>
-          <ac:graphicFrameMkLst>
-            <pc:docMk/>
-            <pc:sldMk cId="3474449255" sldId="790"/>
-            <ac:graphicFrameMk id="5" creationId="{00000000-0000-0000-0000-000000000000}"/>
-          </ac:graphicFrameMkLst>
-        </pc:graphicFrameChg>
       </pc:sldChg>
       <pc:sldChg chg="modNotesTx">
         <pc:chgData name="Gerth Stølting Brodal" userId="04ef4784-6591-4f86-a140-f5c3b108582a" providerId="ADAL" clId="{D42492F9-9F0C-4C00-A413-C9ADD152F58A}" dt="2023-04-18T20:49:16.562" v="2164" actId="5793"/>
@@ -620,14 +380,6 @@
           <pc:docMk/>
           <pc:sldMk cId="617726596" sldId="792"/>
         </pc:sldMkLst>
-        <pc:graphicFrameChg chg="modGraphic">
-          <ac:chgData name="Gerth Stølting Brodal" userId="04ef4784-6591-4f86-a140-f5c3b108582a" providerId="ADAL" clId="{D42492F9-9F0C-4C00-A413-C9ADD152F58A}" dt="2023-04-16T08:47:11.747" v="1483" actId="20577"/>
-          <ac:graphicFrameMkLst>
-            <pc:docMk/>
-            <pc:sldMk cId="617726596" sldId="792"/>
-            <ac:graphicFrameMk id="4" creationId="{00000000-0000-0000-0000-000000000000}"/>
-          </ac:graphicFrameMkLst>
-        </pc:graphicFrameChg>
       </pc:sldChg>
       <pc:sldChg chg="addSp delSp modSp mod modNotesTx">
         <pc:chgData name="Gerth Stølting Brodal" userId="04ef4784-6591-4f86-a140-f5c3b108582a" providerId="ADAL" clId="{D42492F9-9F0C-4C00-A413-C9ADD152F58A}" dt="2023-04-18T20:51:56.172" v="2249" actId="113"/>
@@ -635,22 +387,6 @@
           <pc:docMk/>
           <pc:sldMk cId="1121050547" sldId="793"/>
         </pc:sldMkLst>
-        <pc:graphicFrameChg chg="modGraphic">
-          <ac:chgData name="Gerth Stølting Brodal" userId="04ef4784-6591-4f86-a140-f5c3b108582a" providerId="ADAL" clId="{D42492F9-9F0C-4C00-A413-C9ADD152F58A}" dt="2023-04-16T08:48:48.689" v="1484" actId="207"/>
-          <ac:graphicFrameMkLst>
-            <pc:docMk/>
-            <pc:sldMk cId="1121050547" sldId="793"/>
-            <ac:graphicFrameMk id="4" creationId="{00000000-0000-0000-0000-000000000000}"/>
-          </ac:graphicFrameMkLst>
-        </pc:graphicFrameChg>
-        <pc:picChg chg="add del mod">
-          <ac:chgData name="Gerth Stølting Brodal" userId="04ef4784-6591-4f86-a140-f5c3b108582a" providerId="ADAL" clId="{D42492F9-9F0C-4C00-A413-C9ADD152F58A}" dt="2023-04-17T06:33:13.295" v="2033" actId="478"/>
-          <ac:picMkLst>
-            <pc:docMk/>
-            <pc:sldMk cId="1121050547" sldId="793"/>
-            <ac:picMk id="5" creationId="{FF7BE8F5-66DF-6C84-8431-60CB37B6E3F6}"/>
-          </ac:picMkLst>
-        </pc:picChg>
       </pc:sldChg>
       <pc:sldChg chg="addSp modSp mod">
         <pc:chgData name="Gerth Stølting Brodal" userId="04ef4784-6591-4f86-a140-f5c3b108582a" providerId="ADAL" clId="{D42492F9-9F0C-4C00-A413-C9ADD152F58A}" dt="2023-04-16T08:52:54.392" v="1611" actId="1036"/>
@@ -658,22 +394,6 @@
           <pc:docMk/>
           <pc:sldMk cId="3361084387" sldId="794"/>
         </pc:sldMkLst>
-        <pc:spChg chg="add mod">
-          <ac:chgData name="Gerth Stølting Brodal" userId="04ef4784-6591-4f86-a140-f5c3b108582a" providerId="ADAL" clId="{D42492F9-9F0C-4C00-A413-C9ADD152F58A}" dt="2023-04-16T08:52:54.392" v="1611" actId="1036"/>
-          <ac:spMkLst>
-            <pc:docMk/>
-            <pc:sldMk cId="3361084387" sldId="794"/>
-            <ac:spMk id="5" creationId="{936A2807-631B-0640-32B8-94472DC6366E}"/>
-          </ac:spMkLst>
-        </pc:spChg>
-        <pc:graphicFrameChg chg="mod">
-          <ac:chgData name="Gerth Stølting Brodal" userId="04ef4784-6591-4f86-a140-f5c3b108582a" providerId="ADAL" clId="{D42492F9-9F0C-4C00-A413-C9ADD152F58A}" dt="2023-04-16T08:52:44.294" v="1599" actId="1036"/>
-          <ac:graphicFrameMkLst>
-            <pc:docMk/>
-            <pc:sldMk cId="3361084387" sldId="794"/>
-            <ac:graphicFrameMk id="4" creationId="{00000000-0000-0000-0000-000000000000}"/>
-          </ac:graphicFrameMkLst>
-        </pc:graphicFrameChg>
       </pc:sldChg>
       <pc:sldChg chg="addSp modSp mod">
         <pc:chgData name="Gerth Stølting Brodal" userId="04ef4784-6591-4f86-a140-f5c3b108582a" providerId="ADAL" clId="{D42492F9-9F0C-4C00-A413-C9ADD152F58A}" dt="2023-04-16T08:56:15.139" v="1762"/>
@@ -681,14 +401,6 @@
           <pc:docMk/>
           <pc:sldMk cId="2125248726" sldId="795"/>
         </pc:sldMkLst>
-        <pc:spChg chg="add mod">
-          <ac:chgData name="Gerth Stølting Brodal" userId="04ef4784-6591-4f86-a140-f5c3b108582a" providerId="ADAL" clId="{D42492F9-9F0C-4C00-A413-C9ADD152F58A}" dt="2023-04-16T08:56:15.139" v="1762"/>
-          <ac:spMkLst>
-            <pc:docMk/>
-            <pc:sldMk cId="2125248726" sldId="795"/>
-            <ac:spMk id="3" creationId="{92CCF01C-3B77-FB18-E6F3-EEC7E36E1A83}"/>
-          </ac:spMkLst>
-        </pc:spChg>
       </pc:sldChg>
       <pc:sldChg chg="addSp modSp mod modNotesTx">
         <pc:chgData name="Gerth Stølting Brodal" userId="04ef4784-6591-4f86-a140-f5c3b108582a" providerId="ADAL" clId="{D42492F9-9F0C-4C00-A413-C9ADD152F58A}" dt="2023-04-19T11:43:36.229" v="2485" actId="20577"/>
@@ -696,30 +408,6 @@
           <pc:docMk/>
           <pc:sldMk cId="3752852980" sldId="798"/>
         </pc:sldMkLst>
-        <pc:spChg chg="add mod">
-          <ac:chgData name="Gerth Stølting Brodal" userId="04ef4784-6591-4f86-a140-f5c3b108582a" providerId="ADAL" clId="{D42492F9-9F0C-4C00-A413-C9ADD152F58A}" dt="2023-04-16T09:15:37.795" v="2012" actId="20577"/>
-          <ac:spMkLst>
-            <pc:docMk/>
-            <pc:sldMk cId="3752852980" sldId="798"/>
-            <ac:spMk id="6" creationId="{906FD70E-611B-C398-9DA3-D666A942E3AB}"/>
-          </ac:spMkLst>
-        </pc:spChg>
-        <pc:graphicFrameChg chg="mod modGraphic">
-          <ac:chgData name="Gerth Stølting Brodal" userId="04ef4784-6591-4f86-a140-f5c3b108582a" providerId="ADAL" clId="{D42492F9-9F0C-4C00-A413-C9ADD152F58A}" dt="2023-04-19T11:42:18.698" v="2481" actId="20577"/>
-          <ac:graphicFrameMkLst>
-            <pc:docMk/>
-            <pc:sldMk cId="3752852980" sldId="798"/>
-            <ac:graphicFrameMk id="4" creationId="{00000000-0000-0000-0000-000000000000}"/>
-          </ac:graphicFrameMkLst>
-        </pc:graphicFrameChg>
-        <pc:picChg chg="add mod">
-          <ac:chgData name="Gerth Stølting Brodal" userId="04ef4784-6591-4f86-a140-f5c3b108582a" providerId="ADAL" clId="{D42492F9-9F0C-4C00-A413-C9ADD152F58A}" dt="2023-04-16T09:15:34.681" v="2011" actId="1076"/>
-          <ac:picMkLst>
-            <pc:docMk/>
-            <pc:sldMk cId="3752852980" sldId="798"/>
-            <ac:picMk id="5" creationId="{1D382B19-9670-0A5B-34D4-4E12ED8911DC}"/>
-          </ac:picMkLst>
-        </pc:picChg>
       </pc:sldChg>
       <pc:sldChg chg="modSp mod">
         <pc:chgData name="Gerth Stølting Brodal" userId="04ef4784-6591-4f86-a140-f5c3b108582a" providerId="ADAL" clId="{D42492F9-9F0C-4C00-A413-C9ADD152F58A}" dt="2023-04-16T09:19:42.129" v="2024" actId="1076"/>
@@ -727,22 +415,6 @@
           <pc:docMk/>
           <pc:sldMk cId="2357954353" sldId="799"/>
         </pc:sldMkLst>
-        <pc:graphicFrameChg chg="mod">
-          <ac:chgData name="Gerth Stølting Brodal" userId="04ef4784-6591-4f86-a140-f5c3b108582a" providerId="ADAL" clId="{D42492F9-9F0C-4C00-A413-C9ADD152F58A}" dt="2023-04-16T09:19:42.129" v="2024" actId="1076"/>
-          <ac:graphicFrameMkLst>
-            <pc:docMk/>
-            <pc:sldMk cId="2357954353" sldId="799"/>
-            <ac:graphicFrameMk id="4" creationId="{00000000-0000-0000-0000-000000000000}"/>
-          </ac:graphicFrameMkLst>
-        </pc:graphicFrameChg>
-        <pc:graphicFrameChg chg="mod">
-          <ac:chgData name="Gerth Stølting Brodal" userId="04ef4784-6591-4f86-a140-f5c3b108582a" providerId="ADAL" clId="{D42492F9-9F0C-4C00-A413-C9ADD152F58A}" dt="2023-04-16T09:19:19.133" v="2023" actId="1076"/>
-          <ac:graphicFrameMkLst>
-            <pc:docMk/>
-            <pc:sldMk cId="2357954353" sldId="799"/>
-            <ac:graphicFrameMk id="8" creationId="{00000000-0000-0000-0000-000000000000}"/>
-          </ac:graphicFrameMkLst>
-        </pc:graphicFrameChg>
       </pc:sldChg>
       <pc:sldChg chg="modSp mod">
         <pc:chgData name="Gerth Stølting Brodal" userId="04ef4784-6591-4f86-a140-f5c3b108582a" providerId="ADAL" clId="{D42492F9-9F0C-4C00-A413-C9ADD152F58A}" dt="2023-04-16T08:01:36.308" v="1031" actId="20577"/>
@@ -750,14 +422,6 @@
           <pc:docMk/>
           <pc:sldMk cId="4262509072" sldId="800"/>
         </pc:sldMkLst>
-        <pc:spChg chg="mod">
-          <ac:chgData name="Gerth Stølting Brodal" userId="04ef4784-6591-4f86-a140-f5c3b108582a" providerId="ADAL" clId="{D42492F9-9F0C-4C00-A413-C9ADD152F58A}" dt="2023-04-16T08:01:36.308" v="1031" actId="20577"/>
-          <ac:spMkLst>
-            <pc:docMk/>
-            <pc:sldMk cId="4262509072" sldId="800"/>
-            <ac:spMk id="15" creationId="{00000000-0000-0000-0000-000000000000}"/>
-          </ac:spMkLst>
-        </pc:spChg>
       </pc:sldChg>
       <pc:sldChg chg="addSp delSp modSp new mod modNotesTx">
         <pc:chgData name="Gerth Stølting Brodal" userId="04ef4784-6591-4f86-a140-f5c3b108582a" providerId="ADAL" clId="{D42492F9-9F0C-4C00-A413-C9ADD152F58A}" dt="2023-04-27T16:21:25.184" v="2738" actId="6549"/>
@@ -765,118 +429,6 @@
           <pc:docMk/>
           <pc:sldMk cId="3533997958" sldId="802"/>
         </pc:sldMkLst>
-        <pc:spChg chg="mod">
-          <ac:chgData name="Gerth Stølting Brodal" userId="04ef4784-6591-4f86-a140-f5c3b108582a" providerId="ADAL" clId="{D42492F9-9F0C-4C00-A413-C9ADD152F58A}" dt="2023-04-10T11:53:46.171" v="738" actId="14100"/>
-          <ac:spMkLst>
-            <pc:docMk/>
-            <pc:sldMk cId="3533997958" sldId="802"/>
-            <ac:spMk id="2" creationId="{B820491B-72BA-CDFD-9002-D0AAE9D0F05F}"/>
-          </ac:spMkLst>
-        </pc:spChg>
-        <pc:spChg chg="mod">
-          <ac:chgData name="Gerth Stølting Brodal" userId="04ef4784-6591-4f86-a140-f5c3b108582a" providerId="ADAL" clId="{D42492F9-9F0C-4C00-A413-C9ADD152F58A}" dt="2023-04-10T12:31:14.326" v="878" actId="1037"/>
-          <ac:spMkLst>
-            <pc:docMk/>
-            <pc:sldMk cId="3533997958" sldId="802"/>
-            <ac:spMk id="3" creationId="{2091BD0F-6025-7088-2C6D-F3D110B0CEC2}"/>
-          </ac:spMkLst>
-        </pc:spChg>
-        <pc:spChg chg="add del">
-          <ac:chgData name="Gerth Stølting Brodal" userId="04ef4784-6591-4f86-a140-f5c3b108582a" providerId="ADAL" clId="{D42492F9-9F0C-4C00-A413-C9ADD152F58A}" dt="2023-04-10T10:48:11.056" v="2" actId="22"/>
-          <ac:spMkLst>
-            <pc:docMk/>
-            <pc:sldMk cId="3533997958" sldId="802"/>
-            <ac:spMk id="5" creationId="{CF03EB03-EDCB-CE2C-AAED-A9A6E895ADF9}"/>
-          </ac:spMkLst>
-        </pc:spChg>
-        <pc:spChg chg="add mod">
-          <ac:chgData name="Gerth Stølting Brodal" userId="04ef4784-6591-4f86-a140-f5c3b108582a" providerId="ADAL" clId="{D42492F9-9F0C-4C00-A413-C9ADD152F58A}" dt="2023-04-10T12:26:20.173" v="869" actId="14100"/>
-          <ac:spMkLst>
-            <pc:docMk/>
-            <pc:sldMk cId="3533997958" sldId="802"/>
-            <ac:spMk id="8" creationId="{BF9B9ECB-D779-D139-ACE1-1DF1A3FDFE00}"/>
-          </ac:spMkLst>
-        </pc:spChg>
-        <pc:spChg chg="mod ord topLvl">
-          <ac:chgData name="Gerth Stølting Brodal" userId="04ef4784-6591-4f86-a140-f5c3b108582a" providerId="ADAL" clId="{D42492F9-9F0C-4C00-A413-C9ADD152F58A}" dt="2023-04-10T12:33:25.834" v="887" actId="166"/>
-          <ac:spMkLst>
-            <pc:docMk/>
-            <pc:sldMk cId="3533997958" sldId="802"/>
-            <ac:spMk id="13" creationId="{DB01946D-D27F-6A7A-0D52-01295BA1DABD}"/>
-          </ac:spMkLst>
-        </pc:spChg>
-        <pc:spChg chg="add mod">
-          <ac:chgData name="Gerth Stølting Brodal" userId="04ef4784-6591-4f86-a140-f5c3b108582a" providerId="ADAL" clId="{D42492F9-9F0C-4C00-A413-C9ADD152F58A}" dt="2023-04-10T12:20:15.572" v="867" actId="14100"/>
-          <ac:spMkLst>
-            <pc:docMk/>
-            <pc:sldMk cId="3533997958" sldId="802"/>
-            <ac:spMk id="26" creationId="{F9AEF6FF-9E68-4748-909B-AF3227784463}"/>
-          </ac:spMkLst>
-        </pc:spChg>
-        <pc:spChg chg="add mod topLvl">
-          <ac:chgData name="Gerth Stølting Brodal" userId="04ef4784-6591-4f86-a140-f5c3b108582a" providerId="ADAL" clId="{D42492F9-9F0C-4C00-A413-C9ADD152F58A}" dt="2023-04-10T12:33:48.301" v="892" actId="1036"/>
-          <ac:spMkLst>
-            <pc:docMk/>
-            <pc:sldMk cId="3533997958" sldId="802"/>
-            <ac:spMk id="27" creationId="{C9C7C5A9-27F4-C293-4C4D-D4A7879C7476}"/>
-          </ac:spMkLst>
-        </pc:spChg>
-        <pc:grpChg chg="add del mod">
-          <ac:chgData name="Gerth Stølting Brodal" userId="04ef4784-6591-4f86-a140-f5c3b108582a" providerId="ADAL" clId="{D42492F9-9F0C-4C00-A413-C9ADD152F58A}" dt="2023-04-10T12:32:28.587" v="880" actId="165"/>
-          <ac:grpSpMkLst>
-            <pc:docMk/>
-            <pc:sldMk cId="3533997958" sldId="802"/>
-            <ac:grpSpMk id="9" creationId="{8CC19ECE-841A-E22B-D7F9-0B31AB5E5B27}"/>
-          </ac:grpSpMkLst>
-        </pc:grpChg>
-        <pc:grpChg chg="add del mod ord">
-          <ac:chgData name="Gerth Stølting Brodal" userId="04ef4784-6591-4f86-a140-f5c3b108582a" providerId="ADAL" clId="{D42492F9-9F0C-4C00-A413-C9ADD152F58A}" dt="2023-04-10T12:33:11.068" v="885" actId="165"/>
-          <ac:grpSpMkLst>
-            <pc:docMk/>
-            <pc:sldMk cId="3533997958" sldId="802"/>
-            <ac:grpSpMk id="28" creationId="{D4D146D2-6D2A-28AF-AF28-B115E5EE27C3}"/>
-          </ac:grpSpMkLst>
-        </pc:grpChg>
-        <pc:graphicFrameChg chg="add mod modGraphic">
-          <ac:chgData name="Gerth Stølting Brodal" userId="04ef4784-6591-4f86-a140-f5c3b108582a" providerId="ADAL" clId="{D42492F9-9F0C-4C00-A413-C9ADD152F58A}" dt="2023-04-16T08:37:48.215" v="1311" actId="207"/>
-          <ac:graphicFrameMkLst>
-            <pc:docMk/>
-            <pc:sldMk cId="3533997958" sldId="802"/>
-            <ac:graphicFrameMk id="6" creationId="{742EE9F5-C111-723C-E4E0-65611ABA84FF}"/>
-          </ac:graphicFrameMkLst>
-        </pc:graphicFrameChg>
-        <pc:cxnChg chg="mod topLvl">
-          <ac:chgData name="Gerth Stølting Brodal" userId="04ef4784-6591-4f86-a140-f5c3b108582a" providerId="ADAL" clId="{D42492F9-9F0C-4C00-A413-C9ADD152F58A}" dt="2023-04-10T12:33:11.068" v="885" actId="165"/>
-          <ac:cxnSpMkLst>
-            <pc:docMk/>
-            <pc:sldMk cId="3533997958" sldId="802"/>
-            <ac:cxnSpMk id="10" creationId="{DA53FA89-5FD7-23F9-743B-DD5245CA8AF7}"/>
-          </ac:cxnSpMkLst>
-        </pc:cxnChg>
-        <pc:cxnChg chg="del mod">
-          <ac:chgData name="Gerth Stølting Brodal" userId="04ef4784-6591-4f86-a140-f5c3b108582a" providerId="ADAL" clId="{D42492F9-9F0C-4C00-A413-C9ADD152F58A}" dt="2023-04-10T11:23:29.179" v="397" actId="478"/>
-          <ac:cxnSpMkLst>
-            <pc:docMk/>
-            <pc:sldMk cId="3533997958" sldId="802"/>
-            <ac:cxnSpMk id="11" creationId="{0968848B-C317-3148-B2F4-EE1B71423DE5}"/>
-          </ac:cxnSpMkLst>
-        </pc:cxnChg>
-        <pc:cxnChg chg="mod ord topLvl">
-          <ac:chgData name="Gerth Stølting Brodal" userId="04ef4784-6591-4f86-a140-f5c3b108582a" providerId="ADAL" clId="{D42492F9-9F0C-4C00-A413-C9ADD152F58A}" dt="2023-04-10T12:40:43.306" v="898" actId="1035"/>
-          <ac:cxnSpMkLst>
-            <pc:docMk/>
-            <pc:sldMk cId="3533997958" sldId="802"/>
-            <ac:cxnSpMk id="12" creationId="{D6315816-4F4B-81B0-B96B-5BEBDDF202AD}"/>
-          </ac:cxnSpMkLst>
-        </pc:cxnChg>
-        <pc:cxnChg chg="del mod">
-          <ac:chgData name="Gerth Stølting Brodal" userId="04ef4784-6591-4f86-a140-f5c3b108582a" providerId="ADAL" clId="{D42492F9-9F0C-4C00-A413-C9ADD152F58A}" dt="2023-04-10T11:23:26.851" v="396" actId="478"/>
-          <ac:cxnSpMkLst>
-            <pc:docMk/>
-            <pc:sldMk cId="3533997958" sldId="802"/>
-            <ac:cxnSpMk id="14" creationId="{D17EC6EB-9B0E-6DE5-618C-694B8F0C6E33}"/>
-          </ac:cxnSpMkLst>
-        </pc:cxnChg>
       </pc:sldChg>
       <pc:sldChg chg="addSp delSp modSp add mod delAnim">
         <pc:chgData name="Gerth Stølting Brodal" userId="04ef4784-6591-4f86-a140-f5c3b108582a" providerId="ADAL" clId="{D42492F9-9F0C-4C00-A413-C9ADD152F58A}" dt="2023-04-16T08:16:55.745" v="1193" actId="14734"/>
@@ -884,54 +436,6 @@
           <pc:docMk/>
           <pc:sldMk cId="313089034" sldId="803"/>
         </pc:sldMkLst>
-        <pc:spChg chg="mod">
-          <ac:chgData name="Gerth Stølting Brodal" userId="04ef4784-6591-4f86-a140-f5c3b108582a" providerId="ADAL" clId="{D42492F9-9F0C-4C00-A413-C9ADD152F58A}" dt="2023-04-16T08:05:31.323" v="1035" actId="20577"/>
-          <ac:spMkLst>
-            <pc:docMk/>
-            <pc:sldMk cId="313089034" sldId="803"/>
-            <ac:spMk id="2" creationId="{00000000-0000-0000-0000-000000000000}"/>
-          </ac:spMkLst>
-        </pc:spChg>
-        <pc:spChg chg="del">
-          <ac:chgData name="Gerth Stølting Brodal" userId="04ef4784-6591-4f86-a140-f5c3b108582a" providerId="ADAL" clId="{D42492F9-9F0C-4C00-A413-C9ADD152F58A}" dt="2023-04-16T08:05:34.139" v="1036" actId="478"/>
-          <ac:spMkLst>
-            <pc:docMk/>
-            <pc:sldMk cId="313089034" sldId="803"/>
-            <ac:spMk id="12" creationId="{00000000-0000-0000-0000-000000000000}"/>
-          </ac:spMkLst>
-        </pc:spChg>
-        <pc:grpChg chg="del">
-          <ac:chgData name="Gerth Stølting Brodal" userId="04ef4784-6591-4f86-a140-f5c3b108582a" providerId="ADAL" clId="{D42492F9-9F0C-4C00-A413-C9ADD152F58A}" dt="2023-04-16T08:10:00.831" v="1097" actId="478"/>
-          <ac:grpSpMkLst>
-            <pc:docMk/>
-            <pc:sldMk cId="313089034" sldId="803"/>
-            <ac:grpSpMk id="10" creationId="{00000000-0000-0000-0000-000000000000}"/>
-          </ac:grpSpMkLst>
-        </pc:grpChg>
-        <pc:graphicFrameChg chg="add mod">
-          <ac:chgData name="Gerth Stølting Brodal" userId="04ef4784-6591-4f86-a140-f5c3b108582a" providerId="ADAL" clId="{D42492F9-9F0C-4C00-A413-C9ADD152F58A}" dt="2023-04-16T08:13:50.647" v="1128"/>
-          <ac:graphicFrameMkLst>
-            <pc:docMk/>
-            <pc:sldMk cId="313089034" sldId="803"/>
-            <ac:graphicFrameMk id="3" creationId="{F23874A3-2D7E-2C00-3A95-4FDB95ED50AD}"/>
-          </ac:graphicFrameMkLst>
-        </pc:graphicFrameChg>
-        <pc:graphicFrameChg chg="mod modGraphic">
-          <ac:chgData name="Gerth Stølting Brodal" userId="04ef4784-6591-4f86-a140-f5c3b108582a" providerId="ADAL" clId="{D42492F9-9F0C-4C00-A413-C9ADD152F58A}" dt="2023-04-16T08:16:55.745" v="1193" actId="14734"/>
-          <ac:graphicFrameMkLst>
-            <pc:docMk/>
-            <pc:sldMk cId="313089034" sldId="803"/>
-            <ac:graphicFrameMk id="4" creationId="{00000000-0000-0000-0000-000000000000}"/>
-          </ac:graphicFrameMkLst>
-        </pc:graphicFrameChg>
-        <pc:graphicFrameChg chg="del">
-          <ac:chgData name="Gerth Stølting Brodal" userId="04ef4784-6591-4f86-a140-f5c3b108582a" providerId="ADAL" clId="{D42492F9-9F0C-4C00-A413-C9ADD152F58A}" dt="2023-04-16T08:05:34.139" v="1036" actId="478"/>
-          <ac:graphicFrameMkLst>
-            <pc:docMk/>
-            <pc:sldMk cId="313089034" sldId="803"/>
-            <ac:graphicFrameMk id="11" creationId="{00000000-0000-0000-0000-000000000000}"/>
-          </ac:graphicFrameMkLst>
-        </pc:graphicFrameChg>
       </pc:sldChg>
       <pc:sldChg chg="addSp delSp modSp new del mod">
         <pc:chgData name="Gerth Stølting Brodal" userId="04ef4784-6591-4f86-a140-f5c3b108582a" providerId="ADAL" clId="{D42492F9-9F0C-4C00-A413-C9ADD152F58A}" dt="2023-04-16T08:54:09.791" v="1616" actId="47"/>
@@ -939,22 +443,6 @@
           <pc:docMk/>
           <pc:sldMk cId="3977241350" sldId="804"/>
         </pc:sldMkLst>
-        <pc:spChg chg="del mod">
-          <ac:chgData name="Gerth Stølting Brodal" userId="04ef4784-6591-4f86-a140-f5c3b108582a" providerId="ADAL" clId="{D42492F9-9F0C-4C00-A413-C9ADD152F58A}" dt="2023-04-16T08:54:06.629" v="1614" actId="21"/>
-          <ac:spMkLst>
-            <pc:docMk/>
-            <pc:sldMk cId="3977241350" sldId="804"/>
-            <ac:spMk id="3" creationId="{573BF443-4064-D859-66B3-EFBCF2505671}"/>
-          </ac:spMkLst>
-        </pc:spChg>
-        <pc:spChg chg="add mod">
-          <ac:chgData name="Gerth Stølting Brodal" userId="04ef4784-6591-4f86-a140-f5c3b108582a" providerId="ADAL" clId="{D42492F9-9F0C-4C00-A413-C9ADD152F58A}" dt="2023-04-16T08:54:06.629" v="1614" actId="21"/>
-          <ac:spMkLst>
-            <pc:docMk/>
-            <pc:sldMk cId="3977241350" sldId="804"/>
-            <ac:spMk id="5" creationId="{B8373685-09B8-A8BC-3CDF-269DEB50D7C6}"/>
-          </ac:spMkLst>
-        </pc:spChg>
       </pc:sldChg>
     </pc:docChg>
   </pc:docChgLst>
@@ -1059,7 +547,7 @@
           <a:p>
             <a:fld id="{FB1A172F-81D4-4DC4-9113-1DBD56EC3646}" type="datetimeFigureOut">
               <a:rPr lang="en-US" smtClean="0"/>
-              <a:t>4/25/2024</a:t>
+              <a:t>4/2/2025</a:t>
             </a:fld>
             <a:endParaRPr lang="en-US"/>
           </a:p>
@@ -3544,7 +3032,7 @@
           <a:p>
             <a:fld id="{0560A9CD-0304-4E0B-9E82-E7E0115DE05B}" type="datetimeFigureOut">
               <a:rPr lang="en-US" smtClean="0"/>
-              <a:t>4/25/2024</a:t>
+              <a:t>4/2/2025</a:t>
             </a:fld>
             <a:endParaRPr lang="en-US"/>
           </a:p>
@@ -3712,7 +3200,7 @@
           <a:p>
             <a:fld id="{0560A9CD-0304-4E0B-9E82-E7E0115DE05B}" type="datetimeFigureOut">
               <a:rPr lang="en-US" smtClean="0"/>
-              <a:t>4/25/2024</a:t>
+              <a:t>4/2/2025</a:t>
             </a:fld>
             <a:endParaRPr lang="en-US"/>
           </a:p>
@@ -3890,7 +3378,7 @@
           <a:p>
             <a:fld id="{0560A9CD-0304-4E0B-9E82-E7E0115DE05B}" type="datetimeFigureOut">
               <a:rPr lang="en-US" smtClean="0"/>
-              <a:t>4/25/2024</a:t>
+              <a:t>4/2/2025</a:t>
             </a:fld>
             <a:endParaRPr lang="en-US"/>
           </a:p>
@@ -4073,7 +3561,7 @@
           <a:p>
             <a:fld id="{0560A9CD-0304-4E0B-9E82-E7E0115DE05B}" type="datetimeFigureOut">
               <a:rPr lang="en-US" smtClean="0"/>
-              <a:t>4/25/2024</a:t>
+              <a:t>4/2/2025</a:t>
             </a:fld>
             <a:endParaRPr lang="en-US"/>
           </a:p>
@@ -4318,7 +3806,7 @@
           <a:p>
             <a:fld id="{0560A9CD-0304-4E0B-9E82-E7E0115DE05B}" type="datetimeFigureOut">
               <a:rPr lang="en-US" smtClean="0"/>
-              <a:t>4/25/2024</a:t>
+              <a:t>4/2/2025</a:t>
             </a:fld>
             <a:endParaRPr lang="en-US"/>
           </a:p>
@@ -4547,7 +4035,7 @@
           <a:p>
             <a:fld id="{0560A9CD-0304-4E0B-9E82-E7E0115DE05B}" type="datetimeFigureOut">
               <a:rPr lang="en-US" smtClean="0"/>
-              <a:t>4/25/2024</a:t>
+              <a:t>4/2/2025</a:t>
             </a:fld>
             <a:endParaRPr lang="en-US"/>
           </a:p>
@@ -4911,7 +4399,7 @@
           <a:p>
             <a:fld id="{0560A9CD-0304-4E0B-9E82-E7E0115DE05B}" type="datetimeFigureOut">
               <a:rPr lang="en-US" smtClean="0"/>
-              <a:t>4/25/2024</a:t>
+              <a:t>4/2/2025</a:t>
             </a:fld>
             <a:endParaRPr lang="en-US"/>
           </a:p>
@@ -5028,7 +4516,7 @@
           <a:p>
             <a:fld id="{0560A9CD-0304-4E0B-9E82-E7E0115DE05B}" type="datetimeFigureOut">
               <a:rPr lang="en-US" smtClean="0"/>
-              <a:t>4/25/2024</a:t>
+              <a:t>4/2/2025</a:t>
             </a:fld>
             <a:endParaRPr lang="en-US"/>
           </a:p>
@@ -5123,7 +4611,7 @@
           <a:p>
             <a:fld id="{0560A9CD-0304-4E0B-9E82-E7E0115DE05B}" type="datetimeFigureOut">
               <a:rPr lang="en-US" smtClean="0"/>
-              <a:t>4/25/2024</a:t>
+              <a:t>4/2/2025</a:t>
             </a:fld>
             <a:endParaRPr lang="en-US"/>
           </a:p>
@@ -5398,7 +4886,7 @@
           <a:p>
             <a:fld id="{0560A9CD-0304-4E0B-9E82-E7E0115DE05B}" type="datetimeFigureOut">
               <a:rPr lang="en-US" smtClean="0"/>
-              <a:t>4/25/2024</a:t>
+              <a:t>4/2/2025</a:t>
             </a:fld>
             <a:endParaRPr lang="en-US"/>
           </a:p>
@@ -5650,7 +5138,7 @@
           <a:p>
             <a:fld id="{0560A9CD-0304-4E0B-9E82-E7E0115DE05B}" type="datetimeFigureOut">
               <a:rPr lang="en-US" smtClean="0"/>
-              <a:t>4/25/2024</a:t>
+              <a:t>4/2/2025</a:t>
             </a:fld>
             <a:endParaRPr lang="en-US"/>
           </a:p>
@@ -5861,7 +5349,7 @@
           <a:p>
             <a:fld id="{0560A9CD-0304-4E0B-9E82-E7E0115DE05B}" type="datetimeFigureOut">
               <a:rPr lang="en-US" smtClean="0"/>
-              <a:t>4/25/2024</a:t>
+              <a:t>4/2/2025</a:t>
             </a:fld>
             <a:endParaRPr lang="en-US"/>
           </a:p>
@@ -36313,7 +35801,7 @@
               <a:t>Calling </a:t>
             </a:r>
             <a:r>
-              <a:rPr lang="en-US" sz="2400" dirty="0" err="1">
+              <a:rPr lang="en-US" sz="2400" dirty="0">
                 <a:latin typeface="Courier"/>
               </a:rPr>
               <a:t>iter</a:t>

</xml_diff>

<commit_message>
all-slides.pdf code.zip generator.pdf generator.pptx modules.pdf modules.pptx
</commit_message>
<xml_diff>
--- a/ipsa/slides/generator.pptx
+++ b/ipsa/slides/generator.pptx
@@ -273,8 +273,8 @@
   </pc:docChgLst>
   <pc:docChgLst>
     <pc:chgData name="Gerth Stølting Brodal" userId="04ef4784-6591-4f86-a140-f5c3b108582a" providerId="ADAL" clId="{D8F300CF-040E-4FF6-8B35-86A8355B1F6F}"/>
-    <pc:docChg chg="modSld">
-      <pc:chgData name="Gerth Stølting Brodal" userId="04ef4784-6591-4f86-a140-f5c3b108582a" providerId="ADAL" clId="{D8F300CF-040E-4FF6-8B35-86A8355B1F6F}" dt="2025-04-02T06:36:45.577" v="0" actId="20577"/>
+    <pc:docChg chg="undo custSel modSld">
+      <pc:chgData name="Gerth Stølting Brodal" userId="04ef4784-6591-4f86-a140-f5c3b108582a" providerId="ADAL" clId="{D8F300CF-040E-4FF6-8B35-86A8355B1F6F}" dt="2025-04-06T21:01:57.762" v="4" actId="14100"/>
       <pc:docMkLst>
         <pc:docMk/>
       </pc:docMkLst>
@@ -292,6 +292,21 @@
             <ac:spMk id="12" creationId="{00000000-0000-0000-0000-000000000000}"/>
           </ac:spMkLst>
         </pc:spChg>
+      </pc:sldChg>
+      <pc:sldChg chg="modSp mod">
+        <pc:chgData name="Gerth Stølting Brodal" userId="04ef4784-6591-4f86-a140-f5c3b108582a" providerId="ADAL" clId="{D8F300CF-040E-4FF6-8B35-86A8355B1F6F}" dt="2025-04-06T21:01:57.762" v="4" actId="14100"/>
+        <pc:sldMkLst>
+          <pc:docMk/>
+          <pc:sldMk cId="2357954353" sldId="799"/>
+        </pc:sldMkLst>
+        <pc:picChg chg="mod">
+          <ac:chgData name="Gerth Stølting Brodal" userId="04ef4784-6591-4f86-a140-f5c3b108582a" providerId="ADAL" clId="{D8F300CF-040E-4FF6-8B35-86A8355B1F6F}" dt="2025-04-06T21:01:57.762" v="4" actId="14100"/>
+          <ac:picMkLst>
+            <pc:docMk/>
+            <pc:sldMk cId="2357954353" sldId="799"/>
+            <ac:picMk id="7" creationId="{00000000-0000-0000-0000-000000000000}"/>
+          </ac:picMkLst>
+        </pc:picChg>
       </pc:sldChg>
     </pc:docChg>
   </pc:docChgLst>
@@ -547,7 +562,7 @@
           <a:p>
             <a:fld id="{FB1A172F-81D4-4DC4-9113-1DBD56EC3646}" type="datetimeFigureOut">
               <a:rPr lang="en-US" smtClean="0"/>
-              <a:t>4/2/2025</a:t>
+              <a:t>4/6/2025</a:t>
             </a:fld>
             <a:endParaRPr lang="en-US"/>
           </a:p>
@@ -3032,7 +3047,7 @@
           <a:p>
             <a:fld id="{0560A9CD-0304-4E0B-9E82-E7E0115DE05B}" type="datetimeFigureOut">
               <a:rPr lang="en-US" smtClean="0"/>
-              <a:t>4/2/2025</a:t>
+              <a:t>4/6/2025</a:t>
             </a:fld>
             <a:endParaRPr lang="en-US"/>
           </a:p>
@@ -3200,7 +3215,7 @@
           <a:p>
             <a:fld id="{0560A9CD-0304-4E0B-9E82-E7E0115DE05B}" type="datetimeFigureOut">
               <a:rPr lang="en-US" smtClean="0"/>
-              <a:t>4/2/2025</a:t>
+              <a:t>4/6/2025</a:t>
             </a:fld>
             <a:endParaRPr lang="en-US"/>
           </a:p>
@@ -3378,7 +3393,7 @@
           <a:p>
             <a:fld id="{0560A9CD-0304-4E0B-9E82-E7E0115DE05B}" type="datetimeFigureOut">
               <a:rPr lang="en-US" smtClean="0"/>
-              <a:t>4/2/2025</a:t>
+              <a:t>4/6/2025</a:t>
             </a:fld>
             <a:endParaRPr lang="en-US"/>
           </a:p>
@@ -3561,7 +3576,7 @@
           <a:p>
             <a:fld id="{0560A9CD-0304-4E0B-9E82-E7E0115DE05B}" type="datetimeFigureOut">
               <a:rPr lang="en-US" smtClean="0"/>
-              <a:t>4/2/2025</a:t>
+              <a:t>4/6/2025</a:t>
             </a:fld>
             <a:endParaRPr lang="en-US"/>
           </a:p>
@@ -3806,7 +3821,7 @@
           <a:p>
             <a:fld id="{0560A9CD-0304-4E0B-9E82-E7E0115DE05B}" type="datetimeFigureOut">
               <a:rPr lang="en-US" smtClean="0"/>
-              <a:t>4/2/2025</a:t>
+              <a:t>4/6/2025</a:t>
             </a:fld>
             <a:endParaRPr lang="en-US"/>
           </a:p>
@@ -4035,7 +4050,7 @@
           <a:p>
             <a:fld id="{0560A9CD-0304-4E0B-9E82-E7E0115DE05B}" type="datetimeFigureOut">
               <a:rPr lang="en-US" smtClean="0"/>
-              <a:t>4/2/2025</a:t>
+              <a:t>4/6/2025</a:t>
             </a:fld>
             <a:endParaRPr lang="en-US"/>
           </a:p>
@@ -4399,7 +4414,7 @@
           <a:p>
             <a:fld id="{0560A9CD-0304-4E0B-9E82-E7E0115DE05B}" type="datetimeFigureOut">
               <a:rPr lang="en-US" smtClean="0"/>
-              <a:t>4/2/2025</a:t>
+              <a:t>4/6/2025</a:t>
             </a:fld>
             <a:endParaRPr lang="en-US"/>
           </a:p>
@@ -4516,7 +4531,7 @@
           <a:p>
             <a:fld id="{0560A9CD-0304-4E0B-9E82-E7E0115DE05B}" type="datetimeFigureOut">
               <a:rPr lang="en-US" smtClean="0"/>
-              <a:t>4/2/2025</a:t>
+              <a:t>4/6/2025</a:t>
             </a:fld>
             <a:endParaRPr lang="en-US"/>
           </a:p>
@@ -4611,7 +4626,7 @@
           <a:p>
             <a:fld id="{0560A9CD-0304-4E0B-9E82-E7E0115DE05B}" type="datetimeFigureOut">
               <a:rPr lang="en-US" smtClean="0"/>
-              <a:t>4/2/2025</a:t>
+              <a:t>4/6/2025</a:t>
             </a:fld>
             <a:endParaRPr lang="en-US"/>
           </a:p>
@@ -4886,7 +4901,7 @@
           <a:p>
             <a:fld id="{0560A9CD-0304-4E0B-9E82-E7E0115DE05B}" type="datetimeFigureOut">
               <a:rPr lang="en-US" smtClean="0"/>
-              <a:t>4/2/2025</a:t>
+              <a:t>4/6/2025</a:t>
             </a:fld>
             <a:endParaRPr lang="en-US"/>
           </a:p>
@@ -5138,7 +5153,7 @@
           <a:p>
             <a:fld id="{0560A9CD-0304-4E0B-9E82-E7E0115DE05B}" type="datetimeFigureOut">
               <a:rPr lang="en-US" smtClean="0"/>
-              <a:t>4/2/2025</a:t>
+              <a:t>4/6/2025</a:t>
             </a:fld>
             <a:endParaRPr lang="en-US"/>
           </a:p>
@@ -5349,7 +5364,7 @@
           <a:p>
             <a:fld id="{0560A9CD-0304-4E0B-9E82-E7E0115DE05B}" type="datetimeFigureOut">
               <a:rPr lang="en-US" smtClean="0"/>
-              <a:t>4/2/2025</a:t>
+              <a:t>4/6/2025</a:t>
             </a:fld>
             <a:endParaRPr lang="en-US"/>
           </a:p>
@@ -29438,7 +29453,7 @@
         </p:blipFill>
         <p:spPr>
           <a:xfrm>
-            <a:off x="6302023" y="367083"/>
+            <a:off x="6302023" y="353333"/>
             <a:ext cx="5448300" cy="3581400"/>
           </a:xfrm>
           <a:prstGeom prst="rect">

</xml_diff>